<commit_message>
numbers_ array is unsigned int, size_ uses unsigned long
</commit_message>
<xml_diff>
--- a/Presentation/HW7_presentation.pptx
+++ b/Presentation/HW7_presentation.pptx
@@ -213,7 +213,7 @@
           <a:p>
             <a:fld id="{45B120F0-C4B5-D343-A50D-56CA55199F0D}" type="datetimeFigureOut">
               <a:rPr lang="en-US" smtClean="0"/>
-              <a:t>2/12/24</a:t>
+              <a:t>2/15/24</a:t>
             </a:fld>
             <a:endParaRPr lang="en-US"/>
           </a:p>
@@ -834,7 +834,7 @@
           <a:p>
             <a:fld id="{4AAD347D-5ACD-4C99-B74B-A9C85AD731AF}" type="datetimeFigureOut">
               <a:rPr lang="en-US" dirty="0"/>
-              <a:t>2/12/24</a:t>
+              <a:t>2/15/24</a:t>
             </a:fld>
             <a:endParaRPr lang="en-US" dirty="0"/>
           </a:p>
@@ -1104,7 +1104,7 @@
           <a:p>
             <a:fld id="{4509A250-FF31-4206-8172-F9D3106AACB1}" type="datetimeFigureOut">
               <a:rPr lang="en-US" dirty="0"/>
-              <a:t>2/12/24</a:t>
+              <a:t>2/15/24</a:t>
             </a:fld>
             <a:endParaRPr lang="en-US" dirty="0"/>
           </a:p>
@@ -1293,7 +1293,7 @@
           <a:p>
             <a:fld id="{4509A250-FF31-4206-8172-F9D3106AACB1}" type="datetimeFigureOut">
               <a:rPr lang="en-US" dirty="0"/>
-              <a:t>2/12/24</a:t>
+              <a:t>2/15/24</a:t>
             </a:fld>
             <a:endParaRPr lang="en-US" dirty="0"/>
           </a:p>
@@ -1561,7 +1561,7 @@
           <a:p>
             <a:fld id="{4509A250-FF31-4206-8172-F9D3106AACB1}" type="datetimeFigureOut">
               <a:rPr lang="en-US" dirty="0"/>
-              <a:t>2/12/24</a:t>
+              <a:t>2/15/24</a:t>
             </a:fld>
             <a:endParaRPr lang="en-US" dirty="0"/>
           </a:p>
@@ -1897,7 +1897,7 @@
           <a:p>
             <a:fld id="{4509A250-FF31-4206-8172-F9D3106AACB1}" type="datetimeFigureOut">
               <a:rPr lang="en-US" dirty="0"/>
-              <a:t>2/12/24</a:t>
+              <a:t>2/15/24</a:t>
             </a:fld>
             <a:endParaRPr lang="en-US" dirty="0"/>
           </a:p>
@@ -2515,7 +2515,7 @@
           <a:p>
             <a:fld id="{4509A250-FF31-4206-8172-F9D3106AACB1}" type="datetimeFigureOut">
               <a:rPr lang="en-US" dirty="0"/>
-              <a:t>2/12/24</a:t>
+              <a:t>2/15/24</a:t>
             </a:fld>
             <a:endParaRPr lang="en-US" dirty="0"/>
           </a:p>
@@ -3370,7 +3370,7 @@
           <a:p>
             <a:fld id="{4509A250-FF31-4206-8172-F9D3106AACB1}" type="datetimeFigureOut">
               <a:rPr lang="en-US" dirty="0"/>
-              <a:t>2/12/24</a:t>
+              <a:t>2/15/24</a:t>
             </a:fld>
             <a:endParaRPr lang="en-US" dirty="0"/>
           </a:p>
@@ -3535,7 +3535,7 @@
           <a:p>
             <a:fld id="{4509A250-FF31-4206-8172-F9D3106AACB1}" type="datetimeFigureOut">
               <a:rPr lang="en-US" dirty="0"/>
-              <a:t>2/12/24</a:t>
+              <a:t>2/15/24</a:t>
             </a:fld>
             <a:endParaRPr lang="en-US" dirty="0"/>
           </a:p>
@@ -3710,7 +3710,7 @@
           <a:p>
             <a:fld id="{4509A250-FF31-4206-8172-F9D3106AACB1}" type="datetimeFigureOut">
               <a:rPr lang="en-US" dirty="0"/>
-              <a:t>2/12/24</a:t>
+              <a:t>2/15/24</a:t>
             </a:fld>
             <a:endParaRPr lang="en-US" dirty="0"/>
           </a:p>
@@ -3875,7 +3875,7 @@
           <a:p>
             <a:fld id="{4509A250-FF31-4206-8172-F9D3106AACB1}" type="datetimeFigureOut">
               <a:rPr lang="en-US" dirty="0"/>
-              <a:t>2/12/24</a:t>
+              <a:t>2/15/24</a:t>
             </a:fld>
             <a:endParaRPr lang="en-US" dirty="0"/>
           </a:p>
@@ -4117,7 +4117,7 @@
           <a:p>
             <a:fld id="{9796027F-7875-4030-9381-8BD8C4F21935}" type="datetimeFigureOut">
               <a:rPr lang="en-US" dirty="0"/>
-              <a:t>2/12/24</a:t>
+              <a:t>2/15/24</a:t>
             </a:fld>
             <a:endParaRPr lang="en-US" dirty="0"/>
           </a:p>
@@ -4404,7 +4404,7 @@
           <a:p>
             <a:fld id="{9796027F-7875-4030-9381-8BD8C4F21935}" type="datetimeFigureOut">
               <a:rPr lang="en-US" dirty="0"/>
-              <a:t>2/12/24</a:t>
+              <a:t>2/15/24</a:t>
             </a:fld>
             <a:endParaRPr lang="en-US" dirty="0"/>
           </a:p>
@@ -4843,7 +4843,7 @@
           <a:p>
             <a:fld id="{9796027F-7875-4030-9381-8BD8C4F21935}" type="datetimeFigureOut">
               <a:rPr lang="en-US" dirty="0"/>
-              <a:t>2/12/24</a:t>
+              <a:t>2/15/24</a:t>
             </a:fld>
             <a:endParaRPr lang="en-US" dirty="0"/>
           </a:p>
@@ -4956,7 +4956,7 @@
           <a:p>
             <a:fld id="{4509A250-FF31-4206-8172-F9D3106AACB1}" type="datetimeFigureOut">
               <a:rPr lang="en-US" dirty="0"/>
-              <a:t>2/12/24</a:t>
+              <a:t>2/15/24</a:t>
             </a:fld>
             <a:endParaRPr lang="en-US" dirty="0"/>
           </a:p>
@@ -5046,7 +5046,7 @@
           <a:p>
             <a:fld id="{4509A250-FF31-4206-8172-F9D3106AACB1}" type="datetimeFigureOut">
               <a:rPr lang="en-US" dirty="0"/>
-              <a:t>2/12/24</a:t>
+              <a:t>2/15/24</a:t>
             </a:fld>
             <a:endParaRPr lang="en-US" dirty="0"/>
           </a:p>
@@ -5320,7 +5320,7 @@
           <a:p>
             <a:fld id="{4509A250-FF31-4206-8172-F9D3106AACB1}" type="datetimeFigureOut">
               <a:rPr lang="en-US" dirty="0"/>
-              <a:t>2/12/24</a:t>
+              <a:t>2/15/24</a:t>
             </a:fld>
             <a:endParaRPr lang="en-US" dirty="0"/>
           </a:p>
@@ -5590,7 +5590,7 @@
           <a:p>
             <a:fld id="{4509A250-FF31-4206-8172-F9D3106AACB1}" type="datetimeFigureOut">
               <a:rPr lang="en-US" dirty="0"/>
-              <a:t>2/12/24</a:t>
+              <a:t>2/15/24</a:t>
             </a:fld>
             <a:endParaRPr lang="en-US" dirty="0"/>
           </a:p>
@@ -6014,7 +6014,7 @@
           <a:p>
             <a:fld id="{4AAD347D-5ACD-4C99-B74B-A9C85AD731AF}" type="datetimeFigureOut">
               <a:rPr lang="en-US" dirty="0"/>
-              <a:t>2/12/24</a:t>
+              <a:t>2/15/24</a:t>
             </a:fld>
             <a:endParaRPr lang="en-US" dirty="0"/>
           </a:p>
@@ -11094,14 +11094,23 @@
               <a:t>(</a:t>
             </a:r>
             <a:r>
-              <a:rPr lang="en-US" b="0" dirty="0" err="1">
-                <a:solidFill>
-                  <a:srgbClr val="4EC9B0"/>
-                </a:solidFill>
-                <a:effectLst/>
-                <a:latin typeface="Menlo" panose="020B0609030804020204" pitchFamily="49" charset="0"/>
-              </a:rPr>
-              <a:t>difference_type</a:t>
+              <a:rPr lang="en-US" b="0" dirty="0">
+                <a:solidFill>
+                  <a:srgbClr val="569CD6"/>
+                </a:solidFill>
+                <a:effectLst/>
+                <a:latin typeface="Menlo" panose="020B0609030804020204" pitchFamily="49" charset="0"/>
+              </a:rPr>
+              <a:t>unsigned </a:t>
+            </a:r>
+            <a:r>
+              <a:rPr lang="en-US" dirty="0">
+                <a:solidFill>
+                  <a:srgbClr val="569CD6"/>
+                </a:solidFill>
+                <a:latin typeface="Menlo" panose="020B0609030804020204" pitchFamily="49" charset="0"/>
+              </a:rPr>
+              <a:t>long</a:t>
             </a:r>
             <a:r>
               <a:rPr lang="en-US" b="0" dirty="0">
@@ -11970,7 +11979,7 @@
                 <a:effectLst/>
                 <a:latin typeface="Menlo" panose="020B0609030804020204" pitchFamily="49" charset="0"/>
               </a:rPr>
-              <a:t>int</a:t>
+              <a:t>unsigned int</a:t>
             </a:r>
             <a:r>
               <a:rPr lang="en-US" dirty="0"/>
@@ -12113,7 +12122,7 @@
                 <a:effectLst/>
                 <a:latin typeface="Menlo" panose="020B0609030804020204" pitchFamily="49" charset="0"/>
               </a:rPr>
-              <a:t>int</a:t>
+              <a:t>unsigned int</a:t>
             </a:r>
             <a:r>
               <a:rPr lang="en-US" b="0" dirty="0">
@@ -12150,7 +12159,7 @@
             <a:pPr lvl="1"/>
             <a:r>
               <a:rPr lang="en-US" dirty="0"/>
-              <a:t>Pointer to dynamically allocated array of int</a:t>
+              <a:t>Pointer to dynamically allocated array of unsigned int</a:t>
             </a:r>
           </a:p>
           <a:p>
@@ -12383,7 +12392,7 @@
                 <a:effectLst/>
                 <a:latin typeface="Menlo" panose="020B0609030804020204" pitchFamily="49" charset="0"/>
               </a:rPr>
-              <a:t>int</a:t>
+              <a:t>long</a:t>
             </a:r>
             <a:r>
               <a:rPr lang="en-US" b="0" dirty="0">
@@ -12669,14 +12678,13 @@
               <a:t> </a:t>
             </a:r>
             <a:r>
-              <a:rPr lang="en-US" b="0" dirty="0">
+              <a:rPr lang="en-US" dirty="0">
                 <a:solidFill>
                   <a:srgbClr val="569CD6"/>
                 </a:solidFill>
-                <a:effectLst/>
-                <a:latin typeface="Menlo" panose="020B0609030804020204" pitchFamily="49" charset="0"/>
-              </a:rPr>
-              <a:t>int</a:t>
+                <a:latin typeface="Menlo" panose="020B0609030804020204" pitchFamily="49" charset="0"/>
+              </a:rPr>
+              <a:t>long</a:t>
             </a:r>
             <a:r>
               <a:rPr lang="en-US" b="0" dirty="0">
@@ -12819,7 +12827,12 @@
             <p:ph sz="half" idx="1"/>
           </p:nvPr>
         </p:nvSpPr>
-        <p:spPr/>
+        <p:spPr>
+          <a:xfrm>
+            <a:off x="1004712" y="2060575"/>
+            <a:ext cx="4494940" cy="4195763"/>
+          </a:xfrm>
+        </p:spPr>
         <p:txBody>
           <a:bodyPr>
             <a:normAutofit/>
@@ -12974,7 +12987,27 @@
                 <a:effectLst/>
                 <a:latin typeface="Menlo" panose="020B0609030804020204" pitchFamily="49" charset="0"/>
               </a:rPr>
-              <a:t>[n];</a:t>
+              <a:t>[n – </a:t>
+            </a:r>
+            <a:r>
+              <a:rPr lang="en-US" b="0" dirty="0" err="1">
+                <a:solidFill>
+                  <a:srgbClr val="CCCCCC"/>
+                </a:solidFill>
+                <a:effectLst/>
+                <a:latin typeface="Menlo" panose="020B0609030804020204" pitchFamily="49" charset="0"/>
+              </a:rPr>
+              <a:t>lower_bound</a:t>
+            </a:r>
+            <a:r>
+              <a:rPr lang="en-US" b="0" dirty="0">
+                <a:solidFill>
+                  <a:srgbClr val="CCCCCC"/>
+                </a:solidFill>
+                <a:effectLst/>
+                <a:latin typeface="Menlo" panose="020B0609030804020204" pitchFamily="49" charset="0"/>
+              </a:rPr>
+              <a:t>_];</a:t>
             </a:r>
           </a:p>
           <a:p>
@@ -13372,7 +13405,12 @@
             <p:ph sz="half" idx="1"/>
           </p:nvPr>
         </p:nvSpPr>
-        <p:spPr/>
+        <p:spPr>
+          <a:xfrm>
+            <a:off x="936978" y="2060575"/>
+            <a:ext cx="4562673" cy="4195763"/>
+          </a:xfrm>
+        </p:spPr>
         <p:txBody>
           <a:bodyPr>
             <a:normAutofit/>
@@ -13492,14 +13530,23 @@
               <a:t> </a:t>
             </a:r>
             <a:r>
-              <a:rPr lang="en-US" b="0" dirty="0">
+              <a:rPr lang="en-US" dirty="0">
                 <a:solidFill>
                   <a:srgbClr val="569CD6"/>
                 </a:solidFill>
-                <a:effectLst/>
-                <a:latin typeface="Menlo" panose="020B0609030804020204" pitchFamily="49" charset="0"/>
-              </a:rPr>
-              <a:t>int</a:t>
+                <a:latin typeface="Menlo" panose="020B0609030804020204" pitchFamily="49" charset="0"/>
+              </a:rPr>
+              <a:t>unsigned in</a:t>
+            </a:r>
+            <a:r>
+              <a:rPr lang="en-US" b="0" dirty="0">
+                <a:solidFill>
+                  <a:srgbClr val="569CD6"/>
+                </a:solidFill>
+                <a:effectLst/>
+                <a:latin typeface="Menlo" panose="020B0609030804020204" pitchFamily="49" charset="0"/>
+              </a:rPr>
+              <a:t>t</a:t>
             </a:r>
             <a:r>
               <a:rPr lang="en-US" b="0" dirty="0">
@@ -15042,7 +15089,7 @@
         <p:spPr/>
         <p:txBody>
           <a:bodyPr>
-            <a:normAutofit lnSpcReduction="10000"/>
+            <a:normAutofit fontScale="92500"/>
           </a:bodyPr>
           <a:lstStyle/>
           <a:p>
@@ -15221,10 +15268,15 @@
             <p:ph sz="half" idx="2"/>
           </p:nvPr>
         </p:nvSpPr>
-        <p:spPr/>
+        <p:spPr>
+          <a:xfrm>
+            <a:off x="5654493" y="2056092"/>
+            <a:ext cx="5160263" cy="4200245"/>
+          </a:xfrm>
+        </p:spPr>
         <p:txBody>
           <a:bodyPr>
-            <a:normAutofit lnSpcReduction="10000"/>
+            <a:normAutofit fontScale="92500"/>
           </a:bodyPr>
           <a:lstStyle/>
           <a:p>
@@ -15276,7 +15328,7 @@
                 <a:effectLst/>
                 <a:latin typeface="Menlo" panose="020B0609030804020204" pitchFamily="49" charset="0"/>
               </a:rPr>
-              <a:t>int</a:t>
+              <a:t>unsigned int</a:t>
             </a:r>
             <a:r>
               <a:rPr lang="en-US" b="0" dirty="0">
@@ -16076,7 +16128,7 @@
         <p:spPr>
           <a:xfrm>
             <a:off x="5654493" y="2056092"/>
-            <a:ext cx="4861107" cy="4200245"/>
+            <a:ext cx="5713418" cy="4200245"/>
           </a:xfrm>
         </p:spPr>
         <p:txBody>
@@ -16317,7 +16369,7 @@
                 <a:effectLst/>
                 <a:latin typeface="Menlo" panose="020B0609030804020204" pitchFamily="49" charset="0"/>
               </a:rPr>
-              <a:t>int</a:t>
+              <a:t>unsigned int</a:t>
             </a:r>
             <a:r>
               <a:rPr lang="en-US" b="0" dirty="0">

</xml_diff>

<commit_message>
Improves overflow protection using GNU built-in
</commit_message>
<xml_diff>
--- a/Presentation/HW7_presentation.pptx
+++ b/Presentation/HW7_presentation.pptx
@@ -5,7 +5,7 @@
     <p:sldMasterId id="2147483648" r:id="rId1"/>
   </p:sldMasterIdLst>
   <p:notesMasterIdLst>
-    <p:notesMasterId r:id="rId19"/>
+    <p:notesMasterId r:id="rId20"/>
   </p:notesMasterIdLst>
   <p:sldIdLst>
     <p:sldId id="256" r:id="rId2"/>
@@ -13,18 +13,19 @@
     <p:sldId id="263" r:id="rId4"/>
     <p:sldId id="262" r:id="rId5"/>
     <p:sldId id="258" r:id="rId6"/>
-    <p:sldId id="259" r:id="rId7"/>
-    <p:sldId id="260" r:id="rId8"/>
-    <p:sldId id="261" r:id="rId9"/>
-    <p:sldId id="265" r:id="rId10"/>
-    <p:sldId id="266" r:id="rId11"/>
-    <p:sldId id="264" r:id="rId12"/>
-    <p:sldId id="268" r:id="rId13"/>
-    <p:sldId id="267" r:id="rId14"/>
-    <p:sldId id="269" r:id="rId15"/>
-    <p:sldId id="271" r:id="rId16"/>
-    <p:sldId id="272" r:id="rId17"/>
-    <p:sldId id="270" r:id="rId18"/>
+    <p:sldId id="273" r:id="rId7"/>
+    <p:sldId id="259" r:id="rId8"/>
+    <p:sldId id="260" r:id="rId9"/>
+    <p:sldId id="261" r:id="rId10"/>
+    <p:sldId id="265" r:id="rId11"/>
+    <p:sldId id="266" r:id="rId12"/>
+    <p:sldId id="264" r:id="rId13"/>
+    <p:sldId id="268" r:id="rId14"/>
+    <p:sldId id="267" r:id="rId15"/>
+    <p:sldId id="269" r:id="rId16"/>
+    <p:sldId id="271" r:id="rId17"/>
+    <p:sldId id="272" r:id="rId18"/>
+    <p:sldId id="270" r:id="rId19"/>
   </p:sldIdLst>
   <p:sldSz cx="12192000" cy="6858000"/>
   <p:notesSz cx="6858000" cy="9144000"/>
@@ -6641,6 +6642,737 @@
           <p:cNvPr id="2" name="Title 1">
             <a:extLst>
               <a:ext uri="{FF2B5EF4-FFF2-40B4-BE49-F238E27FC236}">
+                <a16:creationId xmlns:a16="http://schemas.microsoft.com/office/drawing/2014/main" id="{99F68D1C-5B99-F8B9-CE76-683B28183C9E}"/>
+              </a:ext>
+            </a:extLst>
+          </p:cNvPr>
+          <p:cNvSpPr>
+            <a:spLocks noGrp="1"/>
+          </p:cNvSpPr>
+          <p:nvPr>
+            <p:ph type="title"/>
+          </p:nvPr>
+        </p:nvSpPr>
+        <p:spPr/>
+        <p:txBody>
+          <a:bodyPr/>
+          <a:lstStyle/>
+          <a:p>
+            <a:r>
+              <a:rPr lang="en-US" dirty="0"/>
+              <a:t>Iterator</a:t>
+            </a:r>
+          </a:p>
+        </p:txBody>
+      </p:sp>
+      <p:sp>
+        <p:nvSpPr>
+          <p:cNvPr id="3" name="Content Placeholder 2">
+            <a:extLst>
+              <a:ext uri="{FF2B5EF4-FFF2-40B4-BE49-F238E27FC236}">
+                <a16:creationId xmlns:a16="http://schemas.microsoft.com/office/drawing/2014/main" id="{8FE4A138-FBD9-A4B6-DB5A-8699226D1081}"/>
+              </a:ext>
+            </a:extLst>
+          </p:cNvPr>
+          <p:cNvSpPr>
+            <a:spLocks noGrp="1"/>
+          </p:cNvSpPr>
+          <p:nvPr>
+            <p:ph sz="half" idx="1"/>
+          </p:nvPr>
+        </p:nvSpPr>
+        <p:spPr/>
+        <p:txBody>
+          <a:bodyPr/>
+          <a:lstStyle/>
+          <a:p>
+            <a:r>
+              <a:rPr lang="en-US" b="0" dirty="0">
+                <a:solidFill>
+                  <a:srgbClr val="4EC9B0"/>
+                </a:solidFill>
+                <a:effectLst/>
+                <a:latin typeface="Menlo" panose="020B0609030804020204" pitchFamily="49" charset="0"/>
+              </a:rPr>
+              <a:t>Iterator</a:t>
+            </a:r>
+            <a:r>
+              <a:rPr lang="en-US" b="0" dirty="0">
+                <a:solidFill>
+                  <a:srgbClr val="CCCCCC"/>
+                </a:solidFill>
+                <a:effectLst/>
+                <a:latin typeface="Menlo" panose="020B0609030804020204" pitchFamily="49" charset="0"/>
+              </a:rPr>
+              <a:t> </a:t>
+            </a:r>
+            <a:r>
+              <a:rPr lang="en-US" b="0" dirty="0">
+                <a:solidFill>
+                  <a:srgbClr val="DCDCAA"/>
+                </a:solidFill>
+                <a:effectLst/>
+                <a:latin typeface="Menlo" panose="020B0609030804020204" pitchFamily="49" charset="0"/>
+              </a:rPr>
+              <a:t>begin</a:t>
+            </a:r>
+            <a:r>
+              <a:rPr lang="en-US" b="0" dirty="0">
+                <a:solidFill>
+                  <a:srgbClr val="CCCCCC"/>
+                </a:solidFill>
+                <a:effectLst/>
+                <a:latin typeface="Menlo" panose="020B0609030804020204" pitchFamily="49" charset="0"/>
+              </a:rPr>
+              <a:t>() </a:t>
+            </a:r>
+            <a:r>
+              <a:rPr lang="en-US" b="0" dirty="0">
+                <a:solidFill>
+                  <a:srgbClr val="569CD6"/>
+                </a:solidFill>
+                <a:effectLst/>
+                <a:latin typeface="Menlo" panose="020B0609030804020204" pitchFamily="49" charset="0"/>
+              </a:rPr>
+              <a:t>const</a:t>
+            </a:r>
+            <a:r>
+              <a:rPr lang="en-US" b="0" dirty="0">
+                <a:solidFill>
+                  <a:srgbClr val="CCCCCC"/>
+                </a:solidFill>
+                <a:effectLst/>
+                <a:latin typeface="Menlo" panose="020B0609030804020204" pitchFamily="49" charset="0"/>
+              </a:rPr>
+              <a:t>;</a:t>
+            </a:r>
+          </a:p>
+          <a:p>
+            <a:pPr lvl="1"/>
+            <a:r>
+              <a:rPr lang="en-US" dirty="0"/>
+              <a:t>Return an object of type </a:t>
+            </a:r>
+            <a:r>
+              <a:rPr lang="en-US" b="0" dirty="0" err="1">
+                <a:solidFill>
+                  <a:srgbClr val="4EC9B0"/>
+                </a:solidFill>
+                <a:effectLst/>
+                <a:latin typeface="Menlo" panose="020B0609030804020204" pitchFamily="49" charset="0"/>
+              </a:rPr>
+              <a:t>CountSort</a:t>
+            </a:r>
+            <a:r>
+              <a:rPr lang="en-US" b="0" dirty="0">
+                <a:solidFill>
+                  <a:srgbClr val="CCCCCC"/>
+                </a:solidFill>
+                <a:effectLst/>
+                <a:latin typeface="Menlo" panose="020B0609030804020204" pitchFamily="49" charset="0"/>
+              </a:rPr>
+              <a:t>::</a:t>
+            </a:r>
+            <a:r>
+              <a:rPr lang="en-US" b="0" dirty="0">
+                <a:solidFill>
+                  <a:srgbClr val="4EC9B0"/>
+                </a:solidFill>
+                <a:effectLst/>
+                <a:latin typeface="Menlo" panose="020B0609030804020204" pitchFamily="49" charset="0"/>
+              </a:rPr>
+              <a:t>Iterator</a:t>
+            </a:r>
+            <a:r>
+              <a:rPr lang="en-US" dirty="0">
+                <a:solidFill>
+                  <a:srgbClr val="CCCCCC"/>
+                </a:solidFill>
+                <a:latin typeface="Menlo" panose="020B0609030804020204" pitchFamily="49" charset="0"/>
+              </a:rPr>
+              <a:t> </a:t>
+            </a:r>
+            <a:r>
+              <a:rPr lang="en-US" dirty="0"/>
+              <a:t>that corresponds to the smallest int currently stored in this object.</a:t>
+            </a:r>
+          </a:p>
+          <a:p>
+            <a:r>
+              <a:rPr lang="en-US" b="0" dirty="0">
+                <a:solidFill>
+                  <a:srgbClr val="4EC9B0"/>
+                </a:solidFill>
+                <a:effectLst/>
+                <a:latin typeface="Menlo" panose="020B0609030804020204" pitchFamily="49" charset="0"/>
+              </a:rPr>
+              <a:t>Iterator</a:t>
+            </a:r>
+            <a:r>
+              <a:rPr lang="en-US" b="0" dirty="0">
+                <a:solidFill>
+                  <a:srgbClr val="CCCCCC"/>
+                </a:solidFill>
+                <a:effectLst/>
+                <a:latin typeface="Menlo" panose="020B0609030804020204" pitchFamily="49" charset="0"/>
+              </a:rPr>
+              <a:t> </a:t>
+            </a:r>
+            <a:r>
+              <a:rPr lang="en-US" b="0" dirty="0">
+                <a:solidFill>
+                  <a:srgbClr val="DCDCAA"/>
+                </a:solidFill>
+                <a:effectLst/>
+                <a:latin typeface="Menlo" panose="020B0609030804020204" pitchFamily="49" charset="0"/>
+              </a:rPr>
+              <a:t>end</a:t>
+            </a:r>
+            <a:r>
+              <a:rPr lang="en-US" b="0" dirty="0">
+                <a:solidFill>
+                  <a:srgbClr val="CCCCCC"/>
+                </a:solidFill>
+                <a:effectLst/>
+                <a:latin typeface="Menlo" panose="020B0609030804020204" pitchFamily="49" charset="0"/>
+              </a:rPr>
+              <a:t>() </a:t>
+            </a:r>
+            <a:r>
+              <a:rPr lang="en-US" b="0" dirty="0">
+                <a:solidFill>
+                  <a:srgbClr val="569CD6"/>
+                </a:solidFill>
+                <a:effectLst/>
+                <a:latin typeface="Menlo" panose="020B0609030804020204" pitchFamily="49" charset="0"/>
+              </a:rPr>
+              <a:t>const</a:t>
+            </a:r>
+            <a:r>
+              <a:rPr lang="en-US" b="0" dirty="0">
+                <a:solidFill>
+                  <a:srgbClr val="CCCCCC"/>
+                </a:solidFill>
+                <a:effectLst/>
+                <a:latin typeface="Menlo" panose="020B0609030804020204" pitchFamily="49" charset="0"/>
+              </a:rPr>
+              <a:t>;</a:t>
+            </a:r>
+          </a:p>
+          <a:p>
+            <a:pPr lvl="1"/>
+            <a:r>
+              <a:rPr lang="en-US" dirty="0"/>
+              <a:t>Return an object of type </a:t>
+            </a:r>
+            <a:r>
+              <a:rPr lang="en-US" b="0" dirty="0" err="1">
+                <a:solidFill>
+                  <a:srgbClr val="4EC9B0"/>
+                </a:solidFill>
+                <a:effectLst/>
+                <a:latin typeface="Menlo" panose="020B0609030804020204" pitchFamily="49" charset="0"/>
+              </a:rPr>
+              <a:t>CountSort</a:t>
+            </a:r>
+            <a:r>
+              <a:rPr lang="en-US" b="0" dirty="0">
+                <a:solidFill>
+                  <a:srgbClr val="CCCCCC"/>
+                </a:solidFill>
+                <a:effectLst/>
+                <a:latin typeface="Menlo" panose="020B0609030804020204" pitchFamily="49" charset="0"/>
+              </a:rPr>
+              <a:t>::</a:t>
+            </a:r>
+            <a:r>
+              <a:rPr lang="en-US" b="0" dirty="0">
+                <a:solidFill>
+                  <a:srgbClr val="4EC9B0"/>
+                </a:solidFill>
+                <a:effectLst/>
+                <a:latin typeface="Menlo" panose="020B0609030804020204" pitchFamily="49" charset="0"/>
+              </a:rPr>
+              <a:t>Iterator</a:t>
+            </a:r>
+            <a:r>
+              <a:rPr lang="en-US" dirty="0">
+                <a:solidFill>
+                  <a:srgbClr val="CCCCCC"/>
+                </a:solidFill>
+                <a:latin typeface="Menlo" panose="020B0609030804020204" pitchFamily="49" charset="0"/>
+              </a:rPr>
+              <a:t> </a:t>
+            </a:r>
+            <a:r>
+              <a:rPr lang="en-US" dirty="0"/>
+              <a:t>that corresponds one past the largest </a:t>
+            </a:r>
+            <a:r>
+              <a:rPr lang="en-US" b="0" dirty="0">
+                <a:solidFill>
+                  <a:srgbClr val="569CD6"/>
+                </a:solidFill>
+                <a:effectLst/>
+                <a:latin typeface="Menlo" panose="020B0609030804020204" pitchFamily="49" charset="0"/>
+              </a:rPr>
+              <a:t>int</a:t>
+            </a:r>
+            <a:r>
+              <a:rPr lang="en-US" dirty="0"/>
+              <a:t> currently stored in this object. It does not correspond to the last item, since .</a:t>
+            </a:r>
+            <a:r>
+              <a:rPr lang="en-US" b="0" dirty="0">
+                <a:solidFill>
+                  <a:srgbClr val="DCDCAA"/>
+                </a:solidFill>
+                <a:effectLst/>
+                <a:latin typeface="Menlo" panose="020B0609030804020204" pitchFamily="49" charset="0"/>
+              </a:rPr>
+              <a:t>begin</a:t>
+            </a:r>
+            <a:r>
+              <a:rPr lang="en-US" b="0" dirty="0">
+                <a:solidFill>
+                  <a:srgbClr val="CCCCCC"/>
+                </a:solidFill>
+                <a:effectLst/>
+                <a:latin typeface="Menlo" panose="020B0609030804020204" pitchFamily="49" charset="0"/>
+              </a:rPr>
+              <a:t>() </a:t>
+            </a:r>
+            <a:r>
+              <a:rPr lang="en-US" dirty="0"/>
+              <a:t>&amp; .</a:t>
+            </a:r>
+            <a:r>
+              <a:rPr lang="en-US" b="0" dirty="0">
+                <a:solidFill>
+                  <a:srgbClr val="DCDCAA"/>
+                </a:solidFill>
+                <a:effectLst/>
+                <a:latin typeface="Menlo" panose="020B0609030804020204" pitchFamily="49" charset="0"/>
+              </a:rPr>
+              <a:t>end</a:t>
+            </a:r>
+            <a:r>
+              <a:rPr lang="en-US" b="0" dirty="0">
+                <a:solidFill>
+                  <a:srgbClr val="CCCCCC"/>
+                </a:solidFill>
+                <a:effectLst/>
+                <a:latin typeface="Menlo" panose="020B0609030804020204" pitchFamily="49" charset="0"/>
+              </a:rPr>
+              <a:t>()</a:t>
+            </a:r>
+            <a:r>
+              <a:rPr lang="en-US" dirty="0"/>
+              <a:t> form a half-open interval.</a:t>
+            </a:r>
+          </a:p>
+        </p:txBody>
+      </p:sp>
+      <p:sp>
+        <p:nvSpPr>
+          <p:cNvPr id="4" name="Content Placeholder 3">
+            <a:extLst>
+              <a:ext uri="{FF2B5EF4-FFF2-40B4-BE49-F238E27FC236}">
+                <a16:creationId xmlns:a16="http://schemas.microsoft.com/office/drawing/2014/main" id="{F903C668-3D50-0919-EB7B-D7CBDE1D4B12}"/>
+              </a:ext>
+            </a:extLst>
+          </p:cNvPr>
+          <p:cNvSpPr>
+            <a:spLocks noGrp="1"/>
+          </p:cNvSpPr>
+          <p:nvPr>
+            <p:ph sz="half" idx="2"/>
+          </p:nvPr>
+        </p:nvSpPr>
+        <p:spPr>
+          <a:xfrm>
+            <a:off x="5654493" y="2056092"/>
+            <a:ext cx="5713418" cy="4200245"/>
+          </a:xfrm>
+        </p:spPr>
+        <p:txBody>
+          <a:bodyPr/>
+          <a:lstStyle/>
+          <a:p>
+            <a:r>
+              <a:rPr lang="en-US" b="0" dirty="0">
+                <a:effectLst/>
+                <a:latin typeface="+mn-lt"/>
+              </a:rPr>
+              <a:t>Member variables</a:t>
+            </a:r>
+          </a:p>
+          <a:p>
+            <a:pPr lvl="1"/>
+            <a:r>
+              <a:rPr lang="en-US" b="0" dirty="0">
+                <a:solidFill>
+                  <a:srgbClr val="569CD6"/>
+                </a:solidFill>
+                <a:effectLst/>
+                <a:latin typeface="Menlo" panose="020B0609030804020204" pitchFamily="49" charset="0"/>
+              </a:rPr>
+              <a:t>const</a:t>
+            </a:r>
+            <a:r>
+              <a:rPr lang="en-US" b="0" dirty="0">
+                <a:solidFill>
+                  <a:srgbClr val="CCCCCC"/>
+                </a:solidFill>
+                <a:effectLst/>
+                <a:latin typeface="Menlo" panose="020B0609030804020204" pitchFamily="49" charset="0"/>
+              </a:rPr>
+              <a:t> </a:t>
+            </a:r>
+            <a:r>
+              <a:rPr lang="en-US" b="0" dirty="0" err="1">
+                <a:solidFill>
+                  <a:srgbClr val="CCCCCC"/>
+                </a:solidFill>
+                <a:effectLst/>
+                <a:latin typeface="Menlo" panose="020B0609030804020204" pitchFamily="49" charset="0"/>
+              </a:rPr>
+              <a:t>CountSort</a:t>
+            </a:r>
+            <a:r>
+              <a:rPr lang="en-US" b="0" dirty="0">
+                <a:solidFill>
+                  <a:srgbClr val="CCCCCC"/>
+                </a:solidFill>
+                <a:effectLst/>
+                <a:latin typeface="Menlo" panose="020B0609030804020204" pitchFamily="49" charset="0"/>
+              </a:rPr>
+              <a:t> </a:t>
+            </a:r>
+            <a:r>
+              <a:rPr lang="en-US" b="0" dirty="0">
+                <a:solidFill>
+                  <a:srgbClr val="D4D4D4"/>
+                </a:solidFill>
+                <a:effectLst/>
+                <a:latin typeface="Menlo" panose="020B0609030804020204" pitchFamily="49" charset="0"/>
+              </a:rPr>
+              <a:t>*</a:t>
+            </a:r>
+            <a:r>
+              <a:rPr lang="en-US" b="0" dirty="0">
+                <a:solidFill>
+                  <a:srgbClr val="CCCCCC"/>
+                </a:solidFill>
+                <a:effectLst/>
+                <a:latin typeface="Menlo" panose="020B0609030804020204" pitchFamily="49" charset="0"/>
+              </a:rPr>
+              <a:t>parent;</a:t>
+            </a:r>
+          </a:p>
+          <a:p>
+            <a:pPr lvl="2"/>
+            <a:r>
+              <a:rPr lang="en-US" b="0" dirty="0">
+                <a:effectLst/>
+                <a:latin typeface="+mn-lt"/>
+              </a:rPr>
+              <a:t>Pointer to a </a:t>
+            </a:r>
+            <a:r>
+              <a:rPr lang="en-US" b="0" dirty="0">
+                <a:solidFill>
+                  <a:srgbClr val="569CD6"/>
+                </a:solidFill>
+                <a:effectLst/>
+                <a:latin typeface="Menlo" panose="020B0609030804020204" pitchFamily="49" charset="0"/>
+              </a:rPr>
+              <a:t>const</a:t>
+            </a:r>
+            <a:r>
+              <a:rPr lang="en-US" b="0" dirty="0">
+                <a:effectLst/>
+                <a:latin typeface="+mn-lt"/>
+              </a:rPr>
+              <a:t> </a:t>
+            </a:r>
+            <a:r>
+              <a:rPr lang="en-US" b="0" dirty="0" err="1">
+                <a:solidFill>
+                  <a:srgbClr val="CCCCCC"/>
+                </a:solidFill>
+                <a:effectLst/>
+                <a:latin typeface="Menlo" panose="020B0609030804020204" pitchFamily="49" charset="0"/>
+              </a:rPr>
+              <a:t>CountSort</a:t>
+            </a:r>
+            <a:endParaRPr lang="en-US" b="0" dirty="0">
+              <a:effectLst/>
+              <a:latin typeface="+mn-lt"/>
+            </a:endParaRPr>
+          </a:p>
+          <a:p>
+            <a:pPr lvl="2"/>
+            <a:r>
+              <a:rPr lang="en-US" dirty="0">
+                <a:latin typeface="+mn-lt"/>
+              </a:rPr>
+              <a:t>Not a </a:t>
+            </a:r>
+            <a:r>
+              <a:rPr lang="en-US" b="0" dirty="0">
+                <a:solidFill>
+                  <a:srgbClr val="569CD6"/>
+                </a:solidFill>
+                <a:effectLst/>
+                <a:latin typeface="Menlo" panose="020B0609030804020204" pitchFamily="49" charset="0"/>
+              </a:rPr>
+              <a:t>const</a:t>
+            </a:r>
+            <a:r>
+              <a:rPr lang="en-US" dirty="0">
+                <a:latin typeface="+mn-lt"/>
+              </a:rPr>
+              <a:t> pointer!</a:t>
+            </a:r>
+            <a:endParaRPr lang="en-US" b="0" dirty="0">
+              <a:effectLst/>
+              <a:latin typeface="+mn-lt"/>
+            </a:endParaRPr>
+          </a:p>
+          <a:p>
+            <a:pPr lvl="1"/>
+            <a:r>
+              <a:rPr lang="en-US" b="0" dirty="0">
+                <a:solidFill>
+                  <a:srgbClr val="569CD6"/>
+                </a:solidFill>
+                <a:effectLst/>
+                <a:latin typeface="Menlo" panose="020B0609030804020204" pitchFamily="49" charset="0"/>
+              </a:rPr>
+              <a:t>unsigned</a:t>
+            </a:r>
+            <a:r>
+              <a:rPr lang="en-US" b="0" dirty="0">
+                <a:solidFill>
+                  <a:srgbClr val="CCCCCC"/>
+                </a:solidFill>
+                <a:effectLst/>
+                <a:latin typeface="Menlo" panose="020B0609030804020204" pitchFamily="49" charset="0"/>
+              </a:rPr>
+              <a:t> </a:t>
+            </a:r>
+            <a:r>
+              <a:rPr lang="en-US" b="0" dirty="0">
+                <a:solidFill>
+                  <a:srgbClr val="569CD6"/>
+                </a:solidFill>
+                <a:effectLst/>
+                <a:latin typeface="Menlo" panose="020B0609030804020204" pitchFamily="49" charset="0"/>
+              </a:rPr>
+              <a:t>int</a:t>
+            </a:r>
+            <a:r>
+              <a:rPr lang="en-US" b="0" dirty="0">
+                <a:solidFill>
+                  <a:srgbClr val="CCCCCC"/>
+                </a:solidFill>
+                <a:effectLst/>
+                <a:latin typeface="Menlo" panose="020B0609030804020204" pitchFamily="49" charset="0"/>
+              </a:rPr>
+              <a:t> </a:t>
+            </a:r>
+            <a:r>
+              <a:rPr lang="en-US" b="0" dirty="0" err="1">
+                <a:solidFill>
+                  <a:srgbClr val="CCCCCC"/>
+                </a:solidFill>
+                <a:effectLst/>
+                <a:latin typeface="Menlo" panose="020B0609030804020204" pitchFamily="49" charset="0"/>
+              </a:rPr>
+              <a:t>integer_index</a:t>
+            </a:r>
+            <a:r>
+              <a:rPr lang="en-US" b="0" dirty="0">
+                <a:solidFill>
+                  <a:srgbClr val="CCCCCC"/>
+                </a:solidFill>
+                <a:effectLst/>
+                <a:latin typeface="Menlo" panose="020B0609030804020204" pitchFamily="49" charset="0"/>
+              </a:rPr>
+              <a:t>;</a:t>
+            </a:r>
+          </a:p>
+          <a:p>
+            <a:pPr lvl="2"/>
+            <a:r>
+              <a:rPr lang="en-US" b="0" dirty="0">
+                <a:effectLst/>
+                <a:latin typeface="+mn-lt"/>
+              </a:rPr>
+              <a:t>Tracks </a:t>
+            </a:r>
+            <a:r>
+              <a:rPr lang="en-US" dirty="0">
+                <a:latin typeface="+mn-lt"/>
+              </a:rPr>
+              <a:t>which integer is returned</a:t>
+            </a:r>
+            <a:endParaRPr lang="en-US" b="0" dirty="0">
+              <a:effectLst/>
+              <a:latin typeface="+mn-lt"/>
+            </a:endParaRPr>
+          </a:p>
+          <a:p>
+            <a:pPr lvl="1"/>
+            <a:r>
+              <a:rPr lang="en-US" b="0" dirty="0">
+                <a:solidFill>
+                  <a:srgbClr val="569CD6"/>
+                </a:solidFill>
+                <a:effectLst/>
+                <a:latin typeface="Menlo" panose="020B0609030804020204" pitchFamily="49" charset="0"/>
+              </a:rPr>
+              <a:t>unsigned int</a:t>
+            </a:r>
+            <a:r>
+              <a:rPr lang="en-US" b="0" dirty="0">
+                <a:solidFill>
+                  <a:srgbClr val="CCCCCC"/>
+                </a:solidFill>
+                <a:effectLst/>
+                <a:latin typeface="Menlo" panose="020B0609030804020204" pitchFamily="49" charset="0"/>
+              </a:rPr>
+              <a:t> </a:t>
+            </a:r>
+            <a:r>
+              <a:rPr lang="en-US" b="0" dirty="0" err="1">
+                <a:solidFill>
+                  <a:srgbClr val="CCCCCC"/>
+                </a:solidFill>
+                <a:effectLst/>
+                <a:latin typeface="Menlo" panose="020B0609030804020204" pitchFamily="49" charset="0"/>
+              </a:rPr>
+              <a:t>current_integer_count</a:t>
+            </a:r>
+            <a:r>
+              <a:rPr lang="en-US" b="0" dirty="0">
+                <a:solidFill>
+                  <a:srgbClr val="CCCCCC"/>
+                </a:solidFill>
+                <a:effectLst/>
+                <a:latin typeface="Menlo" panose="020B0609030804020204" pitchFamily="49" charset="0"/>
+              </a:rPr>
+              <a:t> </a:t>
+            </a:r>
+            <a:r>
+              <a:rPr lang="en-US" b="0" dirty="0">
+                <a:solidFill>
+                  <a:srgbClr val="D4D4D4"/>
+                </a:solidFill>
+                <a:effectLst/>
+                <a:latin typeface="Menlo" panose="020B0609030804020204" pitchFamily="49" charset="0"/>
+              </a:rPr>
+              <a:t>=</a:t>
+            </a:r>
+            <a:r>
+              <a:rPr lang="en-US" b="0" dirty="0">
+                <a:solidFill>
+                  <a:srgbClr val="CCCCCC"/>
+                </a:solidFill>
+                <a:effectLst/>
+                <a:latin typeface="Menlo" panose="020B0609030804020204" pitchFamily="49" charset="0"/>
+              </a:rPr>
+              <a:t> </a:t>
+            </a:r>
+            <a:r>
+              <a:rPr lang="en-US" b="0" dirty="0">
+                <a:solidFill>
+                  <a:srgbClr val="B5CEA8"/>
+                </a:solidFill>
+                <a:effectLst/>
+                <a:latin typeface="Menlo" panose="020B0609030804020204" pitchFamily="49" charset="0"/>
+              </a:rPr>
+              <a:t>1</a:t>
+            </a:r>
+            <a:r>
+              <a:rPr lang="en-US" b="0" dirty="0">
+                <a:solidFill>
+                  <a:srgbClr val="CCCCCC"/>
+                </a:solidFill>
+                <a:effectLst/>
+                <a:latin typeface="Menlo" panose="020B0609030804020204" pitchFamily="49" charset="0"/>
+              </a:rPr>
+              <a:t>;</a:t>
+            </a:r>
+          </a:p>
+          <a:p>
+            <a:pPr lvl="2"/>
+            <a:r>
+              <a:rPr lang="en-US" b="0" dirty="0">
+                <a:effectLst/>
+                <a:latin typeface="+mn-lt"/>
+              </a:rPr>
+              <a:t>Tracks </a:t>
+            </a:r>
+            <a:r>
+              <a:rPr lang="en-US" dirty="0">
+                <a:latin typeface="+mn-lt"/>
+              </a:rPr>
+              <a:t>how many times an integer is returned</a:t>
+            </a:r>
+            <a:endParaRPr lang="en-US" b="0" dirty="0">
+              <a:effectLst/>
+              <a:latin typeface="+mn-lt"/>
+            </a:endParaRPr>
+          </a:p>
+          <a:p>
+            <a:pPr lvl="2"/>
+            <a:endParaRPr lang="en-US" b="0" dirty="0">
+              <a:solidFill>
+                <a:srgbClr val="CCCCCC"/>
+              </a:solidFill>
+              <a:effectLst/>
+              <a:latin typeface="Menlo" panose="020B0609030804020204" pitchFamily="49" charset="0"/>
+            </a:endParaRPr>
+          </a:p>
+        </p:txBody>
+      </p:sp>
+    </p:spTree>
+    <p:extLst>
+      <p:ext uri="{BB962C8B-B14F-4D97-AF65-F5344CB8AC3E}">
+        <p14:creationId xmlns:p14="http://schemas.microsoft.com/office/powerpoint/2010/main" val="3292432145"/>
+      </p:ext>
+    </p:extLst>
+  </p:cSld>
+  <p:clrMapOvr>
+    <a:masterClrMapping/>
+  </p:clrMapOvr>
+</p:sld>
+</file>
+
+<file path=ppt/slides/slide11.xml><?xml version="1.0" encoding="utf-8"?>
+<p:sld xmlns:a="http://schemas.openxmlformats.org/drawingml/2006/main" xmlns:r="http://schemas.openxmlformats.org/officeDocument/2006/relationships" xmlns:p="http://schemas.openxmlformats.org/presentationml/2006/main">
+  <p:cSld>
+    <p:spTree>
+      <p:nvGrpSpPr>
+        <p:cNvPr id="1" name=""/>
+        <p:cNvGrpSpPr/>
+        <p:nvPr/>
+      </p:nvGrpSpPr>
+      <p:grpSpPr>
+        <a:xfrm>
+          <a:off x="0" y="0"/>
+          <a:ext cx="0" cy="0"/>
+          <a:chOff x="0" y="0"/>
+          <a:chExt cx="0" cy="0"/>
+        </a:xfrm>
+      </p:grpSpPr>
+      <p:sp>
+        <p:nvSpPr>
+          <p:cNvPr id="2" name="Title 1">
+            <a:extLst>
+              <a:ext uri="{FF2B5EF4-FFF2-40B4-BE49-F238E27FC236}">
                 <a16:creationId xmlns:a16="http://schemas.microsoft.com/office/drawing/2014/main" id="{5C4BEBBC-274C-7410-E07A-B4D741EA8A86}"/>
               </a:ext>
             </a:extLst>
@@ -6997,7 +7729,7 @@
 </p:sld>
 </file>
 
-<file path=ppt/slides/slide11.xml><?xml version="1.0" encoding="utf-8"?>
+<file path=ppt/slides/slide12.xml><?xml version="1.0" encoding="utf-8"?>
 <p:sld xmlns:a="http://schemas.openxmlformats.org/drawingml/2006/main" xmlns:r="http://schemas.openxmlformats.org/officeDocument/2006/relationships" xmlns:p="http://schemas.openxmlformats.org/presentationml/2006/main">
   <p:cSld>
     <p:spTree>
@@ -7783,7 +8515,7 @@
 </p:sld>
 </file>
 
-<file path=ppt/slides/slide12.xml><?xml version="1.0" encoding="utf-8"?>
+<file path=ppt/slides/slide13.xml><?xml version="1.0" encoding="utf-8"?>
 <p:sld xmlns:a="http://schemas.openxmlformats.org/drawingml/2006/main" xmlns:r="http://schemas.openxmlformats.org/officeDocument/2006/relationships" xmlns:p="http://schemas.openxmlformats.org/presentationml/2006/main">
   <p:cSld>
     <p:spTree>
@@ -8122,7 +8854,7 @@
 </p:sld>
 </file>
 
-<file path=ppt/slides/slide13.xml><?xml version="1.0" encoding="utf-8"?>
+<file path=ppt/slides/slide14.xml><?xml version="1.0" encoding="utf-8"?>
 <p:sld xmlns:a="http://schemas.openxmlformats.org/drawingml/2006/main" xmlns:r="http://schemas.openxmlformats.org/officeDocument/2006/relationships" xmlns:p="http://schemas.openxmlformats.org/presentationml/2006/main">
   <p:cSld>
     <p:spTree>
@@ -8534,7 +9266,7 @@
 </p:sld>
 </file>
 
-<file path=ppt/slides/slide14.xml><?xml version="1.0" encoding="utf-8"?>
+<file path=ppt/slides/slide15.xml><?xml version="1.0" encoding="utf-8"?>
 <p:sld xmlns:a="http://schemas.openxmlformats.org/drawingml/2006/main" xmlns:r="http://schemas.openxmlformats.org/officeDocument/2006/relationships" xmlns:p="http://schemas.openxmlformats.org/presentationml/2006/main">
   <p:cSld>
     <p:spTree>
@@ -9946,7 +10678,7 @@
 </p:sld>
 </file>
 
-<file path=ppt/slides/slide15.xml><?xml version="1.0" encoding="utf-8"?>
+<file path=ppt/slides/slide16.xml><?xml version="1.0" encoding="utf-8"?>
 <p:sld xmlns:a="http://schemas.openxmlformats.org/drawingml/2006/main" xmlns:r="http://schemas.openxmlformats.org/officeDocument/2006/relationships" xmlns:p="http://schemas.openxmlformats.org/presentationml/2006/main">
   <p:cSld>
     <p:spTree>
@@ -10551,7 +11283,7 @@
 </p:sld>
 </file>
 
-<file path=ppt/slides/slide16.xml><?xml version="1.0" encoding="utf-8"?>
+<file path=ppt/slides/slide17.xml><?xml version="1.0" encoding="utf-8"?>
 <p:sld xmlns:a="http://schemas.openxmlformats.org/drawingml/2006/main" xmlns:r="http://schemas.openxmlformats.org/officeDocument/2006/relationships" xmlns:p="http://schemas.openxmlformats.org/presentationml/2006/main">
   <p:cSld>
     <p:spTree>
@@ -10973,7 +11705,7 @@
 </p:sld>
 </file>
 
-<file path=ppt/slides/slide17.xml><?xml version="1.0" encoding="utf-8"?>
+<file path=ppt/slides/slide18.xml><?xml version="1.0" encoding="utf-8"?>
 <p:sld xmlns:a="http://schemas.openxmlformats.org/drawingml/2006/main" xmlns:r="http://schemas.openxmlformats.org/officeDocument/2006/relationships" xmlns:p="http://schemas.openxmlformats.org/presentationml/2006/main">
   <p:cSld>
     <p:spTree>
@@ -12323,37 +13055,17 @@
                 <a:effectLst/>
                 <a:latin typeface="Menlo" panose="020B0609030804020204" pitchFamily="49" charset="0"/>
               </a:rPr>
-              <a:t>unsigned</a:t>
-            </a:r>
-            <a:r>
-              <a:rPr lang="en-US" b="0" dirty="0">
-                <a:solidFill>
-                  <a:srgbClr val="CCCCCC"/>
-                </a:solidFill>
-                <a:effectLst/>
-                <a:latin typeface="Menlo" panose="020B0609030804020204" pitchFamily="49" charset="0"/>
-              </a:rPr>
-              <a:t> </a:t>
-            </a:r>
-            <a:r>
-              <a:rPr lang="en-US" b="0" dirty="0">
-                <a:solidFill>
-                  <a:srgbClr val="569CD6"/>
-                </a:solidFill>
-                <a:effectLst/>
-                <a:latin typeface="Menlo" panose="020B0609030804020204" pitchFamily="49" charset="0"/>
-              </a:rPr>
-              <a:t>int</a:t>
-            </a:r>
-            <a:r>
-              <a:rPr lang="en-US" b="0" dirty="0">
-                <a:solidFill>
-                  <a:srgbClr val="CCCCCC"/>
-                </a:solidFill>
-                <a:effectLst/>
-                <a:latin typeface="Menlo" panose="020B0609030804020204" pitchFamily="49" charset="0"/>
-              </a:rPr>
-              <a:t> width_;</a:t>
+              <a:t>unsigned int </a:t>
+            </a:r>
+            <a:r>
+              <a:rPr lang="en-US" b="0" dirty="0">
+                <a:solidFill>
+                  <a:srgbClr val="CCCCCC"/>
+                </a:solidFill>
+                <a:effectLst/>
+                <a:latin typeface="Menlo" panose="020B0609030804020204" pitchFamily="49" charset="0"/>
+              </a:rPr>
+              <a:t>width_;</a:t>
             </a:r>
           </a:p>
           <a:p>
@@ -12576,37 +13288,7 @@
                 <a:effectLst/>
                 <a:latin typeface="Menlo" panose="020B0609030804020204" pitchFamily="49" charset="0"/>
               </a:rPr>
-              <a:t>unsigned</a:t>
-            </a:r>
-            <a:r>
-              <a:rPr lang="en-US" b="0" dirty="0">
-                <a:solidFill>
-                  <a:srgbClr val="CCCCCC"/>
-                </a:solidFill>
-                <a:effectLst/>
-                <a:latin typeface="Menlo" panose="020B0609030804020204" pitchFamily="49" charset="0"/>
-              </a:rPr>
-              <a:t> </a:t>
-            </a:r>
-            <a:r>
-              <a:rPr lang="en-US" b="0" dirty="0">
-                <a:solidFill>
-                  <a:srgbClr val="569CD6"/>
-                </a:solidFill>
-                <a:effectLst/>
-                <a:latin typeface="Menlo" panose="020B0609030804020204" pitchFamily="49" charset="0"/>
-              </a:rPr>
-              <a:t>int</a:t>
-            </a:r>
-            <a:r>
-              <a:rPr lang="en-US" b="0" dirty="0">
-                <a:solidFill>
-                  <a:srgbClr val="CCCCCC"/>
-                </a:solidFill>
-                <a:effectLst/>
-                <a:latin typeface="Menlo" panose="020B0609030804020204" pitchFamily="49" charset="0"/>
-              </a:rPr>
-              <a:t> </a:t>
+              <a:t>long </a:t>
             </a:r>
             <a:r>
               <a:rPr lang="en-US" b="0" dirty="0">
@@ -13961,6 +14643,406 @@
           <p:cNvPr id="2" name="Title 1">
             <a:extLst>
               <a:ext uri="{FF2B5EF4-FFF2-40B4-BE49-F238E27FC236}">
+                <a16:creationId xmlns:a16="http://schemas.microsoft.com/office/drawing/2014/main" id="{D9C52B29-5BF9-6459-53DD-2A15930C0954}"/>
+              </a:ext>
+            </a:extLst>
+          </p:cNvPr>
+          <p:cNvSpPr>
+            <a:spLocks noGrp="1"/>
+          </p:cNvSpPr>
+          <p:nvPr>
+            <p:ph type="title"/>
+          </p:nvPr>
+        </p:nvSpPr>
+        <p:spPr/>
+        <p:txBody>
+          <a:bodyPr/>
+          <a:lstStyle/>
+          <a:p>
+            <a:r>
+              <a:rPr lang="en-US" dirty="0"/>
+              <a:t>Overflow Protection</a:t>
+            </a:r>
+          </a:p>
+        </p:txBody>
+      </p:sp>
+      <p:sp>
+        <p:nvSpPr>
+          <p:cNvPr id="5" name="Content Placeholder 4">
+            <a:extLst>
+              <a:ext uri="{FF2B5EF4-FFF2-40B4-BE49-F238E27FC236}">
+                <a16:creationId xmlns:a16="http://schemas.microsoft.com/office/drawing/2014/main" id="{94F53083-D2E6-B802-AE8E-50842B1DA877}"/>
+              </a:ext>
+            </a:extLst>
+          </p:cNvPr>
+          <p:cNvSpPr>
+            <a:spLocks noGrp="1"/>
+          </p:cNvSpPr>
+          <p:nvPr>
+            <p:ph idx="1"/>
+          </p:nvPr>
+        </p:nvSpPr>
+        <p:spPr>
+          <a:xfrm>
+            <a:off x="1103312" y="2052918"/>
+            <a:ext cx="8255177" cy="4195481"/>
+          </a:xfrm>
+        </p:spPr>
+        <p:txBody>
+          <a:bodyPr>
+            <a:normAutofit/>
+          </a:bodyPr>
+          <a:lstStyle/>
+          <a:p>
+            <a:r>
+              <a:rPr lang="en-US" dirty="0">
+                <a:latin typeface="+mn-lt"/>
+              </a:rPr>
+              <a:t>Function is invoked during member initialization</a:t>
+            </a:r>
+            <a:endParaRPr lang="en-US" b="0" dirty="0">
+              <a:effectLst/>
+              <a:latin typeface="+mn-lt"/>
+            </a:endParaRPr>
+          </a:p>
+          <a:p>
+            <a:r>
+              <a:rPr lang="en-US" dirty="0"/>
+              <a:t>Width = upper bound – lower bound + 1</a:t>
+            </a:r>
+          </a:p>
+          <a:p>
+            <a:pPr lvl="1"/>
+            <a:r>
+              <a:rPr lang="en-US" dirty="0"/>
+              <a:t>Accounts for 0 	</a:t>
+            </a:r>
+            <a:r>
+              <a:rPr lang="en-US" b="0" dirty="0">
+                <a:solidFill>
+                  <a:srgbClr val="6A9955"/>
+                </a:solidFill>
+                <a:effectLst/>
+                <a:latin typeface="Menlo" panose="020B0609030804020204" pitchFamily="49" charset="0"/>
+              </a:rPr>
+              <a:t>// [-2, -1, 0, 1, 2] width == 5</a:t>
+            </a:r>
+            <a:endParaRPr lang="en-US" b="0" dirty="0">
+              <a:solidFill>
+                <a:srgbClr val="569CD6"/>
+              </a:solidFill>
+              <a:effectLst/>
+              <a:latin typeface="Menlo" panose="020B0609030804020204" pitchFamily="49" charset="0"/>
+            </a:endParaRPr>
+          </a:p>
+          <a:p>
+            <a:r>
+              <a:rPr lang="en-US" b="0" dirty="0">
+                <a:solidFill>
+                  <a:srgbClr val="569CD6"/>
+                </a:solidFill>
+                <a:effectLst/>
+                <a:latin typeface="Menlo" panose="020B0609030804020204" pitchFamily="49" charset="0"/>
+              </a:rPr>
+              <a:t>unsigned</a:t>
+            </a:r>
+            <a:r>
+              <a:rPr lang="en-US" b="0" dirty="0">
+                <a:solidFill>
+                  <a:srgbClr val="CCCCCC"/>
+                </a:solidFill>
+                <a:effectLst/>
+                <a:latin typeface="Menlo" panose="020B0609030804020204" pitchFamily="49" charset="0"/>
+              </a:rPr>
+              <a:t> </a:t>
+            </a:r>
+            <a:r>
+              <a:rPr lang="en-US" b="0" dirty="0">
+                <a:solidFill>
+                  <a:srgbClr val="569CD6"/>
+                </a:solidFill>
+                <a:effectLst/>
+                <a:latin typeface="Menlo" panose="020B0609030804020204" pitchFamily="49" charset="0"/>
+              </a:rPr>
+              <a:t>int</a:t>
+            </a:r>
+            <a:r>
+              <a:rPr lang="en-US" b="0" dirty="0">
+                <a:solidFill>
+                  <a:srgbClr val="CCCCCC"/>
+                </a:solidFill>
+                <a:effectLst/>
+                <a:latin typeface="Menlo" panose="020B0609030804020204" pitchFamily="49" charset="0"/>
+              </a:rPr>
+              <a:t> </a:t>
+            </a:r>
+            <a:r>
+              <a:rPr lang="en-US" b="0" dirty="0" err="1">
+                <a:solidFill>
+                  <a:srgbClr val="DCDCAA"/>
+                </a:solidFill>
+                <a:effectLst/>
+                <a:latin typeface="Menlo" panose="020B0609030804020204" pitchFamily="49" charset="0"/>
+              </a:rPr>
+              <a:t>calculate_width</a:t>
+            </a:r>
+            <a:r>
+              <a:rPr lang="en-US" b="0" dirty="0">
+                <a:solidFill>
+                  <a:srgbClr val="DCDCAA"/>
+                </a:solidFill>
+                <a:effectLst/>
+                <a:latin typeface="Menlo" panose="020B0609030804020204" pitchFamily="49" charset="0"/>
+              </a:rPr>
+              <a:t>_</a:t>
+            </a:r>
+            <a:r>
+              <a:rPr lang="en-US" b="0" dirty="0">
+                <a:solidFill>
+                  <a:srgbClr val="CCCCCC"/>
+                </a:solidFill>
+                <a:effectLst/>
+                <a:latin typeface="Menlo" panose="020B0609030804020204" pitchFamily="49" charset="0"/>
+              </a:rPr>
+              <a:t>(</a:t>
+            </a:r>
+            <a:r>
+              <a:rPr lang="en-US" b="0" dirty="0">
+                <a:solidFill>
+                  <a:srgbClr val="569CD6"/>
+                </a:solidFill>
+                <a:effectLst/>
+                <a:latin typeface="Menlo" panose="020B0609030804020204" pitchFamily="49" charset="0"/>
+              </a:rPr>
+              <a:t>int</a:t>
+            </a:r>
+            <a:r>
+              <a:rPr lang="en-US" b="0" dirty="0">
+                <a:solidFill>
+                  <a:srgbClr val="CCCCCC"/>
+                </a:solidFill>
+                <a:effectLst/>
+                <a:latin typeface="Menlo" panose="020B0609030804020204" pitchFamily="49" charset="0"/>
+              </a:rPr>
+              <a:t>, </a:t>
+            </a:r>
+            <a:r>
+              <a:rPr lang="en-US" b="0" dirty="0">
+                <a:solidFill>
+                  <a:srgbClr val="569CD6"/>
+                </a:solidFill>
+                <a:effectLst/>
+                <a:latin typeface="Menlo" panose="020B0609030804020204" pitchFamily="49" charset="0"/>
+              </a:rPr>
+              <a:t>int</a:t>
+            </a:r>
+            <a:r>
+              <a:rPr lang="en-US" b="0" dirty="0">
+                <a:solidFill>
+                  <a:srgbClr val="CCCCCC"/>
+                </a:solidFill>
+                <a:effectLst/>
+                <a:latin typeface="Menlo" panose="020B0609030804020204" pitchFamily="49" charset="0"/>
+              </a:rPr>
+              <a:t>) </a:t>
+            </a:r>
+            <a:r>
+              <a:rPr lang="en-US" b="0" dirty="0">
+                <a:solidFill>
+                  <a:srgbClr val="569CD6"/>
+                </a:solidFill>
+                <a:effectLst/>
+                <a:latin typeface="Menlo" panose="020B0609030804020204" pitchFamily="49" charset="0"/>
+              </a:rPr>
+              <a:t>const</a:t>
+            </a:r>
+            <a:r>
+              <a:rPr lang="en-US" b="0" dirty="0">
+                <a:solidFill>
+                  <a:srgbClr val="CCCCCC"/>
+                </a:solidFill>
+                <a:effectLst/>
+                <a:latin typeface="Menlo" panose="020B0609030804020204" pitchFamily="49" charset="0"/>
+              </a:rPr>
+              <a:t>;</a:t>
+            </a:r>
+          </a:p>
+          <a:p>
+            <a:pPr lvl="1"/>
+            <a:r>
+              <a:rPr lang="en-US" b="0" dirty="0">
+                <a:solidFill>
+                  <a:srgbClr val="569CD6"/>
+                </a:solidFill>
+                <a:effectLst/>
+                <a:latin typeface="Menlo" panose="020B0609030804020204" pitchFamily="49" charset="0"/>
+              </a:rPr>
+              <a:t>unsigned</a:t>
+            </a:r>
+            <a:r>
+              <a:rPr lang="en-US" b="0" dirty="0">
+                <a:solidFill>
+                  <a:srgbClr val="CCCCCC"/>
+                </a:solidFill>
+                <a:effectLst/>
+                <a:latin typeface="Menlo" panose="020B0609030804020204" pitchFamily="49" charset="0"/>
+              </a:rPr>
+              <a:t> </a:t>
+            </a:r>
+            <a:r>
+              <a:rPr lang="en-US" b="0" dirty="0">
+                <a:solidFill>
+                  <a:srgbClr val="569CD6"/>
+                </a:solidFill>
+                <a:effectLst/>
+                <a:latin typeface="Menlo" panose="020B0609030804020204" pitchFamily="49" charset="0"/>
+              </a:rPr>
+              <a:t>int</a:t>
+            </a:r>
+            <a:r>
+              <a:rPr lang="en-US" b="0" dirty="0">
+                <a:solidFill>
+                  <a:srgbClr val="CCCCCC"/>
+                </a:solidFill>
+                <a:effectLst/>
+                <a:latin typeface="Menlo" panose="020B0609030804020204" pitchFamily="49" charset="0"/>
+              </a:rPr>
+              <a:t> </a:t>
+            </a:r>
+            <a:r>
+              <a:rPr lang="en-US" dirty="0">
+                <a:latin typeface="+mn-lt"/>
+              </a:rPr>
+              <a:t>Checks that lower bound &lt;= upper bound</a:t>
+            </a:r>
+          </a:p>
+          <a:p>
+            <a:pPr lvl="1"/>
+            <a:r>
+              <a:rPr lang="en-US" dirty="0">
+                <a:latin typeface="+mn-lt"/>
+              </a:rPr>
+              <a:t>Subtracts lower bound from upper bound using GNU built-in arithmetic function that checks for overflow</a:t>
+            </a:r>
+          </a:p>
+          <a:p>
+            <a:pPr lvl="1"/>
+            <a:r>
+              <a:rPr lang="en-US" dirty="0">
+                <a:latin typeface="+mn-lt"/>
+              </a:rPr>
+              <a:t>Returns resulting </a:t>
+            </a:r>
+            <a:r>
+              <a:rPr lang="en-US" b="0" dirty="0">
+                <a:solidFill>
+                  <a:srgbClr val="569CD6"/>
+                </a:solidFill>
+                <a:effectLst/>
+                <a:latin typeface="Menlo" panose="020B0609030804020204" pitchFamily="49" charset="0"/>
+              </a:rPr>
+              <a:t>unsigned</a:t>
+            </a:r>
+            <a:r>
+              <a:rPr lang="en-US" b="0" dirty="0">
+                <a:solidFill>
+                  <a:srgbClr val="CCCCCC"/>
+                </a:solidFill>
+                <a:effectLst/>
+                <a:latin typeface="Menlo" panose="020B0609030804020204" pitchFamily="49" charset="0"/>
+              </a:rPr>
+              <a:t> </a:t>
+            </a:r>
+            <a:r>
+              <a:rPr lang="en-US" b="0" dirty="0">
+                <a:solidFill>
+                  <a:srgbClr val="569CD6"/>
+                </a:solidFill>
+                <a:effectLst/>
+                <a:latin typeface="Menlo" panose="020B0609030804020204" pitchFamily="49" charset="0"/>
+              </a:rPr>
+              <a:t>int</a:t>
+            </a:r>
+          </a:p>
+          <a:p>
+            <a:r>
+              <a:rPr lang="en-US" dirty="0">
+                <a:latin typeface="+mn-lt"/>
+              </a:rPr>
+              <a:t>Bound limits</a:t>
+            </a:r>
+            <a:r>
+              <a:rPr lang="en-US">
+                <a:latin typeface="+mn-lt"/>
+              </a:rPr>
+              <a:t>: INT</a:t>
+            </a:r>
+            <a:r>
+              <a:rPr lang="en-US" dirty="0">
+                <a:latin typeface="+mn-lt"/>
+              </a:rPr>
+              <a:t>_MIN + </a:t>
+            </a:r>
+            <a:r>
+              <a:rPr lang="en-US">
+                <a:latin typeface="+mn-lt"/>
+              </a:rPr>
+              <a:t>1 to </a:t>
+            </a:r>
+            <a:r>
+              <a:rPr lang="en-US" dirty="0">
+                <a:latin typeface="+mn-lt"/>
+              </a:rPr>
+              <a:t>INT</a:t>
+            </a:r>
+            <a:r>
+              <a:rPr lang="en-US">
+                <a:latin typeface="+mn-lt"/>
+              </a:rPr>
+              <a:t>_MAX</a:t>
+            </a:r>
+            <a:endParaRPr lang="en-US" b="0" dirty="0">
+              <a:effectLst/>
+              <a:latin typeface="+mn-lt"/>
+            </a:endParaRPr>
+          </a:p>
+        </p:txBody>
+      </p:sp>
+    </p:spTree>
+    <p:extLst>
+      <p:ext uri="{BB962C8B-B14F-4D97-AF65-F5344CB8AC3E}">
+        <p14:creationId xmlns:p14="http://schemas.microsoft.com/office/powerpoint/2010/main" val="1770205814"/>
+      </p:ext>
+    </p:extLst>
+  </p:cSld>
+  <p:clrMapOvr>
+    <a:masterClrMapping/>
+  </p:clrMapOvr>
+</p:sld>
+</file>
+
+<file path=ppt/slides/slide7.xml><?xml version="1.0" encoding="utf-8"?>
+<p:sld xmlns:a="http://schemas.openxmlformats.org/drawingml/2006/main" xmlns:r="http://schemas.openxmlformats.org/officeDocument/2006/relationships" xmlns:p="http://schemas.openxmlformats.org/presentationml/2006/main">
+  <p:cSld>
+    <p:spTree>
+      <p:nvGrpSpPr>
+        <p:cNvPr id="1" name=""/>
+        <p:cNvGrpSpPr/>
+        <p:nvPr/>
+      </p:nvGrpSpPr>
+      <p:grpSpPr>
+        <a:xfrm>
+          <a:off x="0" y="0"/>
+          <a:ext cx="0" cy="0"/>
+          <a:chOff x="0" y="0"/>
+          <a:chExt cx="0" cy="0"/>
+        </a:xfrm>
+      </p:grpSpPr>
+      <p:sp>
+        <p:nvSpPr>
+          <p:cNvPr id="2" name="Title 1">
+            <a:extLst>
+              <a:ext uri="{FF2B5EF4-FFF2-40B4-BE49-F238E27FC236}">
                 <a16:creationId xmlns:a16="http://schemas.microsoft.com/office/drawing/2014/main" id="{CBF18A5C-DBB4-E340-3346-BA306A711589}"/>
               </a:ext>
             </a:extLst>
@@ -14583,7 +15665,7 @@
 </p:sld>
 </file>
 
-<file path=ppt/slides/slide7.xml><?xml version="1.0" encoding="utf-8"?>
+<file path=ppt/slides/slide8.xml><?xml version="1.0" encoding="utf-8"?>
 <p:sld xmlns:a="http://schemas.openxmlformats.org/drawingml/2006/main" xmlns:r="http://schemas.openxmlformats.org/officeDocument/2006/relationships" xmlns:p="http://schemas.openxmlformats.org/presentationml/2006/main">
   <p:cSld>
     <p:spTree>
@@ -15018,7 +16100,7 @@
 </p:sld>
 </file>
 
-<file path=ppt/slides/slide8.xml><?xml version="1.0" encoding="utf-8"?>
+<file path=ppt/slides/slide9.xml><?xml version="1.0" encoding="utf-8"?>
 <p:sld xmlns:a="http://schemas.openxmlformats.org/drawingml/2006/main" xmlns:r="http://schemas.openxmlformats.org/officeDocument/2006/relationships" xmlns:p="http://schemas.openxmlformats.org/presentationml/2006/main">
   <p:cSld>
     <p:spTree>
@@ -15747,737 +16829,6 @@
     <p:extLst>
       <p:ext uri="{BB962C8B-B14F-4D97-AF65-F5344CB8AC3E}">
         <p14:creationId xmlns:p14="http://schemas.microsoft.com/office/powerpoint/2010/main" val="3029851682"/>
-      </p:ext>
-    </p:extLst>
-  </p:cSld>
-  <p:clrMapOvr>
-    <a:masterClrMapping/>
-  </p:clrMapOvr>
-</p:sld>
-</file>
-
-<file path=ppt/slides/slide9.xml><?xml version="1.0" encoding="utf-8"?>
-<p:sld xmlns:a="http://schemas.openxmlformats.org/drawingml/2006/main" xmlns:r="http://schemas.openxmlformats.org/officeDocument/2006/relationships" xmlns:p="http://schemas.openxmlformats.org/presentationml/2006/main">
-  <p:cSld>
-    <p:spTree>
-      <p:nvGrpSpPr>
-        <p:cNvPr id="1" name=""/>
-        <p:cNvGrpSpPr/>
-        <p:nvPr/>
-      </p:nvGrpSpPr>
-      <p:grpSpPr>
-        <a:xfrm>
-          <a:off x="0" y="0"/>
-          <a:ext cx="0" cy="0"/>
-          <a:chOff x="0" y="0"/>
-          <a:chExt cx="0" cy="0"/>
-        </a:xfrm>
-      </p:grpSpPr>
-      <p:sp>
-        <p:nvSpPr>
-          <p:cNvPr id="2" name="Title 1">
-            <a:extLst>
-              <a:ext uri="{FF2B5EF4-FFF2-40B4-BE49-F238E27FC236}">
-                <a16:creationId xmlns:a16="http://schemas.microsoft.com/office/drawing/2014/main" id="{99F68D1C-5B99-F8B9-CE76-683B28183C9E}"/>
-              </a:ext>
-            </a:extLst>
-          </p:cNvPr>
-          <p:cNvSpPr>
-            <a:spLocks noGrp="1"/>
-          </p:cNvSpPr>
-          <p:nvPr>
-            <p:ph type="title"/>
-          </p:nvPr>
-        </p:nvSpPr>
-        <p:spPr/>
-        <p:txBody>
-          <a:bodyPr/>
-          <a:lstStyle/>
-          <a:p>
-            <a:r>
-              <a:rPr lang="en-US" dirty="0"/>
-              <a:t>Iterator</a:t>
-            </a:r>
-          </a:p>
-        </p:txBody>
-      </p:sp>
-      <p:sp>
-        <p:nvSpPr>
-          <p:cNvPr id="3" name="Content Placeholder 2">
-            <a:extLst>
-              <a:ext uri="{FF2B5EF4-FFF2-40B4-BE49-F238E27FC236}">
-                <a16:creationId xmlns:a16="http://schemas.microsoft.com/office/drawing/2014/main" id="{8FE4A138-FBD9-A4B6-DB5A-8699226D1081}"/>
-              </a:ext>
-            </a:extLst>
-          </p:cNvPr>
-          <p:cNvSpPr>
-            <a:spLocks noGrp="1"/>
-          </p:cNvSpPr>
-          <p:nvPr>
-            <p:ph sz="half" idx="1"/>
-          </p:nvPr>
-        </p:nvSpPr>
-        <p:spPr/>
-        <p:txBody>
-          <a:bodyPr/>
-          <a:lstStyle/>
-          <a:p>
-            <a:r>
-              <a:rPr lang="en-US" b="0" dirty="0">
-                <a:solidFill>
-                  <a:srgbClr val="4EC9B0"/>
-                </a:solidFill>
-                <a:effectLst/>
-                <a:latin typeface="Menlo" panose="020B0609030804020204" pitchFamily="49" charset="0"/>
-              </a:rPr>
-              <a:t>Iterator</a:t>
-            </a:r>
-            <a:r>
-              <a:rPr lang="en-US" b="0" dirty="0">
-                <a:solidFill>
-                  <a:srgbClr val="CCCCCC"/>
-                </a:solidFill>
-                <a:effectLst/>
-                <a:latin typeface="Menlo" panose="020B0609030804020204" pitchFamily="49" charset="0"/>
-              </a:rPr>
-              <a:t> </a:t>
-            </a:r>
-            <a:r>
-              <a:rPr lang="en-US" b="0" dirty="0">
-                <a:solidFill>
-                  <a:srgbClr val="DCDCAA"/>
-                </a:solidFill>
-                <a:effectLst/>
-                <a:latin typeface="Menlo" panose="020B0609030804020204" pitchFamily="49" charset="0"/>
-              </a:rPr>
-              <a:t>begin</a:t>
-            </a:r>
-            <a:r>
-              <a:rPr lang="en-US" b="0" dirty="0">
-                <a:solidFill>
-                  <a:srgbClr val="CCCCCC"/>
-                </a:solidFill>
-                <a:effectLst/>
-                <a:latin typeface="Menlo" panose="020B0609030804020204" pitchFamily="49" charset="0"/>
-              </a:rPr>
-              <a:t>() </a:t>
-            </a:r>
-            <a:r>
-              <a:rPr lang="en-US" b="0" dirty="0">
-                <a:solidFill>
-                  <a:srgbClr val="569CD6"/>
-                </a:solidFill>
-                <a:effectLst/>
-                <a:latin typeface="Menlo" panose="020B0609030804020204" pitchFamily="49" charset="0"/>
-              </a:rPr>
-              <a:t>const</a:t>
-            </a:r>
-            <a:r>
-              <a:rPr lang="en-US" b="0" dirty="0">
-                <a:solidFill>
-                  <a:srgbClr val="CCCCCC"/>
-                </a:solidFill>
-                <a:effectLst/>
-                <a:latin typeface="Menlo" panose="020B0609030804020204" pitchFamily="49" charset="0"/>
-              </a:rPr>
-              <a:t>;</a:t>
-            </a:r>
-          </a:p>
-          <a:p>
-            <a:pPr lvl="1"/>
-            <a:r>
-              <a:rPr lang="en-US" dirty="0"/>
-              <a:t>Return an object of type </a:t>
-            </a:r>
-            <a:r>
-              <a:rPr lang="en-US" b="0" dirty="0" err="1">
-                <a:solidFill>
-                  <a:srgbClr val="4EC9B0"/>
-                </a:solidFill>
-                <a:effectLst/>
-                <a:latin typeface="Menlo" panose="020B0609030804020204" pitchFamily="49" charset="0"/>
-              </a:rPr>
-              <a:t>CountSort</a:t>
-            </a:r>
-            <a:r>
-              <a:rPr lang="en-US" b="0" dirty="0">
-                <a:solidFill>
-                  <a:srgbClr val="CCCCCC"/>
-                </a:solidFill>
-                <a:effectLst/>
-                <a:latin typeface="Menlo" panose="020B0609030804020204" pitchFamily="49" charset="0"/>
-              </a:rPr>
-              <a:t>::</a:t>
-            </a:r>
-            <a:r>
-              <a:rPr lang="en-US" b="0" dirty="0">
-                <a:solidFill>
-                  <a:srgbClr val="4EC9B0"/>
-                </a:solidFill>
-                <a:effectLst/>
-                <a:latin typeface="Menlo" panose="020B0609030804020204" pitchFamily="49" charset="0"/>
-              </a:rPr>
-              <a:t>Iterator</a:t>
-            </a:r>
-            <a:r>
-              <a:rPr lang="en-US" dirty="0">
-                <a:solidFill>
-                  <a:srgbClr val="CCCCCC"/>
-                </a:solidFill>
-                <a:latin typeface="Menlo" panose="020B0609030804020204" pitchFamily="49" charset="0"/>
-              </a:rPr>
-              <a:t> </a:t>
-            </a:r>
-            <a:r>
-              <a:rPr lang="en-US" dirty="0"/>
-              <a:t>that corresponds to the smallest int currently stored in this object.</a:t>
-            </a:r>
-          </a:p>
-          <a:p>
-            <a:r>
-              <a:rPr lang="en-US" b="0" dirty="0">
-                <a:solidFill>
-                  <a:srgbClr val="4EC9B0"/>
-                </a:solidFill>
-                <a:effectLst/>
-                <a:latin typeface="Menlo" panose="020B0609030804020204" pitchFamily="49" charset="0"/>
-              </a:rPr>
-              <a:t>Iterator</a:t>
-            </a:r>
-            <a:r>
-              <a:rPr lang="en-US" b="0" dirty="0">
-                <a:solidFill>
-                  <a:srgbClr val="CCCCCC"/>
-                </a:solidFill>
-                <a:effectLst/>
-                <a:latin typeface="Menlo" panose="020B0609030804020204" pitchFamily="49" charset="0"/>
-              </a:rPr>
-              <a:t> </a:t>
-            </a:r>
-            <a:r>
-              <a:rPr lang="en-US" b="0" dirty="0">
-                <a:solidFill>
-                  <a:srgbClr val="DCDCAA"/>
-                </a:solidFill>
-                <a:effectLst/>
-                <a:latin typeface="Menlo" panose="020B0609030804020204" pitchFamily="49" charset="0"/>
-              </a:rPr>
-              <a:t>end</a:t>
-            </a:r>
-            <a:r>
-              <a:rPr lang="en-US" b="0" dirty="0">
-                <a:solidFill>
-                  <a:srgbClr val="CCCCCC"/>
-                </a:solidFill>
-                <a:effectLst/>
-                <a:latin typeface="Menlo" panose="020B0609030804020204" pitchFamily="49" charset="0"/>
-              </a:rPr>
-              <a:t>() </a:t>
-            </a:r>
-            <a:r>
-              <a:rPr lang="en-US" b="0" dirty="0">
-                <a:solidFill>
-                  <a:srgbClr val="569CD6"/>
-                </a:solidFill>
-                <a:effectLst/>
-                <a:latin typeface="Menlo" panose="020B0609030804020204" pitchFamily="49" charset="0"/>
-              </a:rPr>
-              <a:t>const</a:t>
-            </a:r>
-            <a:r>
-              <a:rPr lang="en-US" b="0" dirty="0">
-                <a:solidFill>
-                  <a:srgbClr val="CCCCCC"/>
-                </a:solidFill>
-                <a:effectLst/>
-                <a:latin typeface="Menlo" panose="020B0609030804020204" pitchFamily="49" charset="0"/>
-              </a:rPr>
-              <a:t>;</a:t>
-            </a:r>
-          </a:p>
-          <a:p>
-            <a:pPr lvl="1"/>
-            <a:r>
-              <a:rPr lang="en-US" dirty="0"/>
-              <a:t>Return an object of type </a:t>
-            </a:r>
-            <a:r>
-              <a:rPr lang="en-US" b="0" dirty="0" err="1">
-                <a:solidFill>
-                  <a:srgbClr val="4EC9B0"/>
-                </a:solidFill>
-                <a:effectLst/>
-                <a:latin typeface="Menlo" panose="020B0609030804020204" pitchFamily="49" charset="0"/>
-              </a:rPr>
-              <a:t>CountSort</a:t>
-            </a:r>
-            <a:r>
-              <a:rPr lang="en-US" b="0" dirty="0">
-                <a:solidFill>
-                  <a:srgbClr val="CCCCCC"/>
-                </a:solidFill>
-                <a:effectLst/>
-                <a:latin typeface="Menlo" panose="020B0609030804020204" pitchFamily="49" charset="0"/>
-              </a:rPr>
-              <a:t>::</a:t>
-            </a:r>
-            <a:r>
-              <a:rPr lang="en-US" b="0" dirty="0">
-                <a:solidFill>
-                  <a:srgbClr val="4EC9B0"/>
-                </a:solidFill>
-                <a:effectLst/>
-                <a:latin typeface="Menlo" panose="020B0609030804020204" pitchFamily="49" charset="0"/>
-              </a:rPr>
-              <a:t>Iterator</a:t>
-            </a:r>
-            <a:r>
-              <a:rPr lang="en-US" dirty="0">
-                <a:solidFill>
-                  <a:srgbClr val="CCCCCC"/>
-                </a:solidFill>
-                <a:latin typeface="Menlo" panose="020B0609030804020204" pitchFamily="49" charset="0"/>
-              </a:rPr>
-              <a:t> </a:t>
-            </a:r>
-            <a:r>
-              <a:rPr lang="en-US" dirty="0"/>
-              <a:t>that corresponds one past the largest </a:t>
-            </a:r>
-            <a:r>
-              <a:rPr lang="en-US" b="0" dirty="0">
-                <a:solidFill>
-                  <a:srgbClr val="569CD6"/>
-                </a:solidFill>
-                <a:effectLst/>
-                <a:latin typeface="Menlo" panose="020B0609030804020204" pitchFamily="49" charset="0"/>
-              </a:rPr>
-              <a:t>int</a:t>
-            </a:r>
-            <a:r>
-              <a:rPr lang="en-US" dirty="0"/>
-              <a:t> currently stored in this object. It does not correspond to the last item, since .</a:t>
-            </a:r>
-            <a:r>
-              <a:rPr lang="en-US" b="0" dirty="0">
-                <a:solidFill>
-                  <a:srgbClr val="DCDCAA"/>
-                </a:solidFill>
-                <a:effectLst/>
-                <a:latin typeface="Menlo" panose="020B0609030804020204" pitchFamily="49" charset="0"/>
-              </a:rPr>
-              <a:t>begin</a:t>
-            </a:r>
-            <a:r>
-              <a:rPr lang="en-US" b="0" dirty="0">
-                <a:solidFill>
-                  <a:srgbClr val="CCCCCC"/>
-                </a:solidFill>
-                <a:effectLst/>
-                <a:latin typeface="Menlo" panose="020B0609030804020204" pitchFamily="49" charset="0"/>
-              </a:rPr>
-              <a:t>() </a:t>
-            </a:r>
-            <a:r>
-              <a:rPr lang="en-US" dirty="0"/>
-              <a:t>&amp; .</a:t>
-            </a:r>
-            <a:r>
-              <a:rPr lang="en-US" b="0" dirty="0">
-                <a:solidFill>
-                  <a:srgbClr val="DCDCAA"/>
-                </a:solidFill>
-                <a:effectLst/>
-                <a:latin typeface="Menlo" panose="020B0609030804020204" pitchFamily="49" charset="0"/>
-              </a:rPr>
-              <a:t>end</a:t>
-            </a:r>
-            <a:r>
-              <a:rPr lang="en-US" b="0" dirty="0">
-                <a:solidFill>
-                  <a:srgbClr val="CCCCCC"/>
-                </a:solidFill>
-                <a:effectLst/>
-                <a:latin typeface="Menlo" panose="020B0609030804020204" pitchFamily="49" charset="0"/>
-              </a:rPr>
-              <a:t>()</a:t>
-            </a:r>
-            <a:r>
-              <a:rPr lang="en-US" dirty="0"/>
-              <a:t> form a half-open interval.</a:t>
-            </a:r>
-          </a:p>
-        </p:txBody>
-      </p:sp>
-      <p:sp>
-        <p:nvSpPr>
-          <p:cNvPr id="4" name="Content Placeholder 3">
-            <a:extLst>
-              <a:ext uri="{FF2B5EF4-FFF2-40B4-BE49-F238E27FC236}">
-                <a16:creationId xmlns:a16="http://schemas.microsoft.com/office/drawing/2014/main" id="{F903C668-3D50-0919-EB7B-D7CBDE1D4B12}"/>
-              </a:ext>
-            </a:extLst>
-          </p:cNvPr>
-          <p:cNvSpPr>
-            <a:spLocks noGrp="1"/>
-          </p:cNvSpPr>
-          <p:nvPr>
-            <p:ph sz="half" idx="2"/>
-          </p:nvPr>
-        </p:nvSpPr>
-        <p:spPr>
-          <a:xfrm>
-            <a:off x="5654493" y="2056092"/>
-            <a:ext cx="5713418" cy="4200245"/>
-          </a:xfrm>
-        </p:spPr>
-        <p:txBody>
-          <a:bodyPr/>
-          <a:lstStyle/>
-          <a:p>
-            <a:r>
-              <a:rPr lang="en-US" b="0" dirty="0">
-                <a:effectLst/>
-                <a:latin typeface="+mn-lt"/>
-              </a:rPr>
-              <a:t>Member variables</a:t>
-            </a:r>
-          </a:p>
-          <a:p>
-            <a:pPr lvl="1"/>
-            <a:r>
-              <a:rPr lang="en-US" b="0" dirty="0">
-                <a:solidFill>
-                  <a:srgbClr val="569CD6"/>
-                </a:solidFill>
-                <a:effectLst/>
-                <a:latin typeface="Menlo" panose="020B0609030804020204" pitchFamily="49" charset="0"/>
-              </a:rPr>
-              <a:t>const</a:t>
-            </a:r>
-            <a:r>
-              <a:rPr lang="en-US" b="0" dirty="0">
-                <a:solidFill>
-                  <a:srgbClr val="CCCCCC"/>
-                </a:solidFill>
-                <a:effectLst/>
-                <a:latin typeface="Menlo" panose="020B0609030804020204" pitchFamily="49" charset="0"/>
-              </a:rPr>
-              <a:t> </a:t>
-            </a:r>
-            <a:r>
-              <a:rPr lang="en-US" b="0" dirty="0" err="1">
-                <a:solidFill>
-                  <a:srgbClr val="CCCCCC"/>
-                </a:solidFill>
-                <a:effectLst/>
-                <a:latin typeface="Menlo" panose="020B0609030804020204" pitchFamily="49" charset="0"/>
-              </a:rPr>
-              <a:t>CountSort</a:t>
-            </a:r>
-            <a:r>
-              <a:rPr lang="en-US" b="0" dirty="0">
-                <a:solidFill>
-                  <a:srgbClr val="CCCCCC"/>
-                </a:solidFill>
-                <a:effectLst/>
-                <a:latin typeface="Menlo" panose="020B0609030804020204" pitchFamily="49" charset="0"/>
-              </a:rPr>
-              <a:t> </a:t>
-            </a:r>
-            <a:r>
-              <a:rPr lang="en-US" b="0" dirty="0">
-                <a:solidFill>
-                  <a:srgbClr val="D4D4D4"/>
-                </a:solidFill>
-                <a:effectLst/>
-                <a:latin typeface="Menlo" panose="020B0609030804020204" pitchFamily="49" charset="0"/>
-              </a:rPr>
-              <a:t>*</a:t>
-            </a:r>
-            <a:r>
-              <a:rPr lang="en-US" b="0" dirty="0">
-                <a:solidFill>
-                  <a:srgbClr val="CCCCCC"/>
-                </a:solidFill>
-                <a:effectLst/>
-                <a:latin typeface="Menlo" panose="020B0609030804020204" pitchFamily="49" charset="0"/>
-              </a:rPr>
-              <a:t>parent;</a:t>
-            </a:r>
-          </a:p>
-          <a:p>
-            <a:pPr lvl="2"/>
-            <a:r>
-              <a:rPr lang="en-US" b="0" dirty="0">
-                <a:effectLst/>
-                <a:latin typeface="+mn-lt"/>
-              </a:rPr>
-              <a:t>Pointer to a </a:t>
-            </a:r>
-            <a:r>
-              <a:rPr lang="en-US" b="0" dirty="0">
-                <a:solidFill>
-                  <a:srgbClr val="569CD6"/>
-                </a:solidFill>
-                <a:effectLst/>
-                <a:latin typeface="Menlo" panose="020B0609030804020204" pitchFamily="49" charset="0"/>
-              </a:rPr>
-              <a:t>const</a:t>
-            </a:r>
-            <a:r>
-              <a:rPr lang="en-US" b="0" dirty="0">
-                <a:effectLst/>
-                <a:latin typeface="+mn-lt"/>
-              </a:rPr>
-              <a:t> </a:t>
-            </a:r>
-            <a:r>
-              <a:rPr lang="en-US" b="0" dirty="0" err="1">
-                <a:solidFill>
-                  <a:srgbClr val="CCCCCC"/>
-                </a:solidFill>
-                <a:effectLst/>
-                <a:latin typeface="Menlo" panose="020B0609030804020204" pitchFamily="49" charset="0"/>
-              </a:rPr>
-              <a:t>CountSort</a:t>
-            </a:r>
-            <a:endParaRPr lang="en-US" b="0" dirty="0">
-              <a:effectLst/>
-              <a:latin typeface="+mn-lt"/>
-            </a:endParaRPr>
-          </a:p>
-          <a:p>
-            <a:pPr lvl="2"/>
-            <a:r>
-              <a:rPr lang="en-US" dirty="0">
-                <a:latin typeface="+mn-lt"/>
-              </a:rPr>
-              <a:t>Not a </a:t>
-            </a:r>
-            <a:r>
-              <a:rPr lang="en-US" b="0" dirty="0">
-                <a:solidFill>
-                  <a:srgbClr val="569CD6"/>
-                </a:solidFill>
-                <a:effectLst/>
-                <a:latin typeface="Menlo" panose="020B0609030804020204" pitchFamily="49" charset="0"/>
-              </a:rPr>
-              <a:t>const</a:t>
-            </a:r>
-            <a:r>
-              <a:rPr lang="en-US" dirty="0">
-                <a:latin typeface="+mn-lt"/>
-              </a:rPr>
-              <a:t> pointer!</a:t>
-            </a:r>
-            <a:endParaRPr lang="en-US" b="0" dirty="0">
-              <a:effectLst/>
-              <a:latin typeface="+mn-lt"/>
-            </a:endParaRPr>
-          </a:p>
-          <a:p>
-            <a:pPr lvl="1"/>
-            <a:r>
-              <a:rPr lang="en-US" b="0" dirty="0">
-                <a:solidFill>
-                  <a:srgbClr val="569CD6"/>
-                </a:solidFill>
-                <a:effectLst/>
-                <a:latin typeface="Menlo" panose="020B0609030804020204" pitchFamily="49" charset="0"/>
-              </a:rPr>
-              <a:t>unsigned</a:t>
-            </a:r>
-            <a:r>
-              <a:rPr lang="en-US" b="0" dirty="0">
-                <a:solidFill>
-                  <a:srgbClr val="CCCCCC"/>
-                </a:solidFill>
-                <a:effectLst/>
-                <a:latin typeface="Menlo" panose="020B0609030804020204" pitchFamily="49" charset="0"/>
-              </a:rPr>
-              <a:t> </a:t>
-            </a:r>
-            <a:r>
-              <a:rPr lang="en-US" b="0" dirty="0">
-                <a:solidFill>
-                  <a:srgbClr val="569CD6"/>
-                </a:solidFill>
-                <a:effectLst/>
-                <a:latin typeface="Menlo" panose="020B0609030804020204" pitchFamily="49" charset="0"/>
-              </a:rPr>
-              <a:t>int</a:t>
-            </a:r>
-            <a:r>
-              <a:rPr lang="en-US" b="0" dirty="0">
-                <a:solidFill>
-                  <a:srgbClr val="CCCCCC"/>
-                </a:solidFill>
-                <a:effectLst/>
-                <a:latin typeface="Menlo" panose="020B0609030804020204" pitchFamily="49" charset="0"/>
-              </a:rPr>
-              <a:t> </a:t>
-            </a:r>
-            <a:r>
-              <a:rPr lang="en-US" b="0" dirty="0" err="1">
-                <a:solidFill>
-                  <a:srgbClr val="CCCCCC"/>
-                </a:solidFill>
-                <a:effectLst/>
-                <a:latin typeface="Menlo" panose="020B0609030804020204" pitchFamily="49" charset="0"/>
-              </a:rPr>
-              <a:t>integer_index</a:t>
-            </a:r>
-            <a:r>
-              <a:rPr lang="en-US" b="0" dirty="0">
-                <a:solidFill>
-                  <a:srgbClr val="CCCCCC"/>
-                </a:solidFill>
-                <a:effectLst/>
-                <a:latin typeface="Menlo" panose="020B0609030804020204" pitchFamily="49" charset="0"/>
-              </a:rPr>
-              <a:t>;</a:t>
-            </a:r>
-          </a:p>
-          <a:p>
-            <a:pPr lvl="2"/>
-            <a:r>
-              <a:rPr lang="en-US" b="0" dirty="0">
-                <a:effectLst/>
-                <a:latin typeface="+mn-lt"/>
-              </a:rPr>
-              <a:t>Tracks </a:t>
-            </a:r>
-            <a:r>
-              <a:rPr lang="en-US" dirty="0">
-                <a:latin typeface="+mn-lt"/>
-              </a:rPr>
-              <a:t>which integer is returned</a:t>
-            </a:r>
-            <a:endParaRPr lang="en-US" b="0" dirty="0">
-              <a:effectLst/>
-              <a:latin typeface="+mn-lt"/>
-            </a:endParaRPr>
-          </a:p>
-          <a:p>
-            <a:pPr lvl="1"/>
-            <a:r>
-              <a:rPr lang="en-US" b="0" dirty="0">
-                <a:solidFill>
-                  <a:srgbClr val="569CD6"/>
-                </a:solidFill>
-                <a:effectLst/>
-                <a:latin typeface="Menlo" panose="020B0609030804020204" pitchFamily="49" charset="0"/>
-              </a:rPr>
-              <a:t>unsigned int</a:t>
-            </a:r>
-            <a:r>
-              <a:rPr lang="en-US" b="0" dirty="0">
-                <a:solidFill>
-                  <a:srgbClr val="CCCCCC"/>
-                </a:solidFill>
-                <a:effectLst/>
-                <a:latin typeface="Menlo" panose="020B0609030804020204" pitchFamily="49" charset="0"/>
-              </a:rPr>
-              <a:t> </a:t>
-            </a:r>
-            <a:r>
-              <a:rPr lang="en-US" b="0" dirty="0" err="1">
-                <a:solidFill>
-                  <a:srgbClr val="CCCCCC"/>
-                </a:solidFill>
-                <a:effectLst/>
-                <a:latin typeface="Menlo" panose="020B0609030804020204" pitchFamily="49" charset="0"/>
-              </a:rPr>
-              <a:t>current_integer_count</a:t>
-            </a:r>
-            <a:r>
-              <a:rPr lang="en-US" b="0" dirty="0">
-                <a:solidFill>
-                  <a:srgbClr val="CCCCCC"/>
-                </a:solidFill>
-                <a:effectLst/>
-                <a:latin typeface="Menlo" panose="020B0609030804020204" pitchFamily="49" charset="0"/>
-              </a:rPr>
-              <a:t> </a:t>
-            </a:r>
-            <a:r>
-              <a:rPr lang="en-US" b="0" dirty="0">
-                <a:solidFill>
-                  <a:srgbClr val="D4D4D4"/>
-                </a:solidFill>
-                <a:effectLst/>
-                <a:latin typeface="Menlo" panose="020B0609030804020204" pitchFamily="49" charset="0"/>
-              </a:rPr>
-              <a:t>=</a:t>
-            </a:r>
-            <a:r>
-              <a:rPr lang="en-US" b="0" dirty="0">
-                <a:solidFill>
-                  <a:srgbClr val="CCCCCC"/>
-                </a:solidFill>
-                <a:effectLst/>
-                <a:latin typeface="Menlo" panose="020B0609030804020204" pitchFamily="49" charset="0"/>
-              </a:rPr>
-              <a:t> </a:t>
-            </a:r>
-            <a:r>
-              <a:rPr lang="en-US" b="0" dirty="0">
-                <a:solidFill>
-                  <a:srgbClr val="B5CEA8"/>
-                </a:solidFill>
-                <a:effectLst/>
-                <a:latin typeface="Menlo" panose="020B0609030804020204" pitchFamily="49" charset="0"/>
-              </a:rPr>
-              <a:t>1</a:t>
-            </a:r>
-            <a:r>
-              <a:rPr lang="en-US" b="0" dirty="0">
-                <a:solidFill>
-                  <a:srgbClr val="CCCCCC"/>
-                </a:solidFill>
-                <a:effectLst/>
-                <a:latin typeface="Menlo" panose="020B0609030804020204" pitchFamily="49" charset="0"/>
-              </a:rPr>
-              <a:t>;</a:t>
-            </a:r>
-          </a:p>
-          <a:p>
-            <a:pPr lvl="2"/>
-            <a:r>
-              <a:rPr lang="en-US" b="0" dirty="0">
-                <a:effectLst/>
-                <a:latin typeface="+mn-lt"/>
-              </a:rPr>
-              <a:t>Tracks </a:t>
-            </a:r>
-            <a:r>
-              <a:rPr lang="en-US" dirty="0">
-                <a:latin typeface="+mn-lt"/>
-              </a:rPr>
-              <a:t>how many times an integer is returned</a:t>
-            </a:r>
-            <a:endParaRPr lang="en-US" b="0" dirty="0">
-              <a:effectLst/>
-              <a:latin typeface="+mn-lt"/>
-            </a:endParaRPr>
-          </a:p>
-          <a:p>
-            <a:pPr lvl="2"/>
-            <a:endParaRPr lang="en-US" b="0" dirty="0">
-              <a:solidFill>
-                <a:srgbClr val="CCCCCC"/>
-              </a:solidFill>
-              <a:effectLst/>
-              <a:latin typeface="Menlo" panose="020B0609030804020204" pitchFamily="49" charset="0"/>
-            </a:endParaRPr>
-          </a:p>
-        </p:txBody>
-      </p:sp>
-    </p:spTree>
-    <p:extLst>
-      <p:ext uri="{BB962C8B-B14F-4D97-AF65-F5344CB8AC3E}">
-        <p14:creationId xmlns:p14="http://schemas.microsoft.com/office/powerpoint/2010/main" val="3292432145"/>
       </p:ext>
     </p:extLst>
   </p:cSld>

</xml_diff>

<commit_message>
Add slide for move constructor & move assignment operator
</commit_message>
<xml_diff>
--- a/Presentation/HW7_presentation.pptx
+++ b/Presentation/HW7_presentation.pptx
@@ -5,7 +5,7 @@
     <p:sldMasterId id="2147483648" r:id="rId1"/>
   </p:sldMasterIdLst>
   <p:notesMasterIdLst>
-    <p:notesMasterId r:id="rId20"/>
+    <p:notesMasterId r:id="rId21"/>
   </p:notesMasterIdLst>
   <p:sldIdLst>
     <p:sldId id="256" r:id="rId2"/>
@@ -15,17 +15,18 @@
     <p:sldId id="258" r:id="rId6"/>
     <p:sldId id="273" r:id="rId7"/>
     <p:sldId id="259" r:id="rId8"/>
-    <p:sldId id="260" r:id="rId9"/>
-    <p:sldId id="261" r:id="rId10"/>
-    <p:sldId id="265" r:id="rId11"/>
-    <p:sldId id="266" r:id="rId12"/>
-    <p:sldId id="264" r:id="rId13"/>
-    <p:sldId id="268" r:id="rId14"/>
-    <p:sldId id="267" r:id="rId15"/>
-    <p:sldId id="269" r:id="rId16"/>
-    <p:sldId id="271" r:id="rId17"/>
-    <p:sldId id="272" r:id="rId18"/>
-    <p:sldId id="270" r:id="rId19"/>
+    <p:sldId id="274" r:id="rId9"/>
+    <p:sldId id="260" r:id="rId10"/>
+    <p:sldId id="261" r:id="rId11"/>
+    <p:sldId id="265" r:id="rId12"/>
+    <p:sldId id="266" r:id="rId13"/>
+    <p:sldId id="264" r:id="rId14"/>
+    <p:sldId id="268" r:id="rId15"/>
+    <p:sldId id="267" r:id="rId16"/>
+    <p:sldId id="269" r:id="rId17"/>
+    <p:sldId id="271" r:id="rId18"/>
+    <p:sldId id="272" r:id="rId19"/>
+    <p:sldId id="270" r:id="rId20"/>
   </p:sldIdLst>
   <p:sldSz cx="12192000" cy="6858000"/>
   <p:notesSz cx="6858000" cy="9144000"/>
@@ -214,7 +215,7 @@
           <a:p>
             <a:fld id="{45B120F0-C4B5-D343-A50D-56CA55199F0D}" type="datetimeFigureOut">
               <a:rPr lang="en-US" smtClean="0"/>
-              <a:t>2/15/24</a:t>
+              <a:t>10/7/24</a:t>
             </a:fld>
             <a:endParaRPr lang="en-US"/>
           </a:p>
@@ -835,7 +836,7 @@
           <a:p>
             <a:fld id="{4AAD347D-5ACD-4C99-B74B-A9C85AD731AF}" type="datetimeFigureOut">
               <a:rPr lang="en-US" dirty="0"/>
-              <a:t>2/15/24</a:t>
+              <a:t>10/7/24</a:t>
             </a:fld>
             <a:endParaRPr lang="en-US" dirty="0"/>
           </a:p>
@@ -1105,7 +1106,7 @@
           <a:p>
             <a:fld id="{4509A250-FF31-4206-8172-F9D3106AACB1}" type="datetimeFigureOut">
               <a:rPr lang="en-US" dirty="0"/>
-              <a:t>2/15/24</a:t>
+              <a:t>10/7/24</a:t>
             </a:fld>
             <a:endParaRPr lang="en-US" dirty="0"/>
           </a:p>
@@ -1294,7 +1295,7 @@
           <a:p>
             <a:fld id="{4509A250-FF31-4206-8172-F9D3106AACB1}" type="datetimeFigureOut">
               <a:rPr lang="en-US" dirty="0"/>
-              <a:t>2/15/24</a:t>
+              <a:t>10/7/24</a:t>
             </a:fld>
             <a:endParaRPr lang="en-US" dirty="0"/>
           </a:p>
@@ -1562,7 +1563,7 @@
           <a:p>
             <a:fld id="{4509A250-FF31-4206-8172-F9D3106AACB1}" type="datetimeFigureOut">
               <a:rPr lang="en-US" dirty="0"/>
-              <a:t>2/15/24</a:t>
+              <a:t>10/7/24</a:t>
             </a:fld>
             <a:endParaRPr lang="en-US" dirty="0"/>
           </a:p>
@@ -1898,7 +1899,7 @@
           <a:p>
             <a:fld id="{4509A250-FF31-4206-8172-F9D3106AACB1}" type="datetimeFigureOut">
               <a:rPr lang="en-US" dirty="0"/>
-              <a:t>2/15/24</a:t>
+              <a:t>10/7/24</a:t>
             </a:fld>
             <a:endParaRPr lang="en-US" dirty="0"/>
           </a:p>
@@ -2516,7 +2517,7 @@
           <a:p>
             <a:fld id="{4509A250-FF31-4206-8172-F9D3106AACB1}" type="datetimeFigureOut">
               <a:rPr lang="en-US" dirty="0"/>
-              <a:t>2/15/24</a:t>
+              <a:t>10/7/24</a:t>
             </a:fld>
             <a:endParaRPr lang="en-US" dirty="0"/>
           </a:p>
@@ -3371,7 +3372,7 @@
           <a:p>
             <a:fld id="{4509A250-FF31-4206-8172-F9D3106AACB1}" type="datetimeFigureOut">
               <a:rPr lang="en-US" dirty="0"/>
-              <a:t>2/15/24</a:t>
+              <a:t>10/7/24</a:t>
             </a:fld>
             <a:endParaRPr lang="en-US" dirty="0"/>
           </a:p>
@@ -3536,7 +3537,7 @@
           <a:p>
             <a:fld id="{4509A250-FF31-4206-8172-F9D3106AACB1}" type="datetimeFigureOut">
               <a:rPr lang="en-US" dirty="0"/>
-              <a:t>2/15/24</a:t>
+              <a:t>10/7/24</a:t>
             </a:fld>
             <a:endParaRPr lang="en-US" dirty="0"/>
           </a:p>
@@ -3711,7 +3712,7 @@
           <a:p>
             <a:fld id="{4509A250-FF31-4206-8172-F9D3106AACB1}" type="datetimeFigureOut">
               <a:rPr lang="en-US" dirty="0"/>
-              <a:t>2/15/24</a:t>
+              <a:t>10/7/24</a:t>
             </a:fld>
             <a:endParaRPr lang="en-US" dirty="0"/>
           </a:p>
@@ -3876,7 +3877,7 @@
           <a:p>
             <a:fld id="{4509A250-FF31-4206-8172-F9D3106AACB1}" type="datetimeFigureOut">
               <a:rPr lang="en-US" dirty="0"/>
-              <a:t>2/15/24</a:t>
+              <a:t>10/7/24</a:t>
             </a:fld>
             <a:endParaRPr lang="en-US" dirty="0"/>
           </a:p>
@@ -4118,7 +4119,7 @@
           <a:p>
             <a:fld id="{9796027F-7875-4030-9381-8BD8C4F21935}" type="datetimeFigureOut">
               <a:rPr lang="en-US" dirty="0"/>
-              <a:t>2/15/24</a:t>
+              <a:t>10/7/24</a:t>
             </a:fld>
             <a:endParaRPr lang="en-US" dirty="0"/>
           </a:p>
@@ -4405,7 +4406,7 @@
           <a:p>
             <a:fld id="{9796027F-7875-4030-9381-8BD8C4F21935}" type="datetimeFigureOut">
               <a:rPr lang="en-US" dirty="0"/>
-              <a:t>2/15/24</a:t>
+              <a:t>10/7/24</a:t>
             </a:fld>
             <a:endParaRPr lang="en-US" dirty="0"/>
           </a:p>
@@ -4844,7 +4845,7 @@
           <a:p>
             <a:fld id="{9796027F-7875-4030-9381-8BD8C4F21935}" type="datetimeFigureOut">
               <a:rPr lang="en-US" dirty="0"/>
-              <a:t>2/15/24</a:t>
+              <a:t>10/7/24</a:t>
             </a:fld>
             <a:endParaRPr lang="en-US" dirty="0"/>
           </a:p>
@@ -4957,7 +4958,7 @@
           <a:p>
             <a:fld id="{4509A250-FF31-4206-8172-F9D3106AACB1}" type="datetimeFigureOut">
               <a:rPr lang="en-US" dirty="0"/>
-              <a:t>2/15/24</a:t>
+              <a:t>10/7/24</a:t>
             </a:fld>
             <a:endParaRPr lang="en-US" dirty="0"/>
           </a:p>
@@ -5047,7 +5048,7 @@
           <a:p>
             <a:fld id="{4509A250-FF31-4206-8172-F9D3106AACB1}" type="datetimeFigureOut">
               <a:rPr lang="en-US" dirty="0"/>
-              <a:t>2/15/24</a:t>
+              <a:t>10/7/24</a:t>
             </a:fld>
             <a:endParaRPr lang="en-US" dirty="0"/>
           </a:p>
@@ -5321,7 +5322,7 @@
           <a:p>
             <a:fld id="{4509A250-FF31-4206-8172-F9D3106AACB1}" type="datetimeFigureOut">
               <a:rPr lang="en-US" dirty="0"/>
-              <a:t>2/15/24</a:t>
+              <a:t>10/7/24</a:t>
             </a:fld>
             <a:endParaRPr lang="en-US" dirty="0"/>
           </a:p>
@@ -5591,7 +5592,7 @@
           <a:p>
             <a:fld id="{4509A250-FF31-4206-8172-F9D3106AACB1}" type="datetimeFigureOut">
               <a:rPr lang="en-US" dirty="0"/>
-              <a:t>2/15/24</a:t>
+              <a:t>10/7/24</a:t>
             </a:fld>
             <a:endParaRPr lang="en-US" dirty="0"/>
           </a:p>
@@ -6015,7 +6016,7 @@
           <a:p>
             <a:fld id="{4AAD347D-5ACD-4C99-B74B-A9C85AD731AF}" type="datetimeFigureOut">
               <a:rPr lang="en-US" dirty="0"/>
-              <a:t>2/15/24</a:t>
+              <a:t>10/7/24</a:t>
             </a:fld>
             <a:endParaRPr lang="en-US" dirty="0"/>
           </a:p>
@@ -6642,6 +6643,744 @@
           <p:cNvPr id="2" name="Title 1">
             <a:extLst>
               <a:ext uri="{FF2B5EF4-FFF2-40B4-BE49-F238E27FC236}">
+                <a16:creationId xmlns:a16="http://schemas.microsoft.com/office/drawing/2014/main" id="{6EA74FE9-F9D2-14AD-0BFF-D97091667A68}"/>
+              </a:ext>
+            </a:extLst>
+          </p:cNvPr>
+          <p:cNvSpPr>
+            <a:spLocks noGrp="1"/>
+          </p:cNvSpPr>
+          <p:nvPr>
+            <p:ph type="title"/>
+          </p:nvPr>
+        </p:nvSpPr>
+        <p:spPr/>
+        <p:txBody>
+          <a:bodyPr/>
+          <a:lstStyle/>
+          <a:p>
+            <a:r>
+              <a:rPr lang="en-US" dirty="0"/>
+              <a:t>Function Call Operator ()</a:t>
+            </a:r>
+            <a:br>
+              <a:rPr lang="en-US" dirty="0"/>
+            </a:br>
+            <a:r>
+              <a:rPr lang="en-US" dirty="0"/>
+              <a:t>&amp; Subscript Operator []</a:t>
+            </a:r>
+          </a:p>
+        </p:txBody>
+      </p:sp>
+      <p:sp>
+        <p:nvSpPr>
+          <p:cNvPr id="3" name="Content Placeholder 2">
+            <a:extLst>
+              <a:ext uri="{FF2B5EF4-FFF2-40B4-BE49-F238E27FC236}">
+                <a16:creationId xmlns:a16="http://schemas.microsoft.com/office/drawing/2014/main" id="{FBB28E39-DBF6-C515-4720-6B4C4DA3F604}"/>
+              </a:ext>
+            </a:extLst>
+          </p:cNvPr>
+          <p:cNvSpPr>
+            <a:spLocks noGrp="1"/>
+          </p:cNvSpPr>
+          <p:nvPr>
+            <p:ph sz="half" idx="1"/>
+          </p:nvPr>
+        </p:nvSpPr>
+        <p:spPr/>
+        <p:txBody>
+          <a:bodyPr>
+            <a:normAutofit fontScale="92500"/>
+          </a:bodyPr>
+          <a:lstStyle/>
+          <a:p>
+            <a:r>
+              <a:rPr lang="en-US" b="0" dirty="0">
+                <a:solidFill>
+                  <a:srgbClr val="569CD6"/>
+                </a:solidFill>
+                <a:effectLst/>
+                <a:latin typeface="Menlo" panose="020B0609030804020204" pitchFamily="49" charset="0"/>
+              </a:rPr>
+              <a:t>int</a:t>
+            </a:r>
+            <a:r>
+              <a:rPr lang="en-US" b="0" dirty="0">
+                <a:solidFill>
+                  <a:srgbClr val="CCCCCC"/>
+                </a:solidFill>
+                <a:effectLst/>
+                <a:latin typeface="Menlo" panose="020B0609030804020204" pitchFamily="49" charset="0"/>
+              </a:rPr>
+              <a:t> </a:t>
+            </a:r>
+            <a:r>
+              <a:rPr lang="en-US" b="0" dirty="0">
+                <a:solidFill>
+                  <a:srgbClr val="C586C0"/>
+                </a:solidFill>
+                <a:effectLst/>
+                <a:latin typeface="Menlo" panose="020B0609030804020204" pitchFamily="49" charset="0"/>
+              </a:rPr>
+              <a:t>operator()</a:t>
+            </a:r>
+            <a:r>
+              <a:rPr lang="en-US" b="0" dirty="0">
+                <a:solidFill>
+                  <a:srgbClr val="CCCCCC"/>
+                </a:solidFill>
+                <a:effectLst/>
+                <a:latin typeface="Menlo" panose="020B0609030804020204" pitchFamily="49" charset="0"/>
+              </a:rPr>
+              <a:t>(</a:t>
+            </a:r>
+            <a:r>
+              <a:rPr lang="en-US" b="0" dirty="0">
+                <a:solidFill>
+                  <a:srgbClr val="569CD6"/>
+                </a:solidFill>
+                <a:effectLst/>
+                <a:latin typeface="Menlo" panose="020B0609030804020204" pitchFamily="49" charset="0"/>
+              </a:rPr>
+              <a:t>int</a:t>
+            </a:r>
+            <a:r>
+              <a:rPr lang="en-US" b="0" dirty="0">
+                <a:solidFill>
+                  <a:srgbClr val="CCCCCC"/>
+                </a:solidFill>
+                <a:effectLst/>
+                <a:latin typeface="Menlo" panose="020B0609030804020204" pitchFamily="49" charset="0"/>
+              </a:rPr>
+              <a:t>) </a:t>
+            </a:r>
+            <a:r>
+              <a:rPr lang="en-US" b="0" dirty="0">
+                <a:solidFill>
+                  <a:srgbClr val="569CD6"/>
+                </a:solidFill>
+                <a:effectLst/>
+                <a:latin typeface="Menlo" panose="020B0609030804020204" pitchFamily="49" charset="0"/>
+              </a:rPr>
+              <a:t>const</a:t>
+            </a:r>
+            <a:r>
+              <a:rPr lang="en-US" b="0" dirty="0">
+                <a:solidFill>
+                  <a:srgbClr val="CCCCCC"/>
+                </a:solidFill>
+                <a:effectLst/>
+                <a:latin typeface="Menlo" panose="020B0609030804020204" pitchFamily="49" charset="0"/>
+              </a:rPr>
+              <a:t>;</a:t>
+            </a:r>
+          </a:p>
+          <a:p>
+            <a:pPr lvl="1"/>
+            <a:r>
+              <a:rPr lang="en-US" dirty="0"/>
+              <a:t>Retrieves the </a:t>
+            </a:r>
+            <a:r>
+              <a:rPr lang="en-US" b="0" dirty="0">
+                <a:solidFill>
+                  <a:srgbClr val="9CDCFE"/>
+                </a:solidFill>
+                <a:effectLst/>
+                <a:latin typeface="Menlo" panose="020B0609030804020204" pitchFamily="49" charset="0"/>
+              </a:rPr>
+              <a:t>n</a:t>
+            </a:r>
+            <a:r>
+              <a:rPr lang="en-US" dirty="0"/>
+              <a:t>th raw count from the array of counts.</a:t>
+            </a:r>
+          </a:p>
+          <a:p>
+            <a:r>
+              <a:rPr lang="en-US" dirty="0"/>
+              <a:t>Check that the index is valid</a:t>
+            </a:r>
+          </a:p>
+          <a:p>
+            <a:pPr lvl="1"/>
+            <a:r>
+              <a:rPr lang="en-US" dirty="0"/>
+              <a:t>i.e., range: [0 – width_)</a:t>
+            </a:r>
+          </a:p>
+          <a:p>
+            <a:r>
+              <a:rPr lang="en-US" b="0" dirty="0">
+                <a:solidFill>
+                  <a:srgbClr val="C586C0"/>
+                </a:solidFill>
+                <a:effectLst/>
+                <a:latin typeface="Menlo" panose="020B0609030804020204" pitchFamily="49" charset="0"/>
+              </a:rPr>
+              <a:t>return</a:t>
+            </a:r>
+            <a:r>
+              <a:rPr lang="en-US" b="0" dirty="0">
+                <a:solidFill>
+                  <a:srgbClr val="CCCCCC"/>
+                </a:solidFill>
+                <a:effectLst/>
+                <a:latin typeface="Menlo" panose="020B0609030804020204" pitchFamily="49" charset="0"/>
+              </a:rPr>
+              <a:t> </a:t>
+            </a:r>
+            <a:r>
+              <a:rPr lang="en-US" b="0" dirty="0">
+                <a:solidFill>
+                  <a:srgbClr val="9CDCFE"/>
+                </a:solidFill>
+                <a:effectLst/>
+                <a:latin typeface="Menlo" panose="020B0609030804020204" pitchFamily="49" charset="0"/>
+              </a:rPr>
+              <a:t>numbers_</a:t>
+            </a:r>
+            <a:r>
+              <a:rPr lang="en-US" b="0" dirty="0">
+                <a:solidFill>
+                  <a:srgbClr val="CCCCCC"/>
+                </a:solidFill>
+                <a:effectLst/>
+                <a:latin typeface="Menlo" panose="020B0609030804020204" pitchFamily="49" charset="0"/>
+              </a:rPr>
+              <a:t>[n];</a:t>
+            </a:r>
+          </a:p>
+        </p:txBody>
+      </p:sp>
+      <p:sp>
+        <p:nvSpPr>
+          <p:cNvPr id="4" name="Content Placeholder 3">
+            <a:extLst>
+              <a:ext uri="{FF2B5EF4-FFF2-40B4-BE49-F238E27FC236}">
+                <a16:creationId xmlns:a16="http://schemas.microsoft.com/office/drawing/2014/main" id="{04AE45DD-00E6-FDB7-260B-B57D77CE475E}"/>
+              </a:ext>
+            </a:extLst>
+          </p:cNvPr>
+          <p:cNvSpPr>
+            <a:spLocks noGrp="1"/>
+          </p:cNvSpPr>
+          <p:nvPr>
+            <p:ph sz="half" idx="2"/>
+          </p:nvPr>
+        </p:nvSpPr>
+        <p:spPr>
+          <a:xfrm>
+            <a:off x="5654493" y="2056092"/>
+            <a:ext cx="5160263" cy="4200245"/>
+          </a:xfrm>
+        </p:spPr>
+        <p:txBody>
+          <a:bodyPr>
+            <a:normAutofit fontScale="92500"/>
+          </a:bodyPr>
+          <a:lstStyle/>
+          <a:p>
+            <a:r>
+              <a:rPr lang="en-US" b="0" dirty="0">
+                <a:solidFill>
+                  <a:srgbClr val="569CD6"/>
+                </a:solidFill>
+                <a:effectLst/>
+                <a:latin typeface="Menlo" panose="020B0609030804020204" pitchFamily="49" charset="0"/>
+              </a:rPr>
+              <a:t>int</a:t>
+            </a:r>
+            <a:r>
+              <a:rPr lang="en-US" b="0" dirty="0">
+                <a:solidFill>
+                  <a:srgbClr val="CCCCCC"/>
+                </a:solidFill>
+                <a:effectLst/>
+                <a:latin typeface="Menlo" panose="020B0609030804020204" pitchFamily="49" charset="0"/>
+              </a:rPr>
+              <a:t> </a:t>
+            </a:r>
+            <a:r>
+              <a:rPr lang="en-US" b="0" dirty="0">
+                <a:solidFill>
+                  <a:srgbClr val="C586C0"/>
+                </a:solidFill>
+                <a:effectLst/>
+                <a:latin typeface="Menlo" panose="020B0609030804020204" pitchFamily="49" charset="0"/>
+              </a:rPr>
+              <a:t>operator[]</a:t>
+            </a:r>
+            <a:r>
+              <a:rPr lang="en-US" b="0" dirty="0">
+                <a:solidFill>
+                  <a:srgbClr val="CCCCCC"/>
+                </a:solidFill>
+                <a:effectLst/>
+                <a:latin typeface="Menlo" panose="020B0609030804020204" pitchFamily="49" charset="0"/>
+              </a:rPr>
+              <a:t>(</a:t>
+            </a:r>
+            <a:r>
+              <a:rPr lang="en-US" b="0" dirty="0">
+                <a:solidFill>
+                  <a:srgbClr val="569CD6"/>
+                </a:solidFill>
+                <a:effectLst/>
+                <a:latin typeface="Menlo" panose="020B0609030804020204" pitchFamily="49" charset="0"/>
+              </a:rPr>
+              <a:t>unsigned int</a:t>
+            </a:r>
+            <a:r>
+              <a:rPr lang="en-US" b="0" dirty="0">
+                <a:solidFill>
+                  <a:srgbClr val="CCCCCC"/>
+                </a:solidFill>
+                <a:effectLst/>
+                <a:latin typeface="Menlo" panose="020B0609030804020204" pitchFamily="49" charset="0"/>
+              </a:rPr>
+              <a:t>) </a:t>
+            </a:r>
+            <a:r>
+              <a:rPr lang="en-US" b="0" dirty="0">
+                <a:solidFill>
+                  <a:srgbClr val="569CD6"/>
+                </a:solidFill>
+                <a:effectLst/>
+                <a:latin typeface="Menlo" panose="020B0609030804020204" pitchFamily="49" charset="0"/>
+              </a:rPr>
+              <a:t>const</a:t>
+            </a:r>
+            <a:r>
+              <a:rPr lang="en-US" b="0" dirty="0">
+                <a:solidFill>
+                  <a:srgbClr val="CCCCCC"/>
+                </a:solidFill>
+                <a:effectLst/>
+                <a:latin typeface="Menlo" panose="020B0609030804020204" pitchFamily="49" charset="0"/>
+              </a:rPr>
+              <a:t>;</a:t>
+            </a:r>
+          </a:p>
+          <a:p>
+            <a:pPr lvl="1"/>
+            <a:r>
+              <a:rPr lang="en-US" b="0" dirty="0">
+                <a:effectLst/>
+                <a:latin typeface="+mn-lt"/>
+              </a:rPr>
+              <a:t>Retrieves the </a:t>
+            </a:r>
+            <a:r>
+              <a:rPr lang="en-US" b="0" dirty="0">
+                <a:solidFill>
+                  <a:srgbClr val="9CDCFE"/>
+                </a:solidFill>
+                <a:effectLst/>
+                <a:latin typeface="Menlo" panose="020B0609030804020204" pitchFamily="49" charset="0"/>
+              </a:rPr>
+              <a:t>n</a:t>
+            </a:r>
+            <a:r>
+              <a:rPr lang="en-US" b="0" dirty="0">
+                <a:effectLst/>
+                <a:latin typeface="+mn-lt"/>
+              </a:rPr>
+              <a:t>th </a:t>
+            </a:r>
+            <a:r>
+              <a:rPr lang="en-US" b="0" dirty="0">
+                <a:solidFill>
+                  <a:srgbClr val="569CD6"/>
+                </a:solidFill>
+                <a:effectLst/>
+                <a:latin typeface="Menlo" panose="020B0609030804020204" pitchFamily="49" charset="0"/>
+              </a:rPr>
+              <a:t>int</a:t>
+            </a:r>
+            <a:r>
+              <a:rPr lang="en-US" b="0" dirty="0">
+                <a:effectLst/>
+                <a:latin typeface="+mn-lt"/>
+              </a:rPr>
+              <a:t> from the object, in sorted order.</a:t>
+            </a:r>
+          </a:p>
+          <a:p>
+            <a:r>
+              <a:rPr lang="en-US" b="0" dirty="0">
+                <a:solidFill>
+                  <a:srgbClr val="C586C0"/>
+                </a:solidFill>
+                <a:effectLst/>
+                <a:latin typeface="Menlo" panose="020B0609030804020204" pitchFamily="49" charset="0"/>
+              </a:rPr>
+              <a:t>if</a:t>
+            </a:r>
+            <a:r>
+              <a:rPr lang="en-US" b="0" dirty="0">
+                <a:solidFill>
+                  <a:srgbClr val="CCCCCC"/>
+                </a:solidFill>
+                <a:effectLst/>
+                <a:latin typeface="Menlo" panose="020B0609030804020204" pitchFamily="49" charset="0"/>
+              </a:rPr>
+              <a:t> (size_ </a:t>
+            </a:r>
+            <a:r>
+              <a:rPr lang="en-US" b="0" dirty="0">
+                <a:solidFill>
+                  <a:srgbClr val="D4D4D4"/>
+                </a:solidFill>
+                <a:effectLst/>
+                <a:latin typeface="Menlo" panose="020B0609030804020204" pitchFamily="49" charset="0"/>
+              </a:rPr>
+              <a:t>==</a:t>
+            </a:r>
+            <a:r>
+              <a:rPr lang="en-US" b="0" dirty="0">
+                <a:solidFill>
+                  <a:srgbClr val="CCCCCC"/>
+                </a:solidFill>
+                <a:effectLst/>
+                <a:latin typeface="Menlo" panose="020B0609030804020204" pitchFamily="49" charset="0"/>
+              </a:rPr>
+              <a:t> </a:t>
+            </a:r>
+            <a:r>
+              <a:rPr lang="en-US" b="0" dirty="0">
+                <a:solidFill>
+                  <a:srgbClr val="B5CEA8"/>
+                </a:solidFill>
+                <a:effectLst/>
+                <a:latin typeface="Menlo" panose="020B0609030804020204" pitchFamily="49" charset="0"/>
+              </a:rPr>
+              <a:t>0</a:t>
+            </a:r>
+            <a:r>
+              <a:rPr lang="en-US" b="0" dirty="0">
+                <a:solidFill>
+                  <a:srgbClr val="CCCCCC"/>
+                </a:solidFill>
+                <a:effectLst/>
+                <a:latin typeface="Menlo" panose="020B0609030804020204" pitchFamily="49" charset="0"/>
+              </a:rPr>
+              <a:t>)</a:t>
+            </a:r>
+          </a:p>
+          <a:p>
+            <a:pPr lvl="1"/>
+            <a:r>
+              <a:rPr lang="en-US" b="0" dirty="0">
+                <a:solidFill>
+                  <a:srgbClr val="C586C0"/>
+                </a:solidFill>
+                <a:effectLst/>
+                <a:latin typeface="Menlo" panose="020B0609030804020204" pitchFamily="49" charset="0"/>
+              </a:rPr>
+              <a:t>throw</a:t>
+            </a:r>
+            <a:r>
+              <a:rPr lang="en-US" b="0" dirty="0">
+                <a:solidFill>
+                  <a:srgbClr val="CCCCCC"/>
+                </a:solidFill>
+                <a:effectLst/>
+                <a:latin typeface="Menlo" panose="020B0609030804020204" pitchFamily="49" charset="0"/>
+              </a:rPr>
+              <a:t> </a:t>
+            </a:r>
+            <a:r>
+              <a:rPr lang="en-US" b="0" dirty="0">
+                <a:solidFill>
+                  <a:srgbClr val="4EC9B0"/>
+                </a:solidFill>
+                <a:effectLst/>
+                <a:latin typeface="Menlo" panose="020B0609030804020204" pitchFamily="49" charset="0"/>
+              </a:rPr>
+              <a:t>std</a:t>
+            </a:r>
+            <a:r>
+              <a:rPr lang="en-US" b="0" dirty="0">
+                <a:solidFill>
+                  <a:srgbClr val="CCCCCC"/>
+                </a:solidFill>
+                <a:effectLst/>
+                <a:latin typeface="Menlo" panose="020B0609030804020204" pitchFamily="49" charset="0"/>
+              </a:rPr>
+              <a:t>::</a:t>
+            </a:r>
+            <a:r>
+              <a:rPr lang="en-US" b="0" dirty="0" err="1">
+                <a:solidFill>
+                  <a:srgbClr val="DCDCAA"/>
+                </a:solidFill>
+                <a:effectLst/>
+                <a:latin typeface="Menlo" panose="020B0609030804020204" pitchFamily="49" charset="0"/>
+              </a:rPr>
+              <a:t>out_of_range</a:t>
+            </a:r>
+            <a:endParaRPr lang="en-US" b="0" dirty="0">
+              <a:solidFill>
+                <a:srgbClr val="CCCCCC"/>
+              </a:solidFill>
+              <a:effectLst/>
+              <a:latin typeface="Menlo" panose="020B0609030804020204" pitchFamily="49" charset="0"/>
+            </a:endParaRPr>
+          </a:p>
+          <a:p>
+            <a:r>
+              <a:rPr lang="en-US" dirty="0"/>
+              <a:t>Check that the index is valid</a:t>
+            </a:r>
+          </a:p>
+          <a:p>
+            <a:pPr lvl="1"/>
+            <a:r>
+              <a:rPr lang="en-US" dirty="0"/>
+              <a:t>i.e., range: [0 – size_)</a:t>
+            </a:r>
+          </a:p>
+          <a:p>
+            <a:r>
+              <a:rPr lang="en-US" b="0" dirty="0">
+                <a:effectLst/>
+                <a:latin typeface="+mn-lt"/>
+              </a:rPr>
+              <a:t>Use </a:t>
+            </a:r>
+            <a:r>
+              <a:rPr lang="en-US" b="0" dirty="0" err="1">
+                <a:solidFill>
+                  <a:srgbClr val="4EC9B0"/>
+                </a:solidFill>
+                <a:effectLst/>
+                <a:latin typeface="Menlo" panose="020B0609030804020204" pitchFamily="49" charset="0"/>
+              </a:rPr>
+              <a:t>CountSort</a:t>
+            </a:r>
+            <a:r>
+              <a:rPr lang="en-US" b="0" dirty="0">
+                <a:solidFill>
+                  <a:srgbClr val="CCCCCC"/>
+                </a:solidFill>
+                <a:effectLst/>
+                <a:latin typeface="Menlo" panose="020B0609030804020204" pitchFamily="49" charset="0"/>
+              </a:rPr>
+              <a:t>::</a:t>
+            </a:r>
+            <a:r>
+              <a:rPr lang="en-US" b="0" dirty="0">
+                <a:solidFill>
+                  <a:srgbClr val="4EC9B0"/>
+                </a:solidFill>
+                <a:effectLst/>
+                <a:latin typeface="Menlo" panose="020B0609030804020204" pitchFamily="49" charset="0"/>
+              </a:rPr>
+              <a:t>Iterator</a:t>
+            </a:r>
+            <a:r>
+              <a:rPr lang="en-US" b="0" dirty="0">
+                <a:solidFill>
+                  <a:srgbClr val="CCCCCC"/>
+                </a:solidFill>
+                <a:effectLst/>
+                <a:latin typeface="Menlo" panose="020B0609030804020204" pitchFamily="49" charset="0"/>
+              </a:rPr>
+              <a:t> </a:t>
+            </a:r>
+            <a:r>
+              <a:rPr lang="en-US" b="0" dirty="0">
+                <a:effectLst/>
+                <a:latin typeface="+mn-lt"/>
+              </a:rPr>
+              <a:t>to retrieve requested integer:</a:t>
+            </a:r>
+          </a:p>
+          <a:p>
+            <a:pPr marL="400050" lvl="1" indent="0">
+              <a:buNone/>
+            </a:pPr>
+            <a:r>
+              <a:rPr lang="en-US" b="0" dirty="0">
+                <a:solidFill>
+                  <a:srgbClr val="CCCCCC"/>
+                </a:solidFill>
+                <a:effectLst/>
+                <a:latin typeface="Menlo" panose="020B0609030804020204" pitchFamily="49" charset="0"/>
+              </a:rPr>
+              <a:t>Iterator it </a:t>
+            </a:r>
+            <a:r>
+              <a:rPr lang="en-US" b="0" dirty="0">
+                <a:solidFill>
+                  <a:srgbClr val="D4D4D4"/>
+                </a:solidFill>
+                <a:effectLst/>
+                <a:latin typeface="Menlo" panose="020B0609030804020204" pitchFamily="49" charset="0"/>
+              </a:rPr>
+              <a:t>=</a:t>
+            </a:r>
+            <a:r>
+              <a:rPr lang="en-US" b="0" dirty="0">
+                <a:solidFill>
+                  <a:srgbClr val="CCCCCC"/>
+                </a:solidFill>
+                <a:effectLst/>
+                <a:latin typeface="Menlo" panose="020B0609030804020204" pitchFamily="49" charset="0"/>
+              </a:rPr>
+              <a:t> </a:t>
+            </a:r>
+            <a:r>
+              <a:rPr lang="en-US" b="0" dirty="0">
+                <a:solidFill>
+                  <a:srgbClr val="DCDCAA"/>
+                </a:solidFill>
+                <a:effectLst/>
+                <a:latin typeface="Menlo" panose="020B0609030804020204" pitchFamily="49" charset="0"/>
+              </a:rPr>
+              <a:t>begin</a:t>
+            </a:r>
+            <a:r>
+              <a:rPr lang="en-US" b="0" dirty="0">
+                <a:solidFill>
+                  <a:srgbClr val="CCCCCC"/>
+                </a:solidFill>
+                <a:effectLst/>
+                <a:latin typeface="Menlo" panose="020B0609030804020204" pitchFamily="49" charset="0"/>
+              </a:rPr>
+              <a:t>();</a:t>
+            </a:r>
+          </a:p>
+          <a:p>
+            <a:pPr marL="400050" lvl="1" indent="0">
+              <a:buNone/>
+            </a:pPr>
+            <a:r>
+              <a:rPr lang="en-US" b="0" dirty="0">
+                <a:solidFill>
+                  <a:srgbClr val="4EC9B0"/>
+                </a:solidFill>
+                <a:effectLst/>
+                <a:latin typeface="Menlo" panose="020B0609030804020204" pitchFamily="49" charset="0"/>
+              </a:rPr>
+              <a:t>std</a:t>
+            </a:r>
+            <a:r>
+              <a:rPr lang="en-US" b="0" dirty="0">
+                <a:solidFill>
+                  <a:srgbClr val="CCCCCC"/>
+                </a:solidFill>
+                <a:effectLst/>
+                <a:latin typeface="Menlo" panose="020B0609030804020204" pitchFamily="49" charset="0"/>
+              </a:rPr>
+              <a:t>::</a:t>
+            </a:r>
+            <a:r>
+              <a:rPr lang="en-US" b="0" dirty="0">
+                <a:solidFill>
+                  <a:srgbClr val="DCDCAA"/>
+                </a:solidFill>
+                <a:effectLst/>
+                <a:latin typeface="Menlo" panose="020B0609030804020204" pitchFamily="49" charset="0"/>
+              </a:rPr>
+              <a:t>advance</a:t>
+            </a:r>
+            <a:r>
+              <a:rPr lang="en-US" b="0" dirty="0">
+                <a:solidFill>
+                  <a:srgbClr val="CCCCCC"/>
+                </a:solidFill>
+                <a:effectLst/>
+                <a:latin typeface="Menlo" panose="020B0609030804020204" pitchFamily="49" charset="0"/>
+              </a:rPr>
+              <a:t>(it, n);</a:t>
+            </a:r>
+          </a:p>
+          <a:p>
+            <a:pPr marL="400050" lvl="1" indent="0">
+              <a:buNone/>
+            </a:pPr>
+            <a:r>
+              <a:rPr lang="en-US" b="0" dirty="0">
+                <a:solidFill>
+                  <a:srgbClr val="C586C0"/>
+                </a:solidFill>
+                <a:effectLst/>
+                <a:latin typeface="Menlo" panose="020B0609030804020204" pitchFamily="49" charset="0"/>
+              </a:rPr>
+              <a:t>return</a:t>
+            </a:r>
+            <a:r>
+              <a:rPr lang="en-US" b="0" dirty="0">
+                <a:solidFill>
+                  <a:srgbClr val="CCCCCC"/>
+                </a:solidFill>
+                <a:effectLst/>
+                <a:latin typeface="Menlo" panose="020B0609030804020204" pitchFamily="49" charset="0"/>
+              </a:rPr>
+              <a:t> </a:t>
+            </a:r>
+            <a:r>
+              <a:rPr lang="en-US" b="0" dirty="0">
+                <a:solidFill>
+                  <a:srgbClr val="D4D4D4"/>
+                </a:solidFill>
+                <a:effectLst/>
+                <a:latin typeface="Menlo" panose="020B0609030804020204" pitchFamily="49" charset="0"/>
+              </a:rPr>
+              <a:t>*</a:t>
+            </a:r>
+            <a:r>
+              <a:rPr lang="en-US" b="0" dirty="0">
+                <a:solidFill>
+                  <a:srgbClr val="CCCCCC"/>
+                </a:solidFill>
+                <a:effectLst/>
+                <a:latin typeface="Menlo" panose="020B0609030804020204" pitchFamily="49" charset="0"/>
+              </a:rPr>
+              <a:t>it;</a:t>
+            </a:r>
+          </a:p>
+        </p:txBody>
+      </p:sp>
+    </p:spTree>
+    <p:extLst>
+      <p:ext uri="{BB962C8B-B14F-4D97-AF65-F5344CB8AC3E}">
+        <p14:creationId xmlns:p14="http://schemas.microsoft.com/office/powerpoint/2010/main" val="3029851682"/>
+      </p:ext>
+    </p:extLst>
+  </p:cSld>
+  <p:clrMapOvr>
+    <a:masterClrMapping/>
+  </p:clrMapOvr>
+</p:sld>
+</file>
+
+<file path=ppt/slides/slide11.xml><?xml version="1.0" encoding="utf-8"?>
+<p:sld xmlns:a="http://schemas.openxmlformats.org/drawingml/2006/main" xmlns:r="http://schemas.openxmlformats.org/officeDocument/2006/relationships" xmlns:p="http://schemas.openxmlformats.org/presentationml/2006/main">
+  <p:cSld>
+    <p:spTree>
+      <p:nvGrpSpPr>
+        <p:cNvPr id="1" name=""/>
+        <p:cNvGrpSpPr/>
+        <p:nvPr/>
+      </p:nvGrpSpPr>
+      <p:grpSpPr>
+        <a:xfrm>
+          <a:off x="0" y="0"/>
+          <a:ext cx="0" cy="0"/>
+          <a:chOff x="0" y="0"/>
+          <a:chExt cx="0" cy="0"/>
+        </a:xfrm>
+      </p:grpSpPr>
+      <p:sp>
+        <p:nvSpPr>
+          <p:cNvPr id="2" name="Title 1">
+            <a:extLst>
+              <a:ext uri="{FF2B5EF4-FFF2-40B4-BE49-F238E27FC236}">
                 <a16:creationId xmlns:a16="http://schemas.microsoft.com/office/drawing/2014/main" id="{99F68D1C-5B99-F8B9-CE76-683B28183C9E}"/>
               </a:ext>
             </a:extLst>
@@ -7351,7 +8090,7 @@
 </p:sld>
 </file>
 
-<file path=ppt/slides/slide11.xml><?xml version="1.0" encoding="utf-8"?>
+<file path=ppt/slides/slide12.xml><?xml version="1.0" encoding="utf-8"?>
 <p:sld xmlns:a="http://schemas.openxmlformats.org/drawingml/2006/main" xmlns:r="http://schemas.openxmlformats.org/officeDocument/2006/relationships" xmlns:p="http://schemas.openxmlformats.org/presentationml/2006/main">
   <p:cSld>
     <p:spTree>
@@ -7729,7 +8468,7 @@
 </p:sld>
 </file>
 
-<file path=ppt/slides/slide12.xml><?xml version="1.0" encoding="utf-8"?>
+<file path=ppt/slides/slide13.xml><?xml version="1.0" encoding="utf-8"?>
 <p:sld xmlns:a="http://schemas.openxmlformats.org/drawingml/2006/main" xmlns:r="http://schemas.openxmlformats.org/officeDocument/2006/relationships" xmlns:p="http://schemas.openxmlformats.org/presentationml/2006/main">
   <p:cSld>
     <p:spTree>
@@ -8515,7 +9254,7 @@
 </p:sld>
 </file>
 
-<file path=ppt/slides/slide13.xml><?xml version="1.0" encoding="utf-8"?>
+<file path=ppt/slides/slide14.xml><?xml version="1.0" encoding="utf-8"?>
 <p:sld xmlns:a="http://schemas.openxmlformats.org/drawingml/2006/main" xmlns:r="http://schemas.openxmlformats.org/officeDocument/2006/relationships" xmlns:p="http://schemas.openxmlformats.org/presentationml/2006/main">
   <p:cSld>
     <p:spTree>
@@ -8854,7 +9593,7 @@
 </p:sld>
 </file>
 
-<file path=ppt/slides/slide14.xml><?xml version="1.0" encoding="utf-8"?>
+<file path=ppt/slides/slide15.xml><?xml version="1.0" encoding="utf-8"?>
 <p:sld xmlns:a="http://schemas.openxmlformats.org/drawingml/2006/main" xmlns:r="http://schemas.openxmlformats.org/officeDocument/2006/relationships" xmlns:p="http://schemas.openxmlformats.org/presentationml/2006/main">
   <p:cSld>
     <p:spTree>
@@ -9266,7 +10005,7 @@
 </p:sld>
 </file>
 
-<file path=ppt/slides/slide15.xml><?xml version="1.0" encoding="utf-8"?>
+<file path=ppt/slides/slide16.xml><?xml version="1.0" encoding="utf-8"?>
 <p:sld xmlns:a="http://schemas.openxmlformats.org/drawingml/2006/main" xmlns:r="http://schemas.openxmlformats.org/officeDocument/2006/relationships" xmlns:p="http://schemas.openxmlformats.org/presentationml/2006/main">
   <p:cSld>
     <p:spTree>
@@ -10678,7 +11417,7 @@
 </p:sld>
 </file>
 
-<file path=ppt/slides/slide16.xml><?xml version="1.0" encoding="utf-8"?>
+<file path=ppt/slides/slide17.xml><?xml version="1.0" encoding="utf-8"?>
 <p:sld xmlns:a="http://schemas.openxmlformats.org/drawingml/2006/main" xmlns:r="http://schemas.openxmlformats.org/officeDocument/2006/relationships" xmlns:p="http://schemas.openxmlformats.org/presentationml/2006/main">
   <p:cSld>
     <p:spTree>
@@ -11283,7 +12022,7 @@
 </p:sld>
 </file>
 
-<file path=ppt/slides/slide17.xml><?xml version="1.0" encoding="utf-8"?>
+<file path=ppt/slides/slide18.xml><?xml version="1.0" encoding="utf-8"?>
 <p:sld xmlns:a="http://schemas.openxmlformats.org/drawingml/2006/main" xmlns:r="http://schemas.openxmlformats.org/officeDocument/2006/relationships" xmlns:p="http://schemas.openxmlformats.org/presentationml/2006/main">
   <p:cSld>
     <p:spTree>
@@ -11705,7 +12444,7 @@
 </p:sld>
 </file>
 
-<file path=ppt/slides/slide18.xml><?xml version="1.0" encoding="utf-8"?>
+<file path=ppt/slides/slide19.xml><?xml version="1.0" encoding="utf-8"?>
 <p:sld xmlns:a="http://schemas.openxmlformats.org/drawingml/2006/main" xmlns:r="http://schemas.openxmlformats.org/officeDocument/2006/relationships" xmlns:p="http://schemas.openxmlformats.org/presentationml/2006/main">
   <p:cSld>
     <p:spTree>
@@ -15670,6 +16409,552 @@
   <p:cSld>
     <p:spTree>
       <p:nvGrpSpPr>
+        <p:cNvPr id="1" name="">
+          <a:extLst>
+            <a:ext uri="{FF2B5EF4-FFF2-40B4-BE49-F238E27FC236}">
+              <a16:creationId xmlns:a16="http://schemas.microsoft.com/office/drawing/2014/main" id="{718F6A8E-7E73-BD69-A15B-D2333B76D9FD}"/>
+            </a:ext>
+          </a:extLst>
+        </p:cNvPr>
+        <p:cNvGrpSpPr/>
+        <p:nvPr/>
+      </p:nvGrpSpPr>
+      <p:grpSpPr>
+        <a:xfrm>
+          <a:off x="0" y="0"/>
+          <a:ext cx="0" cy="0"/>
+          <a:chOff x="0" y="0"/>
+          <a:chExt cx="0" cy="0"/>
+        </a:xfrm>
+      </p:grpSpPr>
+      <p:sp>
+        <p:nvSpPr>
+          <p:cNvPr id="2" name="Title 1">
+            <a:extLst>
+              <a:ext uri="{FF2B5EF4-FFF2-40B4-BE49-F238E27FC236}">
+                <a16:creationId xmlns:a16="http://schemas.microsoft.com/office/drawing/2014/main" id="{711B7C12-FA7B-8873-E632-C7E99F542C70}"/>
+              </a:ext>
+            </a:extLst>
+          </p:cNvPr>
+          <p:cNvSpPr>
+            <a:spLocks noGrp="1"/>
+          </p:cNvSpPr>
+          <p:nvPr>
+            <p:ph type="title"/>
+          </p:nvPr>
+        </p:nvSpPr>
+        <p:spPr/>
+        <p:txBody>
+          <a:bodyPr/>
+          <a:lstStyle/>
+          <a:p>
+            <a:r>
+              <a:rPr lang="en-US" dirty="0"/>
+              <a:t>Move Constructor </a:t>
+            </a:r>
+            <a:br>
+              <a:rPr lang="en-US" dirty="0"/>
+            </a:br>
+            <a:r>
+              <a:rPr lang="en-US" dirty="0"/>
+              <a:t>&amp; Move Assignment Operator</a:t>
+            </a:r>
+          </a:p>
+        </p:txBody>
+      </p:sp>
+      <p:sp>
+        <p:nvSpPr>
+          <p:cNvPr id="4" name="Content Placeholder 3">
+            <a:extLst>
+              <a:ext uri="{FF2B5EF4-FFF2-40B4-BE49-F238E27FC236}">
+                <a16:creationId xmlns:a16="http://schemas.microsoft.com/office/drawing/2014/main" id="{BB172FE5-11C0-CB1D-E6B4-1D64EC4C8E15}"/>
+              </a:ext>
+            </a:extLst>
+          </p:cNvPr>
+          <p:cNvSpPr>
+            <a:spLocks noGrp="1"/>
+          </p:cNvSpPr>
+          <p:nvPr>
+            <p:ph sz="half" idx="1"/>
+          </p:nvPr>
+        </p:nvSpPr>
+        <p:spPr>
+          <a:xfrm>
+            <a:off x="1103312" y="2060575"/>
+            <a:ext cx="4551181" cy="4195763"/>
+          </a:xfrm>
+        </p:spPr>
+        <p:txBody>
+          <a:bodyPr>
+            <a:normAutofit/>
+          </a:bodyPr>
+          <a:lstStyle/>
+          <a:p>
+            <a:r>
+              <a:rPr lang="en-US" b="0" dirty="0" err="1">
+                <a:solidFill>
+                  <a:srgbClr val="DCDCAA"/>
+                </a:solidFill>
+                <a:effectLst/>
+                <a:latin typeface="Menlo" panose="020B0609030804020204" pitchFamily="49" charset="0"/>
+              </a:rPr>
+              <a:t>CountSort</a:t>
+            </a:r>
+            <a:r>
+              <a:rPr lang="en-US" b="0" dirty="0">
+                <a:solidFill>
+                  <a:srgbClr val="CCCCCC"/>
+                </a:solidFill>
+                <a:effectLst/>
+                <a:latin typeface="Menlo" panose="020B0609030804020204" pitchFamily="49" charset="0"/>
+              </a:rPr>
+              <a:t>(</a:t>
+            </a:r>
+            <a:r>
+              <a:rPr lang="en-US" b="0" dirty="0" err="1">
+                <a:solidFill>
+                  <a:srgbClr val="4EC9B0"/>
+                </a:solidFill>
+                <a:effectLst/>
+                <a:latin typeface="Menlo" panose="020B0609030804020204" pitchFamily="49" charset="0"/>
+              </a:rPr>
+              <a:t>CountSort</a:t>
+            </a:r>
+            <a:r>
+              <a:rPr lang="en-US" b="0" dirty="0">
+                <a:solidFill>
+                  <a:srgbClr val="CCCCCC"/>
+                </a:solidFill>
+                <a:effectLst/>
+                <a:latin typeface="Menlo" panose="020B0609030804020204" pitchFamily="49" charset="0"/>
+              </a:rPr>
+              <a:t> &amp;</a:t>
+            </a:r>
+            <a:r>
+              <a:rPr lang="en-US" b="0" dirty="0">
+                <a:solidFill>
+                  <a:srgbClr val="569CD6"/>
+                </a:solidFill>
+                <a:effectLst/>
+                <a:latin typeface="Menlo" panose="020B0609030804020204" pitchFamily="49" charset="0"/>
+              </a:rPr>
+              <a:t>&amp;</a:t>
+            </a:r>
+            <a:r>
+              <a:rPr lang="en-US" b="0" dirty="0">
+                <a:solidFill>
+                  <a:srgbClr val="CCCCCC"/>
+                </a:solidFill>
+                <a:effectLst/>
+                <a:latin typeface="Menlo" panose="020B0609030804020204" pitchFamily="49" charset="0"/>
+              </a:rPr>
+              <a:t>);</a:t>
+            </a:r>
+          </a:p>
+          <a:p>
+            <a:r>
+              <a:rPr lang="en-US" dirty="0"/>
+              <a:t>Use member initialization and right operand’s </a:t>
+            </a:r>
+            <a:r>
+              <a:rPr lang="en-US" b="0" dirty="0">
+                <a:solidFill>
+                  <a:srgbClr val="DCDCAA"/>
+                </a:solidFill>
+                <a:effectLst/>
+                <a:latin typeface="Menlo" panose="020B0609030804020204" pitchFamily="49" charset="0"/>
+              </a:rPr>
+              <a:t>min</a:t>
+            </a:r>
+            <a:r>
+              <a:rPr lang="en-US" b="0" dirty="0">
+                <a:solidFill>
+                  <a:srgbClr val="CCCCCC"/>
+                </a:solidFill>
+                <a:effectLst/>
+                <a:latin typeface="Menlo" panose="020B0609030804020204" pitchFamily="49" charset="0"/>
+              </a:rPr>
+              <a:t>() </a:t>
+            </a:r>
+            <a:r>
+              <a:rPr lang="en-US" dirty="0"/>
+              <a:t>&amp; </a:t>
+            </a:r>
+            <a:r>
+              <a:rPr lang="en-US" b="0" dirty="0">
+                <a:solidFill>
+                  <a:srgbClr val="DCDCAA"/>
+                </a:solidFill>
+                <a:effectLst/>
+                <a:latin typeface="Menlo" panose="020B0609030804020204" pitchFamily="49" charset="0"/>
+              </a:rPr>
+              <a:t>max</a:t>
+            </a:r>
+            <a:r>
+              <a:rPr lang="en-US" b="0" dirty="0">
+                <a:solidFill>
+                  <a:srgbClr val="CCCCCC"/>
+                </a:solidFill>
+                <a:effectLst/>
+                <a:latin typeface="Menlo" panose="020B0609030804020204" pitchFamily="49" charset="0"/>
+              </a:rPr>
+              <a:t>() </a:t>
+            </a:r>
+            <a:r>
+              <a:rPr lang="en-US" dirty="0"/>
+              <a:t>functions.</a:t>
+            </a:r>
+          </a:p>
+          <a:p>
+            <a:r>
+              <a:rPr lang="en-US" dirty="0"/>
+              <a:t>Copy the pointer to </a:t>
+            </a:r>
+            <a:r>
+              <a:rPr lang="en-US" dirty="0" err="1"/>
+              <a:t>rhs</a:t>
+            </a:r>
+            <a:r>
+              <a:rPr lang="en-US" dirty="0"/>
+              <a:t> data.</a:t>
+            </a:r>
+          </a:p>
+          <a:p>
+            <a:r>
+              <a:rPr lang="en-US" dirty="0"/>
+              <a:t>Assign </a:t>
+            </a:r>
+            <a:r>
+              <a:rPr lang="en-US" dirty="0" err="1"/>
+              <a:t>rhs</a:t>
+            </a:r>
+            <a:r>
+              <a:rPr lang="en-US" dirty="0"/>
+              <a:t> pointer to </a:t>
+            </a:r>
+            <a:r>
+              <a:rPr lang="en-US" dirty="0" err="1"/>
+              <a:t>nullptr</a:t>
+            </a:r>
+            <a:endParaRPr lang="en-US" dirty="0"/>
+          </a:p>
+        </p:txBody>
+      </p:sp>
+      <p:sp>
+        <p:nvSpPr>
+          <p:cNvPr id="5" name="Content Placeholder 4">
+            <a:extLst>
+              <a:ext uri="{FF2B5EF4-FFF2-40B4-BE49-F238E27FC236}">
+                <a16:creationId xmlns:a16="http://schemas.microsoft.com/office/drawing/2014/main" id="{23EC059C-5821-389E-89A5-922DDB7AA661}"/>
+              </a:ext>
+            </a:extLst>
+          </p:cNvPr>
+          <p:cNvSpPr>
+            <a:spLocks noGrp="1"/>
+          </p:cNvSpPr>
+          <p:nvPr>
+            <p:ph sz="half" idx="2"/>
+          </p:nvPr>
+        </p:nvSpPr>
+        <p:spPr>
+          <a:xfrm>
+            <a:off x="5654493" y="2056092"/>
+            <a:ext cx="6062019" cy="4200245"/>
+          </a:xfrm>
+        </p:spPr>
+        <p:txBody>
+          <a:bodyPr>
+            <a:normAutofit/>
+          </a:bodyPr>
+          <a:lstStyle/>
+          <a:p>
+            <a:r>
+              <a:rPr lang="en-US" b="0" dirty="0" err="1">
+                <a:solidFill>
+                  <a:srgbClr val="4EC9B0"/>
+                </a:solidFill>
+                <a:effectLst/>
+                <a:latin typeface="Menlo" panose="020B0609030804020204" pitchFamily="49" charset="0"/>
+              </a:rPr>
+              <a:t>CountSort</a:t>
+            </a:r>
+            <a:r>
+              <a:rPr lang="en-US" b="0" dirty="0">
+                <a:solidFill>
+                  <a:srgbClr val="CCCCCC"/>
+                </a:solidFill>
+                <a:effectLst/>
+                <a:latin typeface="Menlo" panose="020B0609030804020204" pitchFamily="49" charset="0"/>
+              </a:rPr>
+              <a:t> </a:t>
+            </a:r>
+            <a:r>
+              <a:rPr lang="en-US" b="0" dirty="0">
+                <a:solidFill>
+                  <a:srgbClr val="569CD6"/>
+                </a:solidFill>
+                <a:effectLst/>
+                <a:latin typeface="Menlo" panose="020B0609030804020204" pitchFamily="49" charset="0"/>
+              </a:rPr>
+              <a:t>&amp;</a:t>
+            </a:r>
+            <a:r>
+              <a:rPr lang="en-US" b="0" dirty="0">
+                <a:solidFill>
+                  <a:srgbClr val="C586C0"/>
+                </a:solidFill>
+                <a:effectLst/>
+                <a:latin typeface="Menlo" panose="020B0609030804020204" pitchFamily="49" charset="0"/>
+              </a:rPr>
+              <a:t>operator=</a:t>
+            </a:r>
+            <a:r>
+              <a:rPr lang="en-US" b="0" dirty="0">
+                <a:solidFill>
+                  <a:srgbClr val="CCCCCC"/>
+                </a:solidFill>
+                <a:effectLst/>
+                <a:latin typeface="Menlo" panose="020B0609030804020204" pitchFamily="49" charset="0"/>
+              </a:rPr>
+              <a:t>(</a:t>
+            </a:r>
+            <a:r>
+              <a:rPr lang="en-US" b="0" dirty="0" err="1">
+                <a:solidFill>
+                  <a:srgbClr val="4EC9B0"/>
+                </a:solidFill>
+                <a:effectLst/>
+                <a:latin typeface="Menlo" panose="020B0609030804020204" pitchFamily="49" charset="0"/>
+              </a:rPr>
+              <a:t>CountSort</a:t>
+            </a:r>
+            <a:r>
+              <a:rPr lang="en-US" b="0" dirty="0">
+                <a:solidFill>
+                  <a:srgbClr val="CCCCCC"/>
+                </a:solidFill>
+                <a:effectLst/>
+                <a:latin typeface="Menlo" panose="020B0609030804020204" pitchFamily="49" charset="0"/>
+              </a:rPr>
+              <a:t> </a:t>
+            </a:r>
+            <a:r>
+              <a:rPr lang="en-US" b="0" dirty="0">
+                <a:solidFill>
+                  <a:srgbClr val="569CD6"/>
+                </a:solidFill>
+                <a:effectLst/>
+                <a:latin typeface="Menlo" panose="020B0609030804020204" pitchFamily="49" charset="0"/>
+              </a:rPr>
+              <a:t>&amp;&amp;</a:t>
+            </a:r>
+            <a:r>
+              <a:rPr lang="en-US" b="0" dirty="0">
+                <a:solidFill>
+                  <a:srgbClr val="CCCCCC"/>
+                </a:solidFill>
+                <a:effectLst/>
+                <a:latin typeface="Menlo" panose="020B0609030804020204" pitchFamily="49" charset="0"/>
+              </a:rPr>
+              <a:t>);</a:t>
+            </a:r>
+          </a:p>
+          <a:p>
+            <a:r>
+              <a:rPr lang="en-US" dirty="0" err="1"/>
+              <a:t>CountSort</a:t>
+            </a:r>
+            <a:r>
+              <a:rPr lang="en-US" dirty="0"/>
+              <a:t> objects have const bounds and width</a:t>
+            </a:r>
+          </a:p>
+          <a:p>
+            <a:pPr lvl="1"/>
+            <a:r>
+              <a:rPr lang="en-US" dirty="0"/>
+              <a:t>Throws </a:t>
+            </a:r>
+            <a:r>
+              <a:rPr lang="en-US" b="0" dirty="0">
+                <a:solidFill>
+                  <a:srgbClr val="4EC9B0"/>
+                </a:solidFill>
+                <a:effectLst/>
+                <a:latin typeface="Menlo" panose="020B0609030804020204" pitchFamily="49" charset="0"/>
+              </a:rPr>
+              <a:t>std</a:t>
+            </a:r>
+            <a:r>
+              <a:rPr lang="en-US" b="0" dirty="0">
+                <a:solidFill>
+                  <a:srgbClr val="CCCCCC"/>
+                </a:solidFill>
+                <a:effectLst/>
+                <a:latin typeface="Menlo" panose="020B0609030804020204" pitchFamily="49" charset="0"/>
+              </a:rPr>
+              <a:t>::</a:t>
+            </a:r>
+            <a:r>
+              <a:rPr lang="en-US" b="0" dirty="0" err="1">
+                <a:solidFill>
+                  <a:srgbClr val="DCDCAA"/>
+                </a:solidFill>
+                <a:effectLst/>
+                <a:latin typeface="Menlo" panose="020B0609030804020204" pitchFamily="49" charset="0"/>
+              </a:rPr>
+              <a:t>range_error</a:t>
+            </a:r>
+            <a:r>
+              <a:rPr lang="en-US" dirty="0">
+                <a:solidFill>
+                  <a:srgbClr val="CCCCCC"/>
+                </a:solidFill>
+                <a:latin typeface="Menlo" panose="020B0609030804020204" pitchFamily="49" charset="0"/>
+              </a:rPr>
+              <a:t> </a:t>
+            </a:r>
+            <a:r>
+              <a:rPr lang="en-US" dirty="0"/>
+              <a:t>if a </a:t>
+            </a:r>
+            <a:r>
+              <a:rPr lang="en-US" dirty="0" err="1"/>
+              <a:t>CountSort</a:t>
+            </a:r>
+            <a:r>
+              <a:rPr lang="en-US" dirty="0"/>
+              <a:t> object with different bounds is assigned.</a:t>
+            </a:r>
+          </a:p>
+          <a:p>
+            <a:r>
+              <a:rPr lang="en-US" dirty="0"/>
+              <a:t>Copy right operand’s </a:t>
+            </a:r>
+            <a:r>
+              <a:rPr lang="en-US" b="0" dirty="0">
+                <a:solidFill>
+                  <a:srgbClr val="CCCCCC"/>
+                </a:solidFill>
+                <a:effectLst/>
+                <a:latin typeface="Menlo" panose="020B0609030804020204" pitchFamily="49" charset="0"/>
+              </a:rPr>
+              <a:t>size_</a:t>
+            </a:r>
+            <a:endParaRPr lang="en-US" dirty="0"/>
+          </a:p>
+          <a:p>
+            <a:r>
+              <a:rPr lang="en-US" b="0" dirty="0">
+                <a:effectLst/>
+                <a:latin typeface="+mn-lt"/>
+              </a:rPr>
+              <a:t>Free current object’s memory</a:t>
+            </a:r>
+          </a:p>
+          <a:p>
+            <a:pPr lvl="1"/>
+            <a:r>
+              <a:rPr lang="en-US" b="0" dirty="0">
+                <a:solidFill>
+                  <a:srgbClr val="C586C0"/>
+                </a:solidFill>
+                <a:effectLst/>
+                <a:latin typeface="Menlo" panose="020B0609030804020204" pitchFamily="49" charset="0"/>
+              </a:rPr>
+              <a:t>delete[]</a:t>
+            </a:r>
+            <a:r>
+              <a:rPr lang="en-US" b="0" dirty="0">
+                <a:solidFill>
+                  <a:srgbClr val="CCCCCC"/>
+                </a:solidFill>
+                <a:effectLst/>
+                <a:latin typeface="Menlo" panose="020B0609030804020204" pitchFamily="49" charset="0"/>
+              </a:rPr>
+              <a:t> numbers_;</a:t>
+            </a:r>
+          </a:p>
+          <a:p>
+            <a:r>
+              <a:rPr lang="en-US" dirty="0">
+                <a:latin typeface="+mn-lt"/>
+              </a:rPr>
+              <a:t>Copy the pointer to </a:t>
+            </a:r>
+            <a:r>
+              <a:rPr lang="en-US" dirty="0" err="1">
+                <a:latin typeface="+mn-lt"/>
+              </a:rPr>
+              <a:t>rhs</a:t>
+            </a:r>
+            <a:r>
+              <a:rPr lang="en-US" dirty="0">
+                <a:latin typeface="+mn-lt"/>
+              </a:rPr>
+              <a:t> data</a:t>
+            </a:r>
+          </a:p>
+          <a:p>
+            <a:r>
+              <a:rPr lang="en-US" dirty="0">
+                <a:latin typeface="+mn-lt"/>
+              </a:rPr>
+              <a:t>Assign </a:t>
+            </a:r>
+            <a:r>
+              <a:rPr lang="en-US" dirty="0" err="1">
+                <a:latin typeface="+mn-lt"/>
+              </a:rPr>
+              <a:t>rhs</a:t>
+            </a:r>
+            <a:r>
+              <a:rPr lang="en-US" dirty="0">
+                <a:latin typeface="+mn-lt"/>
+              </a:rPr>
+              <a:t> pointer to </a:t>
+            </a:r>
+            <a:r>
+              <a:rPr lang="en-US" dirty="0" err="1">
+                <a:latin typeface="+mn-lt"/>
+              </a:rPr>
+              <a:t>nullptr</a:t>
+            </a:r>
+            <a:r>
+              <a:rPr lang="en-US" dirty="0">
+                <a:latin typeface="+mn-lt"/>
+              </a:rPr>
+              <a:t> </a:t>
+            </a:r>
+            <a:endParaRPr lang="en-US" b="0" dirty="0">
+              <a:effectLst/>
+              <a:latin typeface="+mn-lt"/>
+            </a:endParaRPr>
+          </a:p>
+          <a:p>
+            <a:endParaRPr lang="en-US" dirty="0"/>
+          </a:p>
+        </p:txBody>
+      </p:sp>
+    </p:spTree>
+    <p:extLst>
+      <p:ext uri="{BB962C8B-B14F-4D97-AF65-F5344CB8AC3E}">
+        <p14:creationId xmlns:p14="http://schemas.microsoft.com/office/powerpoint/2010/main" val="1366252385"/>
+      </p:ext>
+    </p:extLst>
+  </p:cSld>
+  <p:clrMapOvr>
+    <a:masterClrMapping/>
+  </p:clrMapOvr>
+</p:sld>
+</file>
+
+<file path=ppt/slides/slide9.xml><?xml version="1.0" encoding="utf-8"?>
+<p:sld xmlns:a="http://schemas.openxmlformats.org/drawingml/2006/main" xmlns:r="http://schemas.openxmlformats.org/officeDocument/2006/relationships" xmlns:p="http://schemas.openxmlformats.org/presentationml/2006/main">
+  <p:cSld>
+    <p:spTree>
+      <p:nvGrpSpPr>
         <p:cNvPr id="1" name=""/>
         <p:cNvGrpSpPr/>
         <p:nvPr/>
@@ -16091,744 +17376,6 @@
     <p:extLst>
       <p:ext uri="{BB962C8B-B14F-4D97-AF65-F5344CB8AC3E}">
         <p14:creationId xmlns:p14="http://schemas.microsoft.com/office/powerpoint/2010/main" val="3929913376"/>
-      </p:ext>
-    </p:extLst>
-  </p:cSld>
-  <p:clrMapOvr>
-    <a:masterClrMapping/>
-  </p:clrMapOvr>
-</p:sld>
-</file>
-
-<file path=ppt/slides/slide9.xml><?xml version="1.0" encoding="utf-8"?>
-<p:sld xmlns:a="http://schemas.openxmlformats.org/drawingml/2006/main" xmlns:r="http://schemas.openxmlformats.org/officeDocument/2006/relationships" xmlns:p="http://schemas.openxmlformats.org/presentationml/2006/main">
-  <p:cSld>
-    <p:spTree>
-      <p:nvGrpSpPr>
-        <p:cNvPr id="1" name=""/>
-        <p:cNvGrpSpPr/>
-        <p:nvPr/>
-      </p:nvGrpSpPr>
-      <p:grpSpPr>
-        <a:xfrm>
-          <a:off x="0" y="0"/>
-          <a:ext cx="0" cy="0"/>
-          <a:chOff x="0" y="0"/>
-          <a:chExt cx="0" cy="0"/>
-        </a:xfrm>
-      </p:grpSpPr>
-      <p:sp>
-        <p:nvSpPr>
-          <p:cNvPr id="2" name="Title 1">
-            <a:extLst>
-              <a:ext uri="{FF2B5EF4-FFF2-40B4-BE49-F238E27FC236}">
-                <a16:creationId xmlns:a16="http://schemas.microsoft.com/office/drawing/2014/main" id="{6EA74FE9-F9D2-14AD-0BFF-D97091667A68}"/>
-              </a:ext>
-            </a:extLst>
-          </p:cNvPr>
-          <p:cNvSpPr>
-            <a:spLocks noGrp="1"/>
-          </p:cNvSpPr>
-          <p:nvPr>
-            <p:ph type="title"/>
-          </p:nvPr>
-        </p:nvSpPr>
-        <p:spPr/>
-        <p:txBody>
-          <a:bodyPr/>
-          <a:lstStyle/>
-          <a:p>
-            <a:r>
-              <a:rPr lang="en-US" dirty="0"/>
-              <a:t>Function Call Operator ()</a:t>
-            </a:r>
-            <a:br>
-              <a:rPr lang="en-US" dirty="0"/>
-            </a:br>
-            <a:r>
-              <a:rPr lang="en-US" dirty="0"/>
-              <a:t>&amp; Subscript Operator []</a:t>
-            </a:r>
-          </a:p>
-        </p:txBody>
-      </p:sp>
-      <p:sp>
-        <p:nvSpPr>
-          <p:cNvPr id="3" name="Content Placeholder 2">
-            <a:extLst>
-              <a:ext uri="{FF2B5EF4-FFF2-40B4-BE49-F238E27FC236}">
-                <a16:creationId xmlns:a16="http://schemas.microsoft.com/office/drawing/2014/main" id="{FBB28E39-DBF6-C515-4720-6B4C4DA3F604}"/>
-              </a:ext>
-            </a:extLst>
-          </p:cNvPr>
-          <p:cNvSpPr>
-            <a:spLocks noGrp="1"/>
-          </p:cNvSpPr>
-          <p:nvPr>
-            <p:ph sz="half" idx="1"/>
-          </p:nvPr>
-        </p:nvSpPr>
-        <p:spPr/>
-        <p:txBody>
-          <a:bodyPr>
-            <a:normAutofit fontScale="92500"/>
-          </a:bodyPr>
-          <a:lstStyle/>
-          <a:p>
-            <a:r>
-              <a:rPr lang="en-US" b="0" dirty="0">
-                <a:solidFill>
-                  <a:srgbClr val="569CD6"/>
-                </a:solidFill>
-                <a:effectLst/>
-                <a:latin typeface="Menlo" panose="020B0609030804020204" pitchFamily="49" charset="0"/>
-              </a:rPr>
-              <a:t>int</a:t>
-            </a:r>
-            <a:r>
-              <a:rPr lang="en-US" b="0" dirty="0">
-                <a:solidFill>
-                  <a:srgbClr val="CCCCCC"/>
-                </a:solidFill>
-                <a:effectLst/>
-                <a:latin typeface="Menlo" panose="020B0609030804020204" pitchFamily="49" charset="0"/>
-              </a:rPr>
-              <a:t> </a:t>
-            </a:r>
-            <a:r>
-              <a:rPr lang="en-US" b="0" dirty="0">
-                <a:solidFill>
-                  <a:srgbClr val="C586C0"/>
-                </a:solidFill>
-                <a:effectLst/>
-                <a:latin typeface="Menlo" panose="020B0609030804020204" pitchFamily="49" charset="0"/>
-              </a:rPr>
-              <a:t>operator()</a:t>
-            </a:r>
-            <a:r>
-              <a:rPr lang="en-US" b="0" dirty="0">
-                <a:solidFill>
-                  <a:srgbClr val="CCCCCC"/>
-                </a:solidFill>
-                <a:effectLst/>
-                <a:latin typeface="Menlo" panose="020B0609030804020204" pitchFamily="49" charset="0"/>
-              </a:rPr>
-              <a:t>(</a:t>
-            </a:r>
-            <a:r>
-              <a:rPr lang="en-US" b="0" dirty="0">
-                <a:solidFill>
-                  <a:srgbClr val="569CD6"/>
-                </a:solidFill>
-                <a:effectLst/>
-                <a:latin typeface="Menlo" panose="020B0609030804020204" pitchFamily="49" charset="0"/>
-              </a:rPr>
-              <a:t>int</a:t>
-            </a:r>
-            <a:r>
-              <a:rPr lang="en-US" b="0" dirty="0">
-                <a:solidFill>
-                  <a:srgbClr val="CCCCCC"/>
-                </a:solidFill>
-                <a:effectLst/>
-                <a:latin typeface="Menlo" panose="020B0609030804020204" pitchFamily="49" charset="0"/>
-              </a:rPr>
-              <a:t>) </a:t>
-            </a:r>
-            <a:r>
-              <a:rPr lang="en-US" b="0" dirty="0">
-                <a:solidFill>
-                  <a:srgbClr val="569CD6"/>
-                </a:solidFill>
-                <a:effectLst/>
-                <a:latin typeface="Menlo" panose="020B0609030804020204" pitchFamily="49" charset="0"/>
-              </a:rPr>
-              <a:t>const</a:t>
-            </a:r>
-            <a:r>
-              <a:rPr lang="en-US" b="0" dirty="0">
-                <a:solidFill>
-                  <a:srgbClr val="CCCCCC"/>
-                </a:solidFill>
-                <a:effectLst/>
-                <a:latin typeface="Menlo" panose="020B0609030804020204" pitchFamily="49" charset="0"/>
-              </a:rPr>
-              <a:t>;</a:t>
-            </a:r>
-          </a:p>
-          <a:p>
-            <a:pPr lvl="1"/>
-            <a:r>
-              <a:rPr lang="en-US" dirty="0"/>
-              <a:t>Retrieves the </a:t>
-            </a:r>
-            <a:r>
-              <a:rPr lang="en-US" b="0" dirty="0">
-                <a:solidFill>
-                  <a:srgbClr val="9CDCFE"/>
-                </a:solidFill>
-                <a:effectLst/>
-                <a:latin typeface="Menlo" panose="020B0609030804020204" pitchFamily="49" charset="0"/>
-              </a:rPr>
-              <a:t>n</a:t>
-            </a:r>
-            <a:r>
-              <a:rPr lang="en-US" dirty="0"/>
-              <a:t>th raw count from the array of counts.</a:t>
-            </a:r>
-          </a:p>
-          <a:p>
-            <a:r>
-              <a:rPr lang="en-US" dirty="0"/>
-              <a:t>Check that the index is valid</a:t>
-            </a:r>
-          </a:p>
-          <a:p>
-            <a:pPr lvl="1"/>
-            <a:r>
-              <a:rPr lang="en-US" dirty="0"/>
-              <a:t>i.e., range: [0 – width_)</a:t>
-            </a:r>
-          </a:p>
-          <a:p>
-            <a:r>
-              <a:rPr lang="en-US" b="0" dirty="0">
-                <a:solidFill>
-                  <a:srgbClr val="C586C0"/>
-                </a:solidFill>
-                <a:effectLst/>
-                <a:latin typeface="Menlo" panose="020B0609030804020204" pitchFamily="49" charset="0"/>
-              </a:rPr>
-              <a:t>return</a:t>
-            </a:r>
-            <a:r>
-              <a:rPr lang="en-US" b="0" dirty="0">
-                <a:solidFill>
-                  <a:srgbClr val="CCCCCC"/>
-                </a:solidFill>
-                <a:effectLst/>
-                <a:latin typeface="Menlo" panose="020B0609030804020204" pitchFamily="49" charset="0"/>
-              </a:rPr>
-              <a:t> </a:t>
-            </a:r>
-            <a:r>
-              <a:rPr lang="en-US" b="0" dirty="0">
-                <a:solidFill>
-                  <a:srgbClr val="9CDCFE"/>
-                </a:solidFill>
-                <a:effectLst/>
-                <a:latin typeface="Menlo" panose="020B0609030804020204" pitchFamily="49" charset="0"/>
-              </a:rPr>
-              <a:t>numbers_</a:t>
-            </a:r>
-            <a:r>
-              <a:rPr lang="en-US" b="0" dirty="0">
-                <a:solidFill>
-                  <a:srgbClr val="CCCCCC"/>
-                </a:solidFill>
-                <a:effectLst/>
-                <a:latin typeface="Menlo" panose="020B0609030804020204" pitchFamily="49" charset="0"/>
-              </a:rPr>
-              <a:t>[n];</a:t>
-            </a:r>
-          </a:p>
-        </p:txBody>
-      </p:sp>
-      <p:sp>
-        <p:nvSpPr>
-          <p:cNvPr id="4" name="Content Placeholder 3">
-            <a:extLst>
-              <a:ext uri="{FF2B5EF4-FFF2-40B4-BE49-F238E27FC236}">
-                <a16:creationId xmlns:a16="http://schemas.microsoft.com/office/drawing/2014/main" id="{04AE45DD-00E6-FDB7-260B-B57D77CE475E}"/>
-              </a:ext>
-            </a:extLst>
-          </p:cNvPr>
-          <p:cNvSpPr>
-            <a:spLocks noGrp="1"/>
-          </p:cNvSpPr>
-          <p:nvPr>
-            <p:ph sz="half" idx="2"/>
-          </p:nvPr>
-        </p:nvSpPr>
-        <p:spPr>
-          <a:xfrm>
-            <a:off x="5654493" y="2056092"/>
-            <a:ext cx="5160263" cy="4200245"/>
-          </a:xfrm>
-        </p:spPr>
-        <p:txBody>
-          <a:bodyPr>
-            <a:normAutofit fontScale="92500"/>
-          </a:bodyPr>
-          <a:lstStyle/>
-          <a:p>
-            <a:r>
-              <a:rPr lang="en-US" b="0" dirty="0">
-                <a:solidFill>
-                  <a:srgbClr val="569CD6"/>
-                </a:solidFill>
-                <a:effectLst/>
-                <a:latin typeface="Menlo" panose="020B0609030804020204" pitchFamily="49" charset="0"/>
-              </a:rPr>
-              <a:t>int</a:t>
-            </a:r>
-            <a:r>
-              <a:rPr lang="en-US" b="0" dirty="0">
-                <a:solidFill>
-                  <a:srgbClr val="CCCCCC"/>
-                </a:solidFill>
-                <a:effectLst/>
-                <a:latin typeface="Menlo" panose="020B0609030804020204" pitchFamily="49" charset="0"/>
-              </a:rPr>
-              <a:t> </a:t>
-            </a:r>
-            <a:r>
-              <a:rPr lang="en-US" b="0" dirty="0">
-                <a:solidFill>
-                  <a:srgbClr val="C586C0"/>
-                </a:solidFill>
-                <a:effectLst/>
-                <a:latin typeface="Menlo" panose="020B0609030804020204" pitchFamily="49" charset="0"/>
-              </a:rPr>
-              <a:t>operator[]</a:t>
-            </a:r>
-            <a:r>
-              <a:rPr lang="en-US" b="0" dirty="0">
-                <a:solidFill>
-                  <a:srgbClr val="CCCCCC"/>
-                </a:solidFill>
-                <a:effectLst/>
-                <a:latin typeface="Menlo" panose="020B0609030804020204" pitchFamily="49" charset="0"/>
-              </a:rPr>
-              <a:t>(</a:t>
-            </a:r>
-            <a:r>
-              <a:rPr lang="en-US" b="0" dirty="0">
-                <a:solidFill>
-                  <a:srgbClr val="569CD6"/>
-                </a:solidFill>
-                <a:effectLst/>
-                <a:latin typeface="Menlo" panose="020B0609030804020204" pitchFamily="49" charset="0"/>
-              </a:rPr>
-              <a:t>unsigned int</a:t>
-            </a:r>
-            <a:r>
-              <a:rPr lang="en-US" b="0" dirty="0">
-                <a:solidFill>
-                  <a:srgbClr val="CCCCCC"/>
-                </a:solidFill>
-                <a:effectLst/>
-                <a:latin typeface="Menlo" panose="020B0609030804020204" pitchFamily="49" charset="0"/>
-              </a:rPr>
-              <a:t>) </a:t>
-            </a:r>
-            <a:r>
-              <a:rPr lang="en-US" b="0" dirty="0">
-                <a:solidFill>
-                  <a:srgbClr val="569CD6"/>
-                </a:solidFill>
-                <a:effectLst/>
-                <a:latin typeface="Menlo" panose="020B0609030804020204" pitchFamily="49" charset="0"/>
-              </a:rPr>
-              <a:t>const</a:t>
-            </a:r>
-            <a:r>
-              <a:rPr lang="en-US" b="0" dirty="0">
-                <a:solidFill>
-                  <a:srgbClr val="CCCCCC"/>
-                </a:solidFill>
-                <a:effectLst/>
-                <a:latin typeface="Menlo" panose="020B0609030804020204" pitchFamily="49" charset="0"/>
-              </a:rPr>
-              <a:t>;</a:t>
-            </a:r>
-          </a:p>
-          <a:p>
-            <a:pPr lvl="1"/>
-            <a:r>
-              <a:rPr lang="en-US" b="0" dirty="0">
-                <a:effectLst/>
-                <a:latin typeface="+mn-lt"/>
-              </a:rPr>
-              <a:t>Retrieves the </a:t>
-            </a:r>
-            <a:r>
-              <a:rPr lang="en-US" b="0" dirty="0">
-                <a:solidFill>
-                  <a:srgbClr val="9CDCFE"/>
-                </a:solidFill>
-                <a:effectLst/>
-                <a:latin typeface="Menlo" panose="020B0609030804020204" pitchFamily="49" charset="0"/>
-              </a:rPr>
-              <a:t>n</a:t>
-            </a:r>
-            <a:r>
-              <a:rPr lang="en-US" b="0" dirty="0">
-                <a:effectLst/>
-                <a:latin typeface="+mn-lt"/>
-              </a:rPr>
-              <a:t>th </a:t>
-            </a:r>
-            <a:r>
-              <a:rPr lang="en-US" b="0" dirty="0">
-                <a:solidFill>
-                  <a:srgbClr val="569CD6"/>
-                </a:solidFill>
-                <a:effectLst/>
-                <a:latin typeface="Menlo" panose="020B0609030804020204" pitchFamily="49" charset="0"/>
-              </a:rPr>
-              <a:t>int</a:t>
-            </a:r>
-            <a:r>
-              <a:rPr lang="en-US" b="0" dirty="0">
-                <a:effectLst/>
-                <a:latin typeface="+mn-lt"/>
-              </a:rPr>
-              <a:t> from the object, in sorted order.</a:t>
-            </a:r>
-          </a:p>
-          <a:p>
-            <a:r>
-              <a:rPr lang="en-US" b="0" dirty="0">
-                <a:solidFill>
-                  <a:srgbClr val="C586C0"/>
-                </a:solidFill>
-                <a:effectLst/>
-                <a:latin typeface="Menlo" panose="020B0609030804020204" pitchFamily="49" charset="0"/>
-              </a:rPr>
-              <a:t>if</a:t>
-            </a:r>
-            <a:r>
-              <a:rPr lang="en-US" b="0" dirty="0">
-                <a:solidFill>
-                  <a:srgbClr val="CCCCCC"/>
-                </a:solidFill>
-                <a:effectLst/>
-                <a:latin typeface="Menlo" panose="020B0609030804020204" pitchFamily="49" charset="0"/>
-              </a:rPr>
-              <a:t> (size_ </a:t>
-            </a:r>
-            <a:r>
-              <a:rPr lang="en-US" b="0" dirty="0">
-                <a:solidFill>
-                  <a:srgbClr val="D4D4D4"/>
-                </a:solidFill>
-                <a:effectLst/>
-                <a:latin typeface="Menlo" panose="020B0609030804020204" pitchFamily="49" charset="0"/>
-              </a:rPr>
-              <a:t>==</a:t>
-            </a:r>
-            <a:r>
-              <a:rPr lang="en-US" b="0" dirty="0">
-                <a:solidFill>
-                  <a:srgbClr val="CCCCCC"/>
-                </a:solidFill>
-                <a:effectLst/>
-                <a:latin typeface="Menlo" panose="020B0609030804020204" pitchFamily="49" charset="0"/>
-              </a:rPr>
-              <a:t> </a:t>
-            </a:r>
-            <a:r>
-              <a:rPr lang="en-US" b="0" dirty="0">
-                <a:solidFill>
-                  <a:srgbClr val="B5CEA8"/>
-                </a:solidFill>
-                <a:effectLst/>
-                <a:latin typeface="Menlo" panose="020B0609030804020204" pitchFamily="49" charset="0"/>
-              </a:rPr>
-              <a:t>0</a:t>
-            </a:r>
-            <a:r>
-              <a:rPr lang="en-US" b="0" dirty="0">
-                <a:solidFill>
-                  <a:srgbClr val="CCCCCC"/>
-                </a:solidFill>
-                <a:effectLst/>
-                <a:latin typeface="Menlo" panose="020B0609030804020204" pitchFamily="49" charset="0"/>
-              </a:rPr>
-              <a:t>)</a:t>
-            </a:r>
-          </a:p>
-          <a:p>
-            <a:pPr lvl="1"/>
-            <a:r>
-              <a:rPr lang="en-US" b="0" dirty="0">
-                <a:solidFill>
-                  <a:srgbClr val="C586C0"/>
-                </a:solidFill>
-                <a:effectLst/>
-                <a:latin typeface="Menlo" panose="020B0609030804020204" pitchFamily="49" charset="0"/>
-              </a:rPr>
-              <a:t>throw</a:t>
-            </a:r>
-            <a:r>
-              <a:rPr lang="en-US" b="0" dirty="0">
-                <a:solidFill>
-                  <a:srgbClr val="CCCCCC"/>
-                </a:solidFill>
-                <a:effectLst/>
-                <a:latin typeface="Menlo" panose="020B0609030804020204" pitchFamily="49" charset="0"/>
-              </a:rPr>
-              <a:t> </a:t>
-            </a:r>
-            <a:r>
-              <a:rPr lang="en-US" b="0" dirty="0">
-                <a:solidFill>
-                  <a:srgbClr val="4EC9B0"/>
-                </a:solidFill>
-                <a:effectLst/>
-                <a:latin typeface="Menlo" panose="020B0609030804020204" pitchFamily="49" charset="0"/>
-              </a:rPr>
-              <a:t>std</a:t>
-            </a:r>
-            <a:r>
-              <a:rPr lang="en-US" b="0" dirty="0">
-                <a:solidFill>
-                  <a:srgbClr val="CCCCCC"/>
-                </a:solidFill>
-                <a:effectLst/>
-                <a:latin typeface="Menlo" panose="020B0609030804020204" pitchFamily="49" charset="0"/>
-              </a:rPr>
-              <a:t>::</a:t>
-            </a:r>
-            <a:r>
-              <a:rPr lang="en-US" b="0" dirty="0" err="1">
-                <a:solidFill>
-                  <a:srgbClr val="DCDCAA"/>
-                </a:solidFill>
-                <a:effectLst/>
-                <a:latin typeface="Menlo" panose="020B0609030804020204" pitchFamily="49" charset="0"/>
-              </a:rPr>
-              <a:t>out_of_range</a:t>
-            </a:r>
-            <a:endParaRPr lang="en-US" b="0" dirty="0">
-              <a:solidFill>
-                <a:srgbClr val="CCCCCC"/>
-              </a:solidFill>
-              <a:effectLst/>
-              <a:latin typeface="Menlo" panose="020B0609030804020204" pitchFamily="49" charset="0"/>
-            </a:endParaRPr>
-          </a:p>
-          <a:p>
-            <a:r>
-              <a:rPr lang="en-US" dirty="0"/>
-              <a:t>Check that the index is valid</a:t>
-            </a:r>
-          </a:p>
-          <a:p>
-            <a:pPr lvl="1"/>
-            <a:r>
-              <a:rPr lang="en-US" dirty="0"/>
-              <a:t>i.e., range: [0 – size_)</a:t>
-            </a:r>
-          </a:p>
-          <a:p>
-            <a:r>
-              <a:rPr lang="en-US" b="0" dirty="0">
-                <a:effectLst/>
-                <a:latin typeface="+mn-lt"/>
-              </a:rPr>
-              <a:t>Use </a:t>
-            </a:r>
-            <a:r>
-              <a:rPr lang="en-US" b="0" dirty="0" err="1">
-                <a:solidFill>
-                  <a:srgbClr val="4EC9B0"/>
-                </a:solidFill>
-                <a:effectLst/>
-                <a:latin typeface="Menlo" panose="020B0609030804020204" pitchFamily="49" charset="0"/>
-              </a:rPr>
-              <a:t>CountSort</a:t>
-            </a:r>
-            <a:r>
-              <a:rPr lang="en-US" b="0" dirty="0">
-                <a:solidFill>
-                  <a:srgbClr val="CCCCCC"/>
-                </a:solidFill>
-                <a:effectLst/>
-                <a:latin typeface="Menlo" panose="020B0609030804020204" pitchFamily="49" charset="0"/>
-              </a:rPr>
-              <a:t>::</a:t>
-            </a:r>
-            <a:r>
-              <a:rPr lang="en-US" b="0" dirty="0">
-                <a:solidFill>
-                  <a:srgbClr val="4EC9B0"/>
-                </a:solidFill>
-                <a:effectLst/>
-                <a:latin typeface="Menlo" panose="020B0609030804020204" pitchFamily="49" charset="0"/>
-              </a:rPr>
-              <a:t>Iterator</a:t>
-            </a:r>
-            <a:r>
-              <a:rPr lang="en-US" b="0" dirty="0">
-                <a:solidFill>
-                  <a:srgbClr val="CCCCCC"/>
-                </a:solidFill>
-                <a:effectLst/>
-                <a:latin typeface="Menlo" panose="020B0609030804020204" pitchFamily="49" charset="0"/>
-              </a:rPr>
-              <a:t> </a:t>
-            </a:r>
-            <a:r>
-              <a:rPr lang="en-US" b="0" dirty="0">
-                <a:effectLst/>
-                <a:latin typeface="+mn-lt"/>
-              </a:rPr>
-              <a:t>to retrieve requested integer:</a:t>
-            </a:r>
-          </a:p>
-          <a:p>
-            <a:pPr marL="400050" lvl="1" indent="0">
-              <a:buNone/>
-            </a:pPr>
-            <a:r>
-              <a:rPr lang="en-US" b="0" dirty="0">
-                <a:solidFill>
-                  <a:srgbClr val="CCCCCC"/>
-                </a:solidFill>
-                <a:effectLst/>
-                <a:latin typeface="Menlo" panose="020B0609030804020204" pitchFamily="49" charset="0"/>
-              </a:rPr>
-              <a:t>Iterator it </a:t>
-            </a:r>
-            <a:r>
-              <a:rPr lang="en-US" b="0" dirty="0">
-                <a:solidFill>
-                  <a:srgbClr val="D4D4D4"/>
-                </a:solidFill>
-                <a:effectLst/>
-                <a:latin typeface="Menlo" panose="020B0609030804020204" pitchFamily="49" charset="0"/>
-              </a:rPr>
-              <a:t>=</a:t>
-            </a:r>
-            <a:r>
-              <a:rPr lang="en-US" b="0" dirty="0">
-                <a:solidFill>
-                  <a:srgbClr val="CCCCCC"/>
-                </a:solidFill>
-                <a:effectLst/>
-                <a:latin typeface="Menlo" panose="020B0609030804020204" pitchFamily="49" charset="0"/>
-              </a:rPr>
-              <a:t> </a:t>
-            </a:r>
-            <a:r>
-              <a:rPr lang="en-US" b="0" dirty="0">
-                <a:solidFill>
-                  <a:srgbClr val="DCDCAA"/>
-                </a:solidFill>
-                <a:effectLst/>
-                <a:latin typeface="Menlo" panose="020B0609030804020204" pitchFamily="49" charset="0"/>
-              </a:rPr>
-              <a:t>begin</a:t>
-            </a:r>
-            <a:r>
-              <a:rPr lang="en-US" b="0" dirty="0">
-                <a:solidFill>
-                  <a:srgbClr val="CCCCCC"/>
-                </a:solidFill>
-                <a:effectLst/>
-                <a:latin typeface="Menlo" panose="020B0609030804020204" pitchFamily="49" charset="0"/>
-              </a:rPr>
-              <a:t>();</a:t>
-            </a:r>
-          </a:p>
-          <a:p>
-            <a:pPr marL="400050" lvl="1" indent="0">
-              <a:buNone/>
-            </a:pPr>
-            <a:r>
-              <a:rPr lang="en-US" b="0" dirty="0">
-                <a:solidFill>
-                  <a:srgbClr val="4EC9B0"/>
-                </a:solidFill>
-                <a:effectLst/>
-                <a:latin typeface="Menlo" panose="020B0609030804020204" pitchFamily="49" charset="0"/>
-              </a:rPr>
-              <a:t>std</a:t>
-            </a:r>
-            <a:r>
-              <a:rPr lang="en-US" b="0" dirty="0">
-                <a:solidFill>
-                  <a:srgbClr val="CCCCCC"/>
-                </a:solidFill>
-                <a:effectLst/>
-                <a:latin typeface="Menlo" panose="020B0609030804020204" pitchFamily="49" charset="0"/>
-              </a:rPr>
-              <a:t>::</a:t>
-            </a:r>
-            <a:r>
-              <a:rPr lang="en-US" b="0" dirty="0">
-                <a:solidFill>
-                  <a:srgbClr val="DCDCAA"/>
-                </a:solidFill>
-                <a:effectLst/>
-                <a:latin typeface="Menlo" panose="020B0609030804020204" pitchFamily="49" charset="0"/>
-              </a:rPr>
-              <a:t>advance</a:t>
-            </a:r>
-            <a:r>
-              <a:rPr lang="en-US" b="0" dirty="0">
-                <a:solidFill>
-                  <a:srgbClr val="CCCCCC"/>
-                </a:solidFill>
-                <a:effectLst/>
-                <a:latin typeface="Menlo" panose="020B0609030804020204" pitchFamily="49" charset="0"/>
-              </a:rPr>
-              <a:t>(it, n);</a:t>
-            </a:r>
-          </a:p>
-          <a:p>
-            <a:pPr marL="400050" lvl="1" indent="0">
-              <a:buNone/>
-            </a:pPr>
-            <a:r>
-              <a:rPr lang="en-US" b="0" dirty="0">
-                <a:solidFill>
-                  <a:srgbClr val="C586C0"/>
-                </a:solidFill>
-                <a:effectLst/>
-                <a:latin typeface="Menlo" panose="020B0609030804020204" pitchFamily="49" charset="0"/>
-              </a:rPr>
-              <a:t>return</a:t>
-            </a:r>
-            <a:r>
-              <a:rPr lang="en-US" b="0" dirty="0">
-                <a:solidFill>
-                  <a:srgbClr val="CCCCCC"/>
-                </a:solidFill>
-                <a:effectLst/>
-                <a:latin typeface="Menlo" panose="020B0609030804020204" pitchFamily="49" charset="0"/>
-              </a:rPr>
-              <a:t> </a:t>
-            </a:r>
-            <a:r>
-              <a:rPr lang="en-US" b="0" dirty="0">
-                <a:solidFill>
-                  <a:srgbClr val="D4D4D4"/>
-                </a:solidFill>
-                <a:effectLst/>
-                <a:latin typeface="Menlo" panose="020B0609030804020204" pitchFamily="49" charset="0"/>
-              </a:rPr>
-              <a:t>*</a:t>
-            </a:r>
-            <a:r>
-              <a:rPr lang="en-US" b="0" dirty="0">
-                <a:solidFill>
-                  <a:srgbClr val="CCCCCC"/>
-                </a:solidFill>
-                <a:effectLst/>
-                <a:latin typeface="Menlo" panose="020B0609030804020204" pitchFamily="49" charset="0"/>
-              </a:rPr>
-              <a:t>it;</a:t>
-            </a:r>
-          </a:p>
-        </p:txBody>
-      </p:sp>
-    </p:spTree>
-    <p:extLst>
-      <p:ext uri="{BB962C8B-B14F-4D97-AF65-F5344CB8AC3E}">
-        <p14:creationId xmlns:p14="http://schemas.microsoft.com/office/powerpoint/2010/main" val="3029851682"/>
       </p:ext>
     </p:extLst>
   </p:cSld>

</xml_diff>

<commit_message>
Self-assignment check for using std::copy
</commit_message>
<xml_diff>
--- a/Presentation/HW7_presentation.pptx
+++ b/Presentation/HW7_presentation.pptx
@@ -215,7 +215,7 @@
           <a:p>
             <a:fld id="{45B120F0-C4B5-D343-A50D-56CA55199F0D}" type="datetimeFigureOut">
               <a:rPr lang="en-US" smtClean="0"/>
-              <a:t>10/8/24</a:t>
+              <a:t>10/15/24</a:t>
             </a:fld>
             <a:endParaRPr lang="en-US"/>
           </a:p>
@@ -836,7 +836,7 @@
           <a:p>
             <a:fld id="{4AAD347D-5ACD-4C99-B74B-A9C85AD731AF}" type="datetimeFigureOut">
               <a:rPr lang="en-US" dirty="0"/>
-              <a:t>10/8/24</a:t>
+              <a:t>10/15/24</a:t>
             </a:fld>
             <a:endParaRPr lang="en-US" dirty="0"/>
           </a:p>
@@ -1106,7 +1106,7 @@
           <a:p>
             <a:fld id="{4509A250-FF31-4206-8172-F9D3106AACB1}" type="datetimeFigureOut">
               <a:rPr lang="en-US" dirty="0"/>
-              <a:t>10/8/24</a:t>
+              <a:t>10/15/24</a:t>
             </a:fld>
             <a:endParaRPr lang="en-US" dirty="0"/>
           </a:p>
@@ -1295,7 +1295,7 @@
           <a:p>
             <a:fld id="{4509A250-FF31-4206-8172-F9D3106AACB1}" type="datetimeFigureOut">
               <a:rPr lang="en-US" dirty="0"/>
-              <a:t>10/8/24</a:t>
+              <a:t>10/15/24</a:t>
             </a:fld>
             <a:endParaRPr lang="en-US" dirty="0"/>
           </a:p>
@@ -1563,7 +1563,7 @@
           <a:p>
             <a:fld id="{4509A250-FF31-4206-8172-F9D3106AACB1}" type="datetimeFigureOut">
               <a:rPr lang="en-US" dirty="0"/>
-              <a:t>10/8/24</a:t>
+              <a:t>10/15/24</a:t>
             </a:fld>
             <a:endParaRPr lang="en-US" dirty="0"/>
           </a:p>
@@ -1899,7 +1899,7 @@
           <a:p>
             <a:fld id="{4509A250-FF31-4206-8172-F9D3106AACB1}" type="datetimeFigureOut">
               <a:rPr lang="en-US" dirty="0"/>
-              <a:t>10/8/24</a:t>
+              <a:t>10/15/24</a:t>
             </a:fld>
             <a:endParaRPr lang="en-US" dirty="0"/>
           </a:p>
@@ -2517,7 +2517,7 @@
           <a:p>
             <a:fld id="{4509A250-FF31-4206-8172-F9D3106AACB1}" type="datetimeFigureOut">
               <a:rPr lang="en-US" dirty="0"/>
-              <a:t>10/8/24</a:t>
+              <a:t>10/15/24</a:t>
             </a:fld>
             <a:endParaRPr lang="en-US" dirty="0"/>
           </a:p>
@@ -3372,7 +3372,7 @@
           <a:p>
             <a:fld id="{4509A250-FF31-4206-8172-F9D3106AACB1}" type="datetimeFigureOut">
               <a:rPr lang="en-US" dirty="0"/>
-              <a:t>10/8/24</a:t>
+              <a:t>10/15/24</a:t>
             </a:fld>
             <a:endParaRPr lang="en-US" dirty="0"/>
           </a:p>
@@ -3537,7 +3537,7 @@
           <a:p>
             <a:fld id="{4509A250-FF31-4206-8172-F9D3106AACB1}" type="datetimeFigureOut">
               <a:rPr lang="en-US" dirty="0"/>
-              <a:t>10/8/24</a:t>
+              <a:t>10/15/24</a:t>
             </a:fld>
             <a:endParaRPr lang="en-US" dirty="0"/>
           </a:p>
@@ -3712,7 +3712,7 @@
           <a:p>
             <a:fld id="{4509A250-FF31-4206-8172-F9D3106AACB1}" type="datetimeFigureOut">
               <a:rPr lang="en-US" dirty="0"/>
-              <a:t>10/8/24</a:t>
+              <a:t>10/15/24</a:t>
             </a:fld>
             <a:endParaRPr lang="en-US" dirty="0"/>
           </a:p>
@@ -3877,7 +3877,7 @@
           <a:p>
             <a:fld id="{4509A250-FF31-4206-8172-F9D3106AACB1}" type="datetimeFigureOut">
               <a:rPr lang="en-US" dirty="0"/>
-              <a:t>10/8/24</a:t>
+              <a:t>10/15/24</a:t>
             </a:fld>
             <a:endParaRPr lang="en-US" dirty="0"/>
           </a:p>
@@ -4119,7 +4119,7 @@
           <a:p>
             <a:fld id="{9796027F-7875-4030-9381-8BD8C4F21935}" type="datetimeFigureOut">
               <a:rPr lang="en-US" dirty="0"/>
-              <a:t>10/8/24</a:t>
+              <a:t>10/15/24</a:t>
             </a:fld>
             <a:endParaRPr lang="en-US" dirty="0"/>
           </a:p>
@@ -4406,7 +4406,7 @@
           <a:p>
             <a:fld id="{9796027F-7875-4030-9381-8BD8C4F21935}" type="datetimeFigureOut">
               <a:rPr lang="en-US" dirty="0"/>
-              <a:t>10/8/24</a:t>
+              <a:t>10/15/24</a:t>
             </a:fld>
             <a:endParaRPr lang="en-US" dirty="0"/>
           </a:p>
@@ -4845,7 +4845,7 @@
           <a:p>
             <a:fld id="{9796027F-7875-4030-9381-8BD8C4F21935}" type="datetimeFigureOut">
               <a:rPr lang="en-US" dirty="0"/>
-              <a:t>10/8/24</a:t>
+              <a:t>10/15/24</a:t>
             </a:fld>
             <a:endParaRPr lang="en-US" dirty="0"/>
           </a:p>
@@ -4958,7 +4958,7 @@
           <a:p>
             <a:fld id="{4509A250-FF31-4206-8172-F9D3106AACB1}" type="datetimeFigureOut">
               <a:rPr lang="en-US" dirty="0"/>
-              <a:t>10/8/24</a:t>
+              <a:t>10/15/24</a:t>
             </a:fld>
             <a:endParaRPr lang="en-US" dirty="0"/>
           </a:p>
@@ -5048,7 +5048,7 @@
           <a:p>
             <a:fld id="{4509A250-FF31-4206-8172-F9D3106AACB1}" type="datetimeFigureOut">
               <a:rPr lang="en-US" dirty="0"/>
-              <a:t>10/8/24</a:t>
+              <a:t>10/15/24</a:t>
             </a:fld>
             <a:endParaRPr lang="en-US" dirty="0"/>
           </a:p>
@@ -5322,7 +5322,7 @@
           <a:p>
             <a:fld id="{4509A250-FF31-4206-8172-F9D3106AACB1}" type="datetimeFigureOut">
               <a:rPr lang="en-US" dirty="0"/>
-              <a:t>10/8/24</a:t>
+              <a:t>10/15/24</a:t>
             </a:fld>
             <a:endParaRPr lang="en-US" dirty="0"/>
           </a:p>
@@ -5592,7 +5592,7 @@
           <a:p>
             <a:fld id="{4509A250-FF31-4206-8172-F9D3106AACB1}" type="datetimeFigureOut">
               <a:rPr lang="en-US" dirty="0"/>
-              <a:t>10/8/24</a:t>
+              <a:t>10/15/24</a:t>
             </a:fld>
             <a:endParaRPr lang="en-US" dirty="0"/>
           </a:p>
@@ -6016,7 +6016,7 @@
           <a:p>
             <a:fld id="{4AAD347D-5ACD-4C99-B74B-A9C85AD731AF}" type="datetimeFigureOut">
               <a:rPr lang="en-US" dirty="0"/>
-              <a:t>10/8/24</a:t>
+              <a:t>10/15/24</a:t>
             </a:fld>
             <a:endParaRPr lang="en-US" dirty="0"/>
           </a:p>
@@ -15836,7 +15836,7 @@
         </p:spPr>
         <p:txBody>
           <a:bodyPr>
-            <a:normAutofit/>
+            <a:normAutofit lnSpcReduction="10000"/>
           </a:bodyPr>
           <a:lstStyle/>
           <a:p>
@@ -15997,8 +15997,13 @@
             <a:pPr lvl="1"/>
             <a:r>
               <a:rPr lang="en-US" dirty="0"/>
-              <a:t>No concern with self-assignment</a:t>
-            </a:r>
+              <a:t>We check for self-assignment anyway because std::copy() is undefined for </a:t>
+            </a:r>
+            <a:r>
+              <a:rPr lang="en-US"/>
+              <a:t>overlapping range</a:t>
+            </a:r>
+            <a:endParaRPr lang="en-US" dirty="0"/>
           </a:p>
         </p:txBody>
       </p:sp>
@@ -16026,7 +16031,7 @@
         </p:spPr>
         <p:txBody>
           <a:bodyPr>
-            <a:normAutofit/>
+            <a:normAutofit lnSpcReduction="10000"/>
           </a:bodyPr>
           <a:lstStyle/>
           <a:p>

</xml_diff>

<commit_message>
limts -> climits, slideshow update, remove redundant overflow check
</commit_message>
<xml_diff>
--- a/Presentation/HW7_presentation.pptx
+++ b/Presentation/HW7_presentation.pptx
@@ -215,7 +215,7 @@
           <a:p>
             <a:fld id="{45B120F0-C4B5-D343-A50D-56CA55199F0D}" type="datetimeFigureOut">
               <a:rPr lang="en-US" smtClean="0"/>
-              <a:t>10/15/24</a:t>
+              <a:t>11/20/24</a:t>
             </a:fld>
             <a:endParaRPr lang="en-US"/>
           </a:p>
@@ -836,7 +836,7 @@
           <a:p>
             <a:fld id="{4AAD347D-5ACD-4C99-B74B-A9C85AD731AF}" type="datetimeFigureOut">
               <a:rPr lang="en-US" dirty="0"/>
-              <a:t>10/15/24</a:t>
+              <a:t>11/20/24</a:t>
             </a:fld>
             <a:endParaRPr lang="en-US" dirty="0"/>
           </a:p>
@@ -1106,7 +1106,7 @@
           <a:p>
             <a:fld id="{4509A250-FF31-4206-8172-F9D3106AACB1}" type="datetimeFigureOut">
               <a:rPr lang="en-US" dirty="0"/>
-              <a:t>10/15/24</a:t>
+              <a:t>11/20/24</a:t>
             </a:fld>
             <a:endParaRPr lang="en-US" dirty="0"/>
           </a:p>
@@ -1295,7 +1295,7 @@
           <a:p>
             <a:fld id="{4509A250-FF31-4206-8172-F9D3106AACB1}" type="datetimeFigureOut">
               <a:rPr lang="en-US" dirty="0"/>
-              <a:t>10/15/24</a:t>
+              <a:t>11/20/24</a:t>
             </a:fld>
             <a:endParaRPr lang="en-US" dirty="0"/>
           </a:p>
@@ -1563,7 +1563,7 @@
           <a:p>
             <a:fld id="{4509A250-FF31-4206-8172-F9D3106AACB1}" type="datetimeFigureOut">
               <a:rPr lang="en-US" dirty="0"/>
-              <a:t>10/15/24</a:t>
+              <a:t>11/20/24</a:t>
             </a:fld>
             <a:endParaRPr lang="en-US" dirty="0"/>
           </a:p>
@@ -1899,7 +1899,7 @@
           <a:p>
             <a:fld id="{4509A250-FF31-4206-8172-F9D3106AACB1}" type="datetimeFigureOut">
               <a:rPr lang="en-US" dirty="0"/>
-              <a:t>10/15/24</a:t>
+              <a:t>11/20/24</a:t>
             </a:fld>
             <a:endParaRPr lang="en-US" dirty="0"/>
           </a:p>
@@ -2517,7 +2517,7 @@
           <a:p>
             <a:fld id="{4509A250-FF31-4206-8172-F9D3106AACB1}" type="datetimeFigureOut">
               <a:rPr lang="en-US" dirty="0"/>
-              <a:t>10/15/24</a:t>
+              <a:t>11/20/24</a:t>
             </a:fld>
             <a:endParaRPr lang="en-US" dirty="0"/>
           </a:p>
@@ -3372,7 +3372,7 @@
           <a:p>
             <a:fld id="{4509A250-FF31-4206-8172-F9D3106AACB1}" type="datetimeFigureOut">
               <a:rPr lang="en-US" dirty="0"/>
-              <a:t>10/15/24</a:t>
+              <a:t>11/20/24</a:t>
             </a:fld>
             <a:endParaRPr lang="en-US" dirty="0"/>
           </a:p>
@@ -3537,7 +3537,7 @@
           <a:p>
             <a:fld id="{4509A250-FF31-4206-8172-F9D3106AACB1}" type="datetimeFigureOut">
               <a:rPr lang="en-US" dirty="0"/>
-              <a:t>10/15/24</a:t>
+              <a:t>11/20/24</a:t>
             </a:fld>
             <a:endParaRPr lang="en-US" dirty="0"/>
           </a:p>
@@ -3712,7 +3712,7 @@
           <a:p>
             <a:fld id="{4509A250-FF31-4206-8172-F9D3106AACB1}" type="datetimeFigureOut">
               <a:rPr lang="en-US" dirty="0"/>
-              <a:t>10/15/24</a:t>
+              <a:t>11/20/24</a:t>
             </a:fld>
             <a:endParaRPr lang="en-US" dirty="0"/>
           </a:p>
@@ -3877,7 +3877,7 @@
           <a:p>
             <a:fld id="{4509A250-FF31-4206-8172-F9D3106AACB1}" type="datetimeFigureOut">
               <a:rPr lang="en-US" dirty="0"/>
-              <a:t>10/15/24</a:t>
+              <a:t>11/20/24</a:t>
             </a:fld>
             <a:endParaRPr lang="en-US" dirty="0"/>
           </a:p>
@@ -4119,7 +4119,7 @@
           <a:p>
             <a:fld id="{9796027F-7875-4030-9381-8BD8C4F21935}" type="datetimeFigureOut">
               <a:rPr lang="en-US" dirty="0"/>
-              <a:t>10/15/24</a:t>
+              <a:t>11/20/24</a:t>
             </a:fld>
             <a:endParaRPr lang="en-US" dirty="0"/>
           </a:p>
@@ -4406,7 +4406,7 @@
           <a:p>
             <a:fld id="{9796027F-7875-4030-9381-8BD8C4F21935}" type="datetimeFigureOut">
               <a:rPr lang="en-US" dirty="0"/>
-              <a:t>10/15/24</a:t>
+              <a:t>11/20/24</a:t>
             </a:fld>
             <a:endParaRPr lang="en-US" dirty="0"/>
           </a:p>
@@ -4845,7 +4845,7 @@
           <a:p>
             <a:fld id="{9796027F-7875-4030-9381-8BD8C4F21935}" type="datetimeFigureOut">
               <a:rPr lang="en-US" dirty="0"/>
-              <a:t>10/15/24</a:t>
+              <a:t>11/20/24</a:t>
             </a:fld>
             <a:endParaRPr lang="en-US" dirty="0"/>
           </a:p>
@@ -4958,7 +4958,7 @@
           <a:p>
             <a:fld id="{4509A250-FF31-4206-8172-F9D3106AACB1}" type="datetimeFigureOut">
               <a:rPr lang="en-US" dirty="0"/>
-              <a:t>10/15/24</a:t>
+              <a:t>11/20/24</a:t>
             </a:fld>
             <a:endParaRPr lang="en-US" dirty="0"/>
           </a:p>
@@ -5048,7 +5048,7 @@
           <a:p>
             <a:fld id="{4509A250-FF31-4206-8172-F9D3106AACB1}" type="datetimeFigureOut">
               <a:rPr lang="en-US" dirty="0"/>
-              <a:t>10/15/24</a:t>
+              <a:t>11/20/24</a:t>
             </a:fld>
             <a:endParaRPr lang="en-US" dirty="0"/>
           </a:p>
@@ -5322,7 +5322,7 @@
           <a:p>
             <a:fld id="{4509A250-FF31-4206-8172-F9D3106AACB1}" type="datetimeFigureOut">
               <a:rPr lang="en-US" dirty="0"/>
-              <a:t>10/15/24</a:t>
+              <a:t>11/20/24</a:t>
             </a:fld>
             <a:endParaRPr lang="en-US" dirty="0"/>
           </a:p>
@@ -5592,7 +5592,7 @@
           <a:p>
             <a:fld id="{4509A250-FF31-4206-8172-F9D3106AACB1}" type="datetimeFigureOut">
               <a:rPr lang="en-US" dirty="0"/>
-              <a:t>10/15/24</a:t>
+              <a:t>11/20/24</a:t>
             </a:fld>
             <a:endParaRPr lang="en-US" dirty="0"/>
           </a:p>
@@ -6016,7 +6016,7 @@
           <a:p>
             <a:fld id="{4AAD347D-5ACD-4C99-B74B-A9C85AD731AF}" type="datetimeFigureOut">
               <a:rPr lang="en-US" dirty="0"/>
-              <a:t>10/15/24</a:t>
+              <a:t>11/20/24</a:t>
             </a:fld>
             <a:endParaRPr lang="en-US" dirty="0"/>
           </a:p>
@@ -15429,7 +15429,7 @@
         </p:spPr>
         <p:txBody>
           <a:bodyPr>
-            <a:normAutofit/>
+            <a:normAutofit lnSpcReduction="10000"/>
           </a:bodyPr>
           <a:lstStyle/>
           <a:p>
@@ -15661,84 +15661,277 @@
               <a:rPr lang="en-US" dirty="0">
                 <a:latin typeface="+mn-lt"/>
               </a:rPr>
-              <a:t>Subtracts lower bound from upper bound using GNU built-in arithmetic function that checks for overflow</a:t>
-            </a:r>
-          </a:p>
-          <a:p>
-            <a:pPr lvl="1"/>
+              <a:t>Prevents overflow by checking:</a:t>
+            </a:r>
+          </a:p>
+          <a:p>
+            <a:pPr lvl="2"/>
+            <a:r>
+              <a:rPr lang="en-US" b="0" dirty="0">
+                <a:solidFill>
+                  <a:srgbClr val="C586C0"/>
+                </a:solidFill>
+                <a:effectLst/>
+                <a:latin typeface="Menlo" panose="020B0609030804020204" pitchFamily="49" charset="0"/>
+              </a:rPr>
+              <a:t>if</a:t>
+            </a:r>
+            <a:r>
+              <a:rPr lang="en-US" b="0" dirty="0">
+                <a:solidFill>
+                  <a:srgbClr val="CCCCCC"/>
+                </a:solidFill>
+                <a:effectLst/>
+                <a:latin typeface="Menlo" panose="020B0609030804020204" pitchFamily="49" charset="0"/>
+              </a:rPr>
+              <a:t> (</a:t>
+            </a:r>
+            <a:r>
+              <a:rPr lang="en-US" b="0" dirty="0" err="1">
+                <a:solidFill>
+                  <a:srgbClr val="9CDCFE"/>
+                </a:solidFill>
+                <a:effectLst/>
+                <a:latin typeface="Menlo" panose="020B0609030804020204" pitchFamily="49" charset="0"/>
+              </a:rPr>
+              <a:t>ub</a:t>
+            </a:r>
+            <a:r>
+              <a:rPr lang="en-US" b="0" dirty="0">
+                <a:solidFill>
+                  <a:srgbClr val="CCCCCC"/>
+                </a:solidFill>
+                <a:effectLst/>
+                <a:latin typeface="Menlo" panose="020B0609030804020204" pitchFamily="49" charset="0"/>
+              </a:rPr>
+              <a:t> </a:t>
+            </a:r>
+            <a:r>
+              <a:rPr lang="en-US" b="0" dirty="0">
+                <a:solidFill>
+                  <a:srgbClr val="D4D4D4"/>
+                </a:solidFill>
+                <a:effectLst/>
+                <a:latin typeface="Menlo" panose="020B0609030804020204" pitchFamily="49" charset="0"/>
+              </a:rPr>
+              <a:t>==</a:t>
+            </a:r>
+            <a:r>
+              <a:rPr lang="en-US" b="0" dirty="0">
+                <a:solidFill>
+                  <a:srgbClr val="CCCCCC"/>
+                </a:solidFill>
+                <a:effectLst/>
+                <a:latin typeface="Menlo" panose="020B0609030804020204" pitchFamily="49" charset="0"/>
+              </a:rPr>
+              <a:t> </a:t>
+            </a:r>
+            <a:r>
+              <a:rPr lang="en-US" b="0" dirty="0">
+                <a:solidFill>
+                  <a:srgbClr val="569CD6"/>
+                </a:solidFill>
+                <a:effectLst/>
+                <a:latin typeface="Menlo" panose="020B0609030804020204" pitchFamily="49" charset="0"/>
+              </a:rPr>
+              <a:t>INT_MAX</a:t>
+            </a:r>
+            <a:r>
+              <a:rPr lang="en-US" b="0" dirty="0">
+                <a:solidFill>
+                  <a:srgbClr val="CCCCCC"/>
+                </a:solidFill>
+                <a:effectLst/>
+                <a:latin typeface="Menlo" panose="020B0609030804020204" pitchFamily="49" charset="0"/>
+              </a:rPr>
+              <a:t> </a:t>
+            </a:r>
+            <a:r>
+              <a:rPr lang="en-US" b="0" dirty="0">
+                <a:solidFill>
+                  <a:srgbClr val="D4D4D4"/>
+                </a:solidFill>
+                <a:effectLst/>
+                <a:latin typeface="Menlo" panose="020B0609030804020204" pitchFamily="49" charset="0"/>
+              </a:rPr>
+              <a:t>&amp;&amp;</a:t>
+            </a:r>
+            <a:r>
+              <a:rPr lang="en-US" b="0" dirty="0">
+                <a:solidFill>
+                  <a:srgbClr val="CCCCCC"/>
+                </a:solidFill>
+                <a:effectLst/>
+                <a:latin typeface="Menlo" panose="020B0609030804020204" pitchFamily="49" charset="0"/>
+              </a:rPr>
+              <a:t> </a:t>
+            </a:r>
+            <a:r>
+              <a:rPr lang="en-US" b="0" dirty="0" err="1">
+                <a:solidFill>
+                  <a:srgbClr val="9CDCFE"/>
+                </a:solidFill>
+                <a:effectLst/>
+                <a:latin typeface="Menlo" panose="020B0609030804020204" pitchFamily="49" charset="0"/>
+              </a:rPr>
+              <a:t>lb</a:t>
+            </a:r>
+            <a:r>
+              <a:rPr lang="en-US" b="0" dirty="0">
+                <a:solidFill>
+                  <a:srgbClr val="CCCCCC"/>
+                </a:solidFill>
+                <a:effectLst/>
+                <a:latin typeface="Menlo" panose="020B0609030804020204" pitchFamily="49" charset="0"/>
+              </a:rPr>
+              <a:t> </a:t>
+            </a:r>
+            <a:r>
+              <a:rPr lang="en-US" b="0" dirty="0">
+                <a:solidFill>
+                  <a:srgbClr val="D4D4D4"/>
+                </a:solidFill>
+                <a:effectLst/>
+                <a:latin typeface="Menlo" panose="020B0609030804020204" pitchFamily="49" charset="0"/>
+              </a:rPr>
+              <a:t>==</a:t>
+            </a:r>
+            <a:r>
+              <a:rPr lang="en-US" b="0" dirty="0">
+                <a:solidFill>
+                  <a:srgbClr val="CCCCCC"/>
+                </a:solidFill>
+                <a:effectLst/>
+                <a:latin typeface="Menlo" panose="020B0609030804020204" pitchFamily="49" charset="0"/>
+              </a:rPr>
+              <a:t> </a:t>
+            </a:r>
+            <a:r>
+              <a:rPr lang="en-US" b="0" dirty="0">
+                <a:solidFill>
+                  <a:srgbClr val="569CD6"/>
+                </a:solidFill>
+                <a:effectLst/>
+                <a:latin typeface="Menlo" panose="020B0609030804020204" pitchFamily="49" charset="0"/>
+              </a:rPr>
+              <a:t>INT_MIN</a:t>
+            </a:r>
+            <a:r>
+              <a:rPr lang="en-US" b="0" dirty="0">
+                <a:solidFill>
+                  <a:srgbClr val="CCCCCC"/>
+                </a:solidFill>
+                <a:effectLst/>
+                <a:latin typeface="Menlo" panose="020B0609030804020204" pitchFamily="49" charset="0"/>
+              </a:rPr>
+              <a:t>) { … }</a:t>
+            </a:r>
+          </a:p>
+          <a:p>
+            <a:pPr lvl="2"/>
             <a:r>
               <a:rPr lang="en-US" dirty="0">
                 <a:latin typeface="+mn-lt"/>
               </a:rPr>
-              <a:t>Returns resulting </a:t>
-            </a:r>
-            <a:r>
-              <a:rPr lang="en-US" b="0" dirty="0">
-                <a:solidFill>
-                  <a:srgbClr val="569CD6"/>
-                </a:solidFill>
-                <a:effectLst/>
-                <a:latin typeface="Menlo" panose="020B0609030804020204" pitchFamily="49" charset="0"/>
-              </a:rPr>
-              <a:t>unsigned</a:t>
-            </a:r>
-            <a:r>
-              <a:rPr lang="en-US" b="0" dirty="0">
-                <a:solidFill>
-                  <a:srgbClr val="CCCCCC"/>
-                </a:solidFill>
-                <a:effectLst/>
-                <a:latin typeface="Menlo" panose="020B0609030804020204" pitchFamily="49" charset="0"/>
-              </a:rPr>
-              <a:t> </a:t>
-            </a:r>
-            <a:r>
-              <a:rPr lang="en-US" b="0" dirty="0">
-                <a:solidFill>
-                  <a:srgbClr val="569CD6"/>
-                </a:solidFill>
-                <a:effectLst/>
-                <a:latin typeface="Menlo" panose="020B0609030804020204" pitchFamily="49" charset="0"/>
-              </a:rPr>
-              <a:t>int</a:t>
-            </a:r>
-          </a:p>
-          <a:p>
+              <a:t>result of </a:t>
+            </a:r>
+            <a:r>
+              <a:rPr lang="en-US" dirty="0" err="1">
+                <a:latin typeface="+mn-lt"/>
+              </a:rPr>
+              <a:t>ub</a:t>
+            </a:r>
             <a:r>
               <a:rPr lang="en-US" dirty="0">
                 <a:latin typeface="+mn-lt"/>
               </a:rPr>
-              <a:t>Bound limits</a:t>
-            </a:r>
-            <a:r>
-              <a:rPr lang="en-US">
+              <a:t> – </a:t>
+            </a:r>
+            <a:r>
+              <a:rPr lang="en-US" dirty="0" err="1">
                 <a:latin typeface="+mn-lt"/>
               </a:rPr>
-              <a:t>: INT</a:t>
+              <a:t>lb</a:t>
             </a:r>
             <a:r>
               <a:rPr lang="en-US" dirty="0">
                 <a:latin typeface="+mn-lt"/>
               </a:rPr>
-              <a:t>_MIN + </a:t>
-            </a:r>
-            <a:r>
-              <a:rPr lang="en-US">
+              <a:t> in this case would overflow an int</a:t>
+            </a:r>
+          </a:p>
+          <a:p>
+            <a:pPr lvl="2"/>
+            <a:r>
+              <a:rPr lang="en-US" dirty="0" err="1">
                 <a:latin typeface="+mn-lt"/>
               </a:rPr>
-              <a:t>1 to </a:t>
+              <a:t>static_cast</a:t>
             </a:r>
             <a:r>
               <a:rPr lang="en-US" dirty="0">
                 <a:latin typeface="+mn-lt"/>
               </a:rPr>
-              <a:t>INT</a:t>
-            </a:r>
-            <a:r>
-              <a:rPr lang="en-US">
+              <a:t> first operand to </a:t>
+            </a:r>
+            <a:r>
+              <a:rPr lang="en-US" dirty="0" err="1">
                 <a:latin typeface="+mn-lt"/>
               </a:rPr>
-              <a:t>_MAX</a:t>
+              <a:t>unsigned_int</a:t>
+            </a:r>
+            <a:r>
+              <a:rPr lang="en-US" dirty="0">
+                <a:latin typeface="+mn-lt"/>
+              </a:rPr>
+              <a:t> to now overflow temporary</a:t>
+            </a:r>
+          </a:p>
+          <a:p>
+            <a:pPr lvl="1"/>
+            <a:r>
+              <a:rPr lang="en-US" dirty="0">
+                <a:latin typeface="+mn-lt"/>
+              </a:rPr>
+              <a:t>Returns resulting </a:t>
+            </a:r>
+            <a:r>
+              <a:rPr lang="en-US" b="0" dirty="0">
+                <a:solidFill>
+                  <a:srgbClr val="569CD6"/>
+                </a:solidFill>
+                <a:effectLst/>
+                <a:latin typeface="Menlo" panose="020B0609030804020204" pitchFamily="49" charset="0"/>
+              </a:rPr>
+              <a:t>unsigned</a:t>
+            </a:r>
+            <a:r>
+              <a:rPr lang="en-US" b="0" dirty="0">
+                <a:solidFill>
+                  <a:srgbClr val="CCCCCC"/>
+                </a:solidFill>
+                <a:effectLst/>
+                <a:latin typeface="Menlo" panose="020B0609030804020204" pitchFamily="49" charset="0"/>
+              </a:rPr>
+              <a:t> </a:t>
+            </a:r>
+            <a:r>
+              <a:rPr lang="en-US" b="0" dirty="0">
+                <a:solidFill>
+                  <a:srgbClr val="569CD6"/>
+                </a:solidFill>
+                <a:effectLst/>
+                <a:latin typeface="Menlo" panose="020B0609030804020204" pitchFamily="49" charset="0"/>
+              </a:rPr>
+              <a:t>int</a:t>
+            </a:r>
+          </a:p>
+          <a:p>
+            <a:r>
+              <a:rPr lang="en-US" dirty="0">
+                <a:latin typeface="+mn-lt"/>
+              </a:rPr>
+              <a:t>Bound limits: INT_MIN + 1 to INT_MAX</a:t>
             </a:r>
             <a:endParaRPr lang="en-US" b="0" dirty="0">
               <a:effectLst/>
@@ -15836,7 +16029,7 @@
         </p:spPr>
         <p:txBody>
           <a:bodyPr>
-            <a:normAutofit lnSpcReduction="10000"/>
+            <a:normAutofit fontScale="92500" lnSpcReduction="10000"/>
           </a:bodyPr>
           <a:lstStyle/>
           <a:p>
@@ -15997,13 +16190,8 @@
             <a:pPr lvl="1"/>
             <a:r>
               <a:rPr lang="en-US" dirty="0"/>
-              <a:t>We check for self-assignment anyway because std::copy() is undefined for </a:t>
-            </a:r>
-            <a:r>
-              <a:rPr lang="en-US"/>
-              <a:t>overlapping range</a:t>
-            </a:r>
-            <a:endParaRPr lang="en-US" dirty="0"/>
+              <a:t>We check for self-assignment anyway because std::copy() is undefined for overlapping range</a:t>
+            </a:r>
           </a:p>
         </p:txBody>
       </p:sp>
@@ -16031,7 +16219,7 @@
         </p:spPr>
         <p:txBody>
           <a:bodyPr>
-            <a:normAutofit lnSpcReduction="10000"/>
+            <a:normAutofit fontScale="92500" lnSpcReduction="10000"/>
           </a:bodyPr>
           <a:lstStyle/>
           <a:p>
@@ -16390,6 +16578,18 @@
               </a:rPr>
               <a:t>.</a:t>
             </a:r>
+          </a:p>
+          <a:p>
+            <a:r>
+              <a:rPr lang="en-US" dirty="0">
+                <a:latin typeface="+mn-lt"/>
+              </a:rPr>
+              <a:t>I chose not to use copy &amp; swap because we might potentially perform unnecessary copies in the case of “illegal” assignments where the bounds are not equal </a:t>
+            </a:r>
+            <a:endParaRPr lang="en-US" b="0" dirty="0">
+              <a:effectLst/>
+              <a:latin typeface="+mn-lt"/>
+            </a:endParaRPr>
           </a:p>
           <a:p>
             <a:endParaRPr lang="en-US" dirty="0"/>

</xml_diff>